<commit_message>
Completed the ppt, modified Classitube.py
</commit_message>
<xml_diff>
--- a/Categorizing YouTube Videos.pptx
+++ b/Categorizing YouTube Videos.pptx
@@ -5,22 +5,21 @@
     <p:sldMasterId id="2147483760" r:id="rId1"/>
   </p:sldMasterIdLst>
   <p:notesMasterIdLst>
-    <p:notesMasterId r:id="rId15"/>
+    <p:notesMasterId r:id="rId14"/>
   </p:notesMasterIdLst>
   <p:sldIdLst>
     <p:sldId id="256" r:id="rId2"/>
     <p:sldId id="257" r:id="rId3"/>
     <p:sldId id="261" r:id="rId4"/>
-    <p:sldId id="262" r:id="rId5"/>
-    <p:sldId id="258" r:id="rId6"/>
-    <p:sldId id="267" r:id="rId7"/>
+    <p:sldId id="274" r:id="rId5"/>
+    <p:sldId id="273" r:id="rId6"/>
+    <p:sldId id="258" r:id="rId7"/>
     <p:sldId id="264" r:id="rId8"/>
     <p:sldId id="268" r:id="rId9"/>
-    <p:sldId id="269" r:id="rId10"/>
-    <p:sldId id="270" r:id="rId11"/>
-    <p:sldId id="266" r:id="rId12"/>
-    <p:sldId id="271" r:id="rId13"/>
-    <p:sldId id="272" r:id="rId14"/>
+    <p:sldId id="275" r:id="rId10"/>
+    <p:sldId id="266" r:id="rId11"/>
+    <p:sldId id="271" r:id="rId12"/>
+    <p:sldId id="272" r:id="rId13"/>
   </p:sldIdLst>
   <p:sldSz cx="12192000" cy="6858000"/>
   <p:notesSz cx="6858000" cy="9144000"/>
@@ -209,7 +208,7 @@
           <a:p>
             <a:fld id="{700893F5-AD44-E543-A245-95F38FF08452}" type="datetimeFigureOut">
               <a:rPr lang="en-US" smtClean="0"/>
-              <a:t>4/26/18</a:t>
+              <a:t>4/26/2018</a:t>
             </a:fld>
             <a:endParaRPr lang="en-US"/>
           </a:p>
@@ -647,7 +646,7 @@
           <a:p>
             <a:fld id="{F8F32E06-09F6-479A-86EB-0AE786A442BF}" type="datetimeFigureOut">
               <a:rPr lang="en-US" smtClean="0"/>
-              <a:t>4/26/18</a:t>
+              <a:t>4/26/2018</a:t>
             </a:fld>
             <a:endParaRPr lang="en-US"/>
           </a:p>
@@ -962,7 +961,7 @@
           <a:p>
             <a:fld id="{F8F32E06-09F6-479A-86EB-0AE786A442BF}" type="datetimeFigureOut">
               <a:rPr lang="en-US" smtClean="0"/>
-              <a:t>4/26/18</a:t>
+              <a:t>4/26/2018</a:t>
             </a:fld>
             <a:endParaRPr lang="en-US"/>
           </a:p>
@@ -1184,7 +1183,7 @@
           <a:p>
             <a:fld id="{F8F32E06-09F6-479A-86EB-0AE786A442BF}" type="datetimeFigureOut">
               <a:rPr lang="en-US" smtClean="0"/>
-              <a:t>4/26/18</a:t>
+              <a:t>4/26/2018</a:t>
             </a:fld>
             <a:endParaRPr lang="en-US"/>
           </a:p>
@@ -1475,7 +1474,7 @@
           <a:p>
             <a:fld id="{F8F32E06-09F6-479A-86EB-0AE786A442BF}" type="datetimeFigureOut">
               <a:rPr lang="en-US" smtClean="0"/>
-              <a:t>4/26/18</a:t>
+              <a:t>4/26/2018</a:t>
             </a:fld>
             <a:endParaRPr lang="en-US"/>
           </a:p>
@@ -1929,7 +1928,7 @@
           <a:p>
             <a:fld id="{F8F32E06-09F6-479A-86EB-0AE786A442BF}" type="datetimeFigureOut">
               <a:rPr lang="en-US" smtClean="0"/>
-              <a:t>4/26/18</a:t>
+              <a:t>4/26/2018</a:t>
             </a:fld>
             <a:endParaRPr lang="en-US"/>
           </a:p>
@@ -2505,7 +2504,7 @@
           <a:p>
             <a:fld id="{F8F32E06-09F6-479A-86EB-0AE786A442BF}" type="datetimeFigureOut">
               <a:rPr lang="en-US" smtClean="0"/>
-              <a:t>4/26/18</a:t>
+              <a:t>4/26/2018</a:t>
             </a:fld>
             <a:endParaRPr lang="en-US"/>
           </a:p>
@@ -3366,7 +3365,7 @@
           <a:p>
             <a:fld id="{F8F32E06-09F6-479A-86EB-0AE786A442BF}" type="datetimeFigureOut">
               <a:rPr lang="en-US" smtClean="0"/>
-              <a:t>4/26/18</a:t>
+              <a:t>4/26/2018</a:t>
             </a:fld>
             <a:endParaRPr lang="en-US"/>
           </a:p>
@@ -3571,7 +3570,7 @@
           <a:p>
             <a:fld id="{F8F32E06-09F6-479A-86EB-0AE786A442BF}" type="datetimeFigureOut">
               <a:rPr lang="en-US" smtClean="0"/>
-              <a:t>4/26/18</a:t>
+              <a:t>4/26/2018</a:t>
             </a:fld>
             <a:endParaRPr lang="en-US"/>
           </a:p>
@@ -3785,7 +3784,7 @@
           <a:p>
             <a:fld id="{F8F32E06-09F6-479A-86EB-0AE786A442BF}" type="datetimeFigureOut">
               <a:rPr lang="en-US" smtClean="0"/>
-              <a:t>4/26/18</a:t>
+              <a:t>4/26/2018</a:t>
             </a:fld>
             <a:endParaRPr lang="en-US"/>
           </a:p>
@@ -3990,7 +3989,7 @@
           <a:p>
             <a:fld id="{F8F32E06-09F6-479A-86EB-0AE786A442BF}" type="datetimeFigureOut">
               <a:rPr lang="en-US" smtClean="0"/>
-              <a:t>4/26/18</a:t>
+              <a:t>4/26/2018</a:t>
             </a:fld>
             <a:endParaRPr lang="en-US"/>
           </a:p>
@@ -4270,7 +4269,7 @@
           <a:p>
             <a:fld id="{F8F32E06-09F6-479A-86EB-0AE786A442BF}" type="datetimeFigureOut">
               <a:rPr lang="en-US" smtClean="0"/>
-              <a:t>4/26/18</a:t>
+              <a:t>4/26/2018</a:t>
             </a:fld>
             <a:endParaRPr lang="en-US"/>
           </a:p>
@@ -4537,7 +4536,7 @@
           <a:p>
             <a:fld id="{F8F32E06-09F6-479A-86EB-0AE786A442BF}" type="datetimeFigureOut">
               <a:rPr lang="en-US" smtClean="0"/>
-              <a:t>4/26/18</a:t>
+              <a:t>4/26/2018</a:t>
             </a:fld>
             <a:endParaRPr lang="en-US"/>
           </a:p>
@@ -4952,7 +4951,7 @@
           <a:p>
             <a:fld id="{F8F32E06-09F6-479A-86EB-0AE786A442BF}" type="datetimeFigureOut">
               <a:rPr lang="en-US" smtClean="0"/>
-              <a:t>4/26/18</a:t>
+              <a:t>4/26/2018</a:t>
             </a:fld>
             <a:endParaRPr lang="en-US"/>
           </a:p>
@@ -5100,7 +5099,7 @@
           <a:p>
             <a:fld id="{F8F32E06-09F6-479A-86EB-0AE786A442BF}" type="datetimeFigureOut">
               <a:rPr lang="en-US" smtClean="0"/>
-              <a:t>4/26/18</a:t>
+              <a:t>4/26/2018</a:t>
             </a:fld>
             <a:endParaRPr lang="en-US"/>
           </a:p>
@@ -5225,7 +5224,7 @@
           <a:p>
             <a:fld id="{F8F32E06-09F6-479A-86EB-0AE786A442BF}" type="datetimeFigureOut">
               <a:rPr lang="en-US" smtClean="0"/>
-              <a:t>4/26/18</a:t>
+              <a:t>4/26/2018</a:t>
             </a:fld>
             <a:endParaRPr lang="en-US"/>
           </a:p>
@@ -5504,7 +5503,7 @@
           <a:p>
             <a:fld id="{F8F32E06-09F6-479A-86EB-0AE786A442BF}" type="datetimeFigureOut">
               <a:rPr lang="en-US" smtClean="0"/>
-              <a:t>4/26/18</a:t>
+              <a:t>4/26/2018</a:t>
             </a:fld>
             <a:endParaRPr lang="en-US"/>
           </a:p>
@@ -5819,7 +5818,7 @@
           <a:p>
             <a:fld id="{F8F32E06-09F6-479A-86EB-0AE786A442BF}" type="datetimeFigureOut">
               <a:rPr lang="en-US" smtClean="0"/>
-              <a:t>4/26/18</a:t>
+              <a:t>4/26/2018</a:t>
             </a:fld>
             <a:endParaRPr lang="en-US"/>
           </a:p>
@@ -6072,7 +6071,7 @@
           <a:p>
             <a:fld id="{F8F32E06-09F6-479A-86EB-0AE786A442BF}" type="datetimeFigureOut">
               <a:rPr lang="en-US" smtClean="0"/>
-              <a:t>4/26/18</a:t>
+              <a:t>4/26/2018</a:t>
             </a:fld>
             <a:endParaRPr lang="en-US"/>
           </a:p>
@@ -6521,7 +6520,7 @@
           <p:cNvPr id="2" name="Title 1">
             <a:extLst>
               <a:ext uri="{FF2B5EF4-FFF2-40B4-BE49-F238E27FC236}">
-                <a16:creationId xmlns:a16="http://schemas.microsoft.com/office/drawing/2014/main" xmlns="" id="{28C89AE5-A7F5-4B9F-AD0E-26586DDC9A65}"/>
+                <a16:creationId xmlns:a16="http://schemas.microsoft.com/office/drawing/2014/main" id="{28C89AE5-A7F5-4B9F-AD0E-26586DDC9A65}"/>
               </a:ext>
             </a:extLst>
           </p:cNvPr>
@@ -6554,7 +6553,7 @@
           <p:cNvPr id="3" name="Subtitle 2">
             <a:extLst>
               <a:ext uri="{FF2B5EF4-FFF2-40B4-BE49-F238E27FC236}">
-                <a16:creationId xmlns:a16="http://schemas.microsoft.com/office/drawing/2014/main" xmlns="" id="{21DEBC13-51BD-4453-B4B4-C78B2EB0A947}"/>
+                <a16:creationId xmlns:a16="http://schemas.microsoft.com/office/drawing/2014/main" id="{21DEBC13-51BD-4453-B4B4-C78B2EB0A947}"/>
               </a:ext>
             </a:extLst>
           </p:cNvPr>
@@ -6623,340 +6622,97 @@
       </p:grpSpPr>
       <p:sp>
         <p:nvSpPr>
-          <p:cNvPr id="2" name="Title 1">
+          <p:cNvPr id="4" name="Title 1">
             <a:extLst>
               <a:ext uri="{FF2B5EF4-FFF2-40B4-BE49-F238E27FC236}">
-                <a16:creationId xmlns:a16="http://schemas.microsoft.com/office/drawing/2014/main" xmlns="" id="{60B89E68-CDB7-4337-90F0-AC28E247D32A}"/>
+                <a16:creationId xmlns:a16="http://schemas.microsoft.com/office/drawing/2014/main" id="{596B46F0-0445-4416-8890-1C82388EF8EF}"/>
               </a:ext>
             </a:extLst>
           </p:cNvPr>
-          <p:cNvSpPr>
-            <a:spLocks noGrp="1"/>
-          </p:cNvSpPr>
-          <p:nvPr>
-            <p:ph type="title"/>
-          </p:nvPr>
+          <p:cNvSpPr txBox="1">
+            <a:spLocks/>
+          </p:cNvSpPr>
+          <p:nvPr/>
         </p:nvSpPr>
         <p:spPr>
           <a:xfrm>
-            <a:off x="750002" y="673108"/>
-            <a:ext cx="10364451" cy="622454"/>
+            <a:off x="789070" y="1279219"/>
+            <a:ext cx="10364451" cy="557140"/>
           </a:xfrm>
+          <a:prstGeom prst="rect">
+            <a:avLst/>
+          </a:prstGeom>
         </p:spPr>
         <p:txBody>
-          <a:bodyPr>
-            <a:normAutofit/>
+          <a:bodyPr vert="horz" lIns="91440" tIns="45720" rIns="91440" bIns="45720" rtlCol="0" anchor="ctr">
+            <a:normAutofit fontScale="97500" lnSpcReduction="10000"/>
           </a:bodyPr>
+          <a:lstStyle>
+            <a:lvl1pPr algn="ctr" defTabSz="914400" rtl="0" eaLnBrk="1" latinLnBrk="0" hangingPunct="1">
+              <a:lnSpc>
+                <a:spcPct val="90000"/>
+              </a:lnSpc>
+              <a:spcBef>
+                <a:spcPct val="0"/>
+              </a:spcBef>
+              <a:buNone/>
+              <a:defRPr sz="3600" kern="1200" cap="all" baseline="0">
+                <a:solidFill>
+                  <a:schemeClr val="tx1"/>
+                </a:solidFill>
+                <a:effectLst/>
+                <a:latin typeface="+mj-lt"/>
+                <a:ea typeface="+mj-ea"/>
+                <a:cs typeface="+mj-cs"/>
+              </a:defRPr>
+            </a:lvl1pPr>
+          </a:lstStyle>
+          <a:p>
+            <a:r>
+              <a:rPr lang="en-US" dirty="0"/>
+              <a:t>CONCLUSION</a:t>
+            </a:r>
+          </a:p>
+        </p:txBody>
+      </p:sp>
+      <p:sp>
+        <p:nvSpPr>
+          <p:cNvPr id="6" name="Content Placeholder 5"/>
+          <p:cNvSpPr>
+            <a:spLocks noGrp="1"/>
+          </p:cNvSpPr>
+          <p:nvPr>
+            <p:ph sz="quarter" idx="13"/>
+          </p:nvPr>
+        </p:nvSpPr>
+        <p:spPr/>
+        <p:txBody>
+          <a:bodyPr/>
           <a:lstStyle/>
           <a:p>
             <a:r>
-              <a:rPr lang="en-US" sz="3200" dirty="0" smtClean="0"/>
-              <a:t>Performance</a:t>
-            </a:r>
-            <a:endParaRPr lang="en-US" sz="3200" dirty="0"/>
-          </a:p>
-        </p:txBody>
-      </p:sp>
-      <p:graphicFrame>
-        <p:nvGraphicFramePr>
-          <p:cNvPr id="4" name="Content Placeholder 3"/>
-          <p:cNvGraphicFramePr>
-            <a:graphicFrameLocks noGrp="1"/>
-          </p:cNvGraphicFramePr>
-          <p:nvPr>
-            <p:ph sz="quarter" idx="13"/>
-            <p:extLst>
-              <p:ext uri="{D42A27DB-BD31-4B8C-83A1-F6EECF244321}">
-                <p14:modId xmlns:p14="http://schemas.microsoft.com/office/powerpoint/2010/main" val="816256330"/>
-              </p:ext>
-            </p:extLst>
-          </p:nvPr>
-        </p:nvGraphicFramePr>
-        <p:xfrm>
-          <a:off x="2169993" y="1774207"/>
-          <a:ext cx="7724634" cy="4176216"/>
-        </p:xfrm>
-        <a:graphic>
-          <a:graphicData uri="http://schemas.openxmlformats.org/drawingml/2006/table">
-            <a:tbl>
-              <a:tblPr firstRow="1" firstCol="1" bandRow="1">
-                <a:tableStyleId>{5C22544A-7EE6-4342-B048-85BDC9FD1C3A}</a:tableStyleId>
-              </a:tblPr>
-              <a:tblGrid>
-                <a:gridCol w="3862317"/>
-                <a:gridCol w="3862317"/>
-              </a:tblGrid>
-              <a:tr h="1044054">
-                <a:tc gridSpan="2">
-                  <a:txBody>
-                    <a:bodyPr/>
-                    <a:lstStyle/>
-                    <a:p>
-                      <a:pPr marL="0" marR="0" algn="ctr">
-                        <a:lnSpc>
-                          <a:spcPct val="115000"/>
-                        </a:lnSpc>
-                        <a:spcBef>
-                          <a:spcPts val="0"/>
-                        </a:spcBef>
-                        <a:spcAft>
-                          <a:spcPts val="0"/>
-                        </a:spcAft>
-                        <a:tabLst>
-                          <a:tab pos="127000" algn="l"/>
-                        </a:tabLst>
-                      </a:pPr>
-                      <a:r>
-                        <a:rPr lang="en-US" sz="3200" dirty="0">
-                          <a:effectLst/>
-                        </a:rPr>
-                        <a:t>k Nearest Neighbors</a:t>
-                      </a:r>
-                      <a:endParaRPr lang="en-US" sz="3200" b="1" dirty="0">
-                        <a:effectLst/>
-                        <a:latin typeface="Times" charset="0"/>
-                        <a:ea typeface="Times New Roman" charset="0"/>
-                        <a:cs typeface="Times New Roman" charset="0"/>
-                      </a:endParaRPr>
-                    </a:p>
-                  </a:txBody>
-                  <a:tcPr marL="68580" marR="68580" marT="0" marB="0"/>
-                </a:tc>
-                <a:tc hMerge="1">
-                  <a:txBody>
-                    <a:bodyPr/>
-                    <a:lstStyle/>
-                    <a:p>
-                      <a:endParaRPr lang="en-US"/>
-                    </a:p>
-                  </a:txBody>
-                  <a:tcPr/>
-                </a:tc>
-              </a:tr>
-              <a:tr h="1044054">
-                <a:tc>
-                  <a:txBody>
-                    <a:bodyPr/>
-                    <a:lstStyle/>
-                    <a:p>
-                      <a:pPr marL="0" marR="0" algn="just">
-                        <a:lnSpc>
-                          <a:spcPct val="115000"/>
-                        </a:lnSpc>
-                        <a:spcBef>
-                          <a:spcPts val="0"/>
-                        </a:spcBef>
-                        <a:spcAft>
-                          <a:spcPts val="0"/>
-                        </a:spcAft>
-                        <a:tabLst>
-                          <a:tab pos="127000" algn="l"/>
-                        </a:tabLst>
-                      </a:pPr>
-                      <a:r>
-                        <a:rPr lang="en-US" sz="2400" dirty="0">
-                          <a:effectLst/>
-                        </a:rPr>
-                        <a:t>k</a:t>
-                      </a:r>
-                      <a:endParaRPr lang="en-US" sz="2400" b="1" dirty="0">
-                        <a:effectLst/>
-                        <a:latin typeface="Times" charset="0"/>
-                        <a:ea typeface="Times New Roman" charset="0"/>
-                        <a:cs typeface="Times New Roman" charset="0"/>
-                      </a:endParaRPr>
-                    </a:p>
-                  </a:txBody>
-                  <a:tcPr marL="68580" marR="68580" marT="0" marB="0"/>
-                </a:tc>
-                <a:tc>
-                  <a:txBody>
-                    <a:bodyPr/>
-                    <a:lstStyle/>
-                    <a:p>
-                      <a:pPr marL="0" marR="0" algn="just">
-                        <a:lnSpc>
-                          <a:spcPct val="115000"/>
-                        </a:lnSpc>
-                        <a:spcBef>
-                          <a:spcPts val="0"/>
-                        </a:spcBef>
-                        <a:spcAft>
-                          <a:spcPts val="0"/>
-                        </a:spcAft>
-                        <a:tabLst>
-                          <a:tab pos="127000" algn="l"/>
-                        </a:tabLst>
-                      </a:pPr>
-                      <a:r>
-                        <a:rPr lang="en-US" sz="2400">
-                          <a:effectLst/>
-                        </a:rPr>
-                        <a:t>10</a:t>
-                      </a:r>
-                      <a:endParaRPr lang="en-US" sz="2400" b="1">
-                        <a:effectLst/>
-                        <a:latin typeface="Times" charset="0"/>
-                        <a:ea typeface="Times New Roman" charset="0"/>
-                        <a:cs typeface="Times New Roman" charset="0"/>
-                      </a:endParaRPr>
-                    </a:p>
-                  </a:txBody>
-                  <a:tcPr marL="68580" marR="68580" marT="0" marB="0"/>
-                </a:tc>
-              </a:tr>
-              <a:tr h="1044054">
-                <a:tc>
-                  <a:txBody>
-                    <a:bodyPr/>
-                    <a:lstStyle/>
-                    <a:p>
-                      <a:pPr marL="0" marR="0" algn="just">
-                        <a:lnSpc>
-                          <a:spcPct val="115000"/>
-                        </a:lnSpc>
-                        <a:spcBef>
-                          <a:spcPts val="0"/>
-                        </a:spcBef>
-                        <a:spcAft>
-                          <a:spcPts val="0"/>
-                        </a:spcAft>
-                        <a:tabLst>
-                          <a:tab pos="127000" algn="l"/>
-                        </a:tabLst>
-                      </a:pPr>
-                      <a:r>
-                        <a:rPr lang="en-US" sz="2400" dirty="0">
-                          <a:effectLst/>
-                        </a:rPr>
-                        <a:t>Features Used </a:t>
-                      </a:r>
-                      <a:endParaRPr lang="en-US" sz="2400" b="1" dirty="0">
-                        <a:effectLst/>
-                        <a:latin typeface="Times" charset="0"/>
-                        <a:ea typeface="Times New Roman" charset="0"/>
-                        <a:cs typeface="Times New Roman" charset="0"/>
-                      </a:endParaRPr>
-                    </a:p>
-                  </a:txBody>
-                  <a:tcPr marL="68580" marR="68580" marT="0" marB="0"/>
-                </a:tc>
-                <a:tc>
-                  <a:txBody>
-                    <a:bodyPr/>
-                    <a:lstStyle/>
-                    <a:p>
-                      <a:pPr marL="0" marR="0" algn="just">
-                        <a:lnSpc>
-                          <a:spcPct val="115000"/>
-                        </a:lnSpc>
-                        <a:spcBef>
-                          <a:spcPts val="0"/>
-                        </a:spcBef>
-                        <a:spcAft>
-                          <a:spcPts val="0"/>
-                        </a:spcAft>
-                        <a:tabLst>
-                          <a:tab pos="127000" algn="l"/>
-                        </a:tabLst>
-                      </a:pPr>
-                      <a:r>
-                        <a:rPr lang="en-US" sz="2400" dirty="0">
-                          <a:effectLst/>
-                        </a:rPr>
-                        <a:t>Tags</a:t>
-                      </a:r>
-                      <a:endParaRPr lang="en-US" sz="2400" b="1" dirty="0">
-                        <a:effectLst/>
-                        <a:latin typeface="Times" charset="0"/>
-                        <a:ea typeface="Times New Roman" charset="0"/>
-                        <a:cs typeface="Times New Roman" charset="0"/>
-                      </a:endParaRPr>
-                    </a:p>
-                  </a:txBody>
-                  <a:tcPr marL="68580" marR="68580" marT="0" marB="0"/>
-                </a:tc>
-              </a:tr>
-              <a:tr h="1044054">
-                <a:tc>
-                  <a:txBody>
-                    <a:bodyPr/>
-                    <a:lstStyle/>
-                    <a:p>
-                      <a:pPr marL="0" marR="0" algn="just">
-                        <a:lnSpc>
-                          <a:spcPct val="115000"/>
-                        </a:lnSpc>
-                        <a:spcBef>
-                          <a:spcPts val="0"/>
-                        </a:spcBef>
-                        <a:spcAft>
-                          <a:spcPts val="0"/>
-                        </a:spcAft>
-                        <a:tabLst>
-                          <a:tab pos="127000" algn="l"/>
-                        </a:tabLst>
-                      </a:pPr>
-                      <a:r>
-                        <a:rPr lang="en-US" sz="2400">
-                          <a:effectLst/>
-                        </a:rPr>
-                        <a:t>Accuracy</a:t>
-                      </a:r>
-                      <a:endParaRPr lang="en-US" sz="2400" b="1">
-                        <a:effectLst/>
-                        <a:latin typeface="Times" charset="0"/>
-                        <a:ea typeface="Times New Roman" charset="0"/>
-                        <a:cs typeface="Times New Roman" charset="0"/>
-                      </a:endParaRPr>
-                    </a:p>
-                  </a:txBody>
-                  <a:tcPr marL="68580" marR="68580" marT="0" marB="0"/>
-                </a:tc>
-                <a:tc>
-                  <a:txBody>
-                    <a:bodyPr/>
-                    <a:lstStyle/>
-                    <a:p>
-                      <a:pPr marL="0" marR="0" algn="just">
-                        <a:lnSpc>
-                          <a:spcPct val="115000"/>
-                        </a:lnSpc>
-                        <a:spcBef>
-                          <a:spcPts val="0"/>
-                        </a:spcBef>
-                        <a:spcAft>
-                          <a:spcPts val="0"/>
-                        </a:spcAft>
-                        <a:tabLst>
-                          <a:tab pos="127000" algn="l"/>
-                        </a:tabLst>
-                      </a:pPr>
-                      <a:r>
-                        <a:rPr lang="en-US" sz="2400" dirty="0">
-                          <a:effectLst/>
-                        </a:rPr>
-                        <a:t>65.66 percent</a:t>
-                      </a:r>
-                      <a:endParaRPr lang="en-US" sz="2400" b="1" dirty="0">
-                        <a:effectLst/>
-                        <a:latin typeface="Times" charset="0"/>
-                        <a:ea typeface="Times New Roman" charset="0"/>
-                        <a:cs typeface="Times New Roman" charset="0"/>
-                      </a:endParaRPr>
-                    </a:p>
-                  </a:txBody>
-                  <a:tcPr marL="68580" marR="68580" marT="0" marB="0"/>
-                </a:tc>
-              </a:tr>
-            </a:tbl>
-          </a:graphicData>
-        </a:graphic>
-      </p:graphicFrame>
+              <a:rPr lang="en-US" dirty="0"/>
+              <a:t>obtained the best model in terms of Accuracy and Running Time by Preprocessing the data and using Neural Networks and K-Nearest Neighbors. </a:t>
+            </a:r>
+          </a:p>
+          <a:p>
+            <a:r>
+              <a:rPr lang="en-US" dirty="0"/>
+              <a:t>successfully obtained a model that can classify the videos with 74% accuracy. </a:t>
+            </a:r>
+          </a:p>
+          <a:p>
+            <a:endParaRPr lang="en-US" dirty="0"/>
+          </a:p>
+          <a:p>
+            <a:endParaRPr lang="en-US" dirty="0"/>
+          </a:p>
+        </p:txBody>
+      </p:sp>
     </p:spTree>
     <p:extLst>
       <p:ext uri="{BB962C8B-B14F-4D97-AF65-F5344CB8AC3E}">
-        <p14:creationId xmlns:p14="http://schemas.microsoft.com/office/powerpoint/2010/main" val="1699472076"/>
+        <p14:creationId xmlns:p14="http://schemas.microsoft.com/office/powerpoint/2010/main" val="1093250247"/>
       </p:ext>
     </p:extLst>
   </p:cSld>
@@ -6985,67 +6741,12 @@
       </p:grpSpPr>
       <p:sp>
         <p:nvSpPr>
-          <p:cNvPr id="4" name="Title 1">
-            <a:extLst>
-              <a:ext uri="{FF2B5EF4-FFF2-40B4-BE49-F238E27FC236}">
-                <a16:creationId xmlns:a16="http://schemas.microsoft.com/office/drawing/2014/main" xmlns="" id="{596B46F0-0445-4416-8890-1C82388EF8EF}"/>
-              </a:ext>
-            </a:extLst>
-          </p:cNvPr>
-          <p:cNvSpPr txBox="1">
-            <a:spLocks/>
-          </p:cNvSpPr>
-          <p:nvPr/>
-        </p:nvSpPr>
-        <p:spPr>
-          <a:xfrm>
-            <a:off x="789070" y="1279219"/>
-            <a:ext cx="10364451" cy="557140"/>
-          </a:xfrm>
-          <a:prstGeom prst="rect">
-            <a:avLst/>
-          </a:prstGeom>
-        </p:spPr>
-        <p:txBody>
-          <a:bodyPr vert="horz" lIns="91440" tIns="45720" rIns="91440" bIns="45720" rtlCol="0" anchor="ctr">
-            <a:normAutofit fontScale="97500" lnSpcReduction="10000"/>
-          </a:bodyPr>
-          <a:lstStyle>
-            <a:lvl1pPr algn="ctr" defTabSz="914400" rtl="0" eaLnBrk="1" latinLnBrk="0" hangingPunct="1">
-              <a:lnSpc>
-                <a:spcPct val="90000"/>
-              </a:lnSpc>
-              <a:spcBef>
-                <a:spcPct val="0"/>
-              </a:spcBef>
-              <a:buNone/>
-              <a:defRPr sz="3600" kern="1200" cap="all" baseline="0">
-                <a:solidFill>
-                  <a:schemeClr val="tx1"/>
-                </a:solidFill>
-                <a:effectLst/>
-                <a:latin typeface="+mj-lt"/>
-                <a:ea typeface="+mj-ea"/>
-                <a:cs typeface="+mj-cs"/>
-              </a:defRPr>
-            </a:lvl1pPr>
-          </a:lstStyle>
-          <a:p>
-            <a:r>
-              <a:rPr lang="en-US" dirty="0"/>
-              <a:t>CONCLUSION</a:t>
-            </a:r>
-          </a:p>
-        </p:txBody>
-      </p:sp>
-      <p:sp>
-        <p:nvSpPr>
-          <p:cNvPr id="6" name="Content Placeholder 5"/>
-          <p:cNvSpPr>
-            <a:spLocks noGrp="1"/>
-          </p:cNvSpPr>
-          <p:nvPr>
-            <p:ph sz="quarter" idx="13"/>
+          <p:cNvPr id="2" name="Title 1"/>
+          <p:cNvSpPr>
+            <a:spLocks noGrp="1"/>
+          </p:cNvSpPr>
+          <p:nvPr>
+            <p:ph type="title"/>
           </p:nvPr>
         </p:nvSpPr>
         <p:spPr/>
@@ -7055,27 +6756,85 @@
           <a:p>
             <a:r>
               <a:rPr lang="en-US" dirty="0"/>
-              <a:t>obtain the best model in terms of Accuracy and Running Time by Preprocessing the data and using Neural Networks and K-Nearest Neighbors. </a:t>
-            </a:r>
-          </a:p>
-          <a:p>
-            <a:r>
-              <a:rPr lang="en-US" dirty="0"/>
-              <a:t>successfully obtained a model that can classify the videos with a staggering 89% accuracy. </a:t>
-            </a:r>
-          </a:p>
-          <a:p>
-            <a:endParaRPr lang="en-US" dirty="0"/>
-          </a:p>
-          <a:p>
-            <a:endParaRPr lang="en-US" dirty="0"/>
+              <a:t>REFERENCES</a:t>
+            </a:r>
+          </a:p>
+        </p:txBody>
+      </p:sp>
+      <p:sp>
+        <p:nvSpPr>
+          <p:cNvPr id="3" name="Content Placeholder 2"/>
+          <p:cNvSpPr>
+            <a:spLocks noGrp="1"/>
+          </p:cNvSpPr>
+          <p:nvPr>
+            <p:ph sz="quarter" idx="13"/>
+          </p:nvPr>
+        </p:nvSpPr>
+        <p:spPr/>
+        <p:txBody>
+          <a:bodyPr>
+            <a:normAutofit/>
+          </a:bodyPr>
+          <a:lstStyle/>
+          <a:p>
+            <a:r>
+              <a:rPr lang="en-US" sz="2400" dirty="0"/>
+              <a:t>LECTURES SLIDES BY DR. JIN TIAN FOR COM S 574X SPRING 2018, ISU</a:t>
+            </a:r>
+          </a:p>
+          <a:p>
+            <a:r>
+              <a:rPr lang="en-US" sz="2400" dirty="0"/>
+              <a:t>https://</a:t>
+            </a:r>
+            <a:r>
+              <a:rPr lang="en-US" sz="2400" dirty="0" err="1"/>
+              <a:t>en.wikipedia.org</a:t>
+            </a:r>
+            <a:r>
+              <a:rPr lang="en-US" sz="2400" dirty="0"/>
+              <a:t>/wiki/</a:t>
+            </a:r>
+            <a:r>
+              <a:rPr lang="en-US" sz="2400" dirty="0" err="1"/>
+              <a:t>kmeans</a:t>
+            </a:r>
+            <a:endParaRPr lang="en-US" sz="2400" dirty="0"/>
+          </a:p>
+          <a:p>
+            <a:pPr marL="228600" lvl="1">
+              <a:spcBef>
+                <a:spcPts val="1000"/>
+              </a:spcBef>
+            </a:pPr>
+            <a:r>
+              <a:rPr lang="en-US" sz="2400" dirty="0"/>
+              <a:t>https://</a:t>
+            </a:r>
+            <a:r>
+              <a:rPr lang="en-US" sz="2400" dirty="0" err="1"/>
+              <a:t>en.wikipedia.org</a:t>
+            </a:r>
+            <a:r>
+              <a:rPr lang="en-US" sz="2400" dirty="0"/>
+              <a:t>/wiki/</a:t>
+            </a:r>
+            <a:r>
+              <a:rPr lang="en-US" sz="2400" dirty="0" err="1"/>
+              <a:t>Artificial_neural_network</a:t>
+            </a:r>
+            <a:endParaRPr lang="en-US" sz="2400" dirty="0"/>
+          </a:p>
+          <a:p>
+            <a:endParaRPr lang="en-US" sz="2400" dirty="0"/>
           </a:p>
         </p:txBody>
       </p:sp>
     </p:spTree>
     <p:extLst>
       <p:ext uri="{BB962C8B-B14F-4D97-AF65-F5344CB8AC3E}">
-        <p14:creationId xmlns:p14="http://schemas.microsoft.com/office/powerpoint/2010/main" val="1093250247"/>
+        <p14:creationId xmlns:p14="http://schemas.microsoft.com/office/powerpoint/2010/main" val="532611124"/>
       </p:ext>
     </p:extLst>
   </p:cSld>
@@ -7112,128 +6871,6 @@
             <p:ph type="title"/>
           </p:nvPr>
         </p:nvSpPr>
-        <p:spPr/>
-        <p:txBody>
-          <a:bodyPr/>
-          <a:lstStyle/>
-          <a:p>
-            <a:r>
-              <a:rPr lang="en-US" dirty="0"/>
-              <a:t>REFERENCES</a:t>
-            </a:r>
-          </a:p>
-        </p:txBody>
-      </p:sp>
-      <p:sp>
-        <p:nvSpPr>
-          <p:cNvPr id="3" name="Content Placeholder 2"/>
-          <p:cNvSpPr>
-            <a:spLocks noGrp="1"/>
-          </p:cNvSpPr>
-          <p:nvPr>
-            <p:ph sz="quarter" idx="13"/>
-          </p:nvPr>
-        </p:nvSpPr>
-        <p:spPr/>
-        <p:txBody>
-          <a:bodyPr>
-            <a:normAutofit/>
-          </a:bodyPr>
-          <a:lstStyle/>
-          <a:p>
-            <a:r>
-              <a:rPr lang="en-US" sz="2400" dirty="0"/>
-              <a:t>LECTURES SLIDES BY DR. JIN TIAN FOR COM S 574X SPRING 2018, ISU</a:t>
-            </a:r>
-          </a:p>
-          <a:p>
-            <a:r>
-              <a:rPr lang="en-US" sz="2400" dirty="0"/>
-              <a:t>https://</a:t>
-            </a:r>
-            <a:r>
-              <a:rPr lang="en-US" sz="2400" dirty="0" err="1"/>
-              <a:t>en.wikipedia.org</a:t>
-            </a:r>
-            <a:r>
-              <a:rPr lang="en-US" sz="2400" dirty="0"/>
-              <a:t>/wiki/</a:t>
-            </a:r>
-            <a:r>
-              <a:rPr lang="en-US" sz="2400" dirty="0" err="1"/>
-              <a:t>kmeans</a:t>
-            </a:r>
-            <a:endParaRPr lang="en-US" sz="2400" dirty="0"/>
-          </a:p>
-          <a:p>
-            <a:pPr marL="228600" lvl="1">
-              <a:spcBef>
-                <a:spcPts val="1000"/>
-              </a:spcBef>
-            </a:pPr>
-            <a:r>
-              <a:rPr lang="en-US" sz="2400" dirty="0"/>
-              <a:t>https://</a:t>
-            </a:r>
-            <a:r>
-              <a:rPr lang="en-US" sz="2400" dirty="0" err="1"/>
-              <a:t>en.wikipedia.org</a:t>
-            </a:r>
-            <a:r>
-              <a:rPr lang="en-US" sz="2400" dirty="0"/>
-              <a:t>/wiki/</a:t>
-            </a:r>
-            <a:r>
-              <a:rPr lang="en-US" sz="2400" dirty="0" err="1"/>
-              <a:t>Artificial_neural_network</a:t>
-            </a:r>
-            <a:endParaRPr lang="en-US" sz="2400" dirty="0"/>
-          </a:p>
-          <a:p>
-            <a:endParaRPr lang="en-US" sz="2400" dirty="0"/>
-          </a:p>
-        </p:txBody>
-      </p:sp>
-    </p:spTree>
-    <p:extLst>
-      <p:ext uri="{BB962C8B-B14F-4D97-AF65-F5344CB8AC3E}">
-        <p14:creationId xmlns:p14="http://schemas.microsoft.com/office/powerpoint/2010/main" val="532611124"/>
-      </p:ext>
-    </p:extLst>
-  </p:cSld>
-  <p:clrMapOvr>
-    <a:masterClrMapping/>
-  </p:clrMapOvr>
-</p:sld>
-</file>
-
-<file path=ppt/slides/slide13.xml><?xml version="1.0" encoding="utf-8"?>
-<p:sld xmlns:a="http://schemas.openxmlformats.org/drawingml/2006/main" xmlns:r="http://schemas.openxmlformats.org/officeDocument/2006/relationships" xmlns:p="http://schemas.openxmlformats.org/presentationml/2006/main">
-  <p:cSld>
-    <p:spTree>
-      <p:nvGrpSpPr>
-        <p:cNvPr id="1" name=""/>
-        <p:cNvGrpSpPr/>
-        <p:nvPr/>
-      </p:nvGrpSpPr>
-      <p:grpSpPr>
-        <a:xfrm>
-          <a:off x="0" y="0"/>
-          <a:ext cx="0" cy="0"/>
-          <a:chOff x="0" y="0"/>
-          <a:chExt cx="0" cy="0"/>
-        </a:xfrm>
-      </p:grpSpPr>
-      <p:sp>
-        <p:nvSpPr>
-          <p:cNvPr id="2" name="Title 1"/>
-          <p:cNvSpPr>
-            <a:spLocks noGrp="1"/>
-          </p:cNvSpPr>
-          <p:nvPr>
-            <p:ph type="title"/>
-          </p:nvPr>
-        </p:nvSpPr>
         <p:spPr>
           <a:xfrm>
             <a:off x="913775" y="2542851"/>
@@ -7247,10 +6884,9 @@
           <a:lstStyle/>
           <a:p>
             <a:r>
-              <a:rPr lang="en-US" sz="6000" dirty="0" smtClean="0"/>
+              <a:rPr lang="en-US" sz="6000" dirty="0"/>
               <a:t>THANK you</a:t>
             </a:r>
-            <a:endParaRPr lang="en-US" sz="6000" dirty="0"/>
           </a:p>
         </p:txBody>
       </p:sp>
@@ -7289,7 +6925,7 @@
           <p:cNvPr id="2" name="Title 1">
             <a:extLst>
               <a:ext uri="{FF2B5EF4-FFF2-40B4-BE49-F238E27FC236}">
-                <a16:creationId xmlns:a16="http://schemas.microsoft.com/office/drawing/2014/main" xmlns="" id="{6A0818EE-A21E-4C03-984C-0F4CAC2D5766}"/>
+                <a16:creationId xmlns:a16="http://schemas.microsoft.com/office/drawing/2014/main" id="{6A0818EE-A21E-4C03-984C-0F4CAC2D5766}"/>
               </a:ext>
             </a:extLst>
           </p:cNvPr>
@@ -7307,23 +6943,15 @@
           <a:p>
             <a:r>
               <a:rPr lang="en-US" dirty="0"/>
-              <a:t>Why </a:t>
-            </a:r>
-            <a:r>
-              <a:rPr lang="en-US" dirty="0" smtClean="0"/>
-              <a:t>Categorize </a:t>
-            </a:r>
-            <a:r>
-              <a:rPr lang="en-US" dirty="0" err="1" smtClean="0"/>
+              <a:t>Why Categorize </a:t>
+            </a:r>
+            <a:r>
+              <a:rPr lang="en-US" dirty="0" err="1"/>
               <a:t>Youtube</a:t>
             </a:r>
             <a:r>
-              <a:rPr lang="en-US" dirty="0" smtClean="0"/>
-              <a:t> </a:t>
-            </a:r>
-            <a:r>
               <a:rPr lang="en-US" dirty="0"/>
-              <a:t>Videos?</a:t>
+              <a:t> Videos?</a:t>
             </a:r>
           </a:p>
         </p:txBody>
@@ -7333,7 +6961,7 @@
           <p:cNvPr id="3" name="Content Placeholder 2">
             <a:extLst>
               <a:ext uri="{FF2B5EF4-FFF2-40B4-BE49-F238E27FC236}">
-                <a16:creationId xmlns:a16="http://schemas.microsoft.com/office/drawing/2014/main" xmlns="" id="{282E05AE-DE14-47DB-9F97-5B76DB17D419}"/>
+                <a16:creationId xmlns:a16="http://schemas.microsoft.com/office/drawing/2014/main" id="{282E05AE-DE14-47DB-9F97-5B76DB17D419}"/>
               </a:ext>
             </a:extLst>
           </p:cNvPr>
@@ -7358,7 +6986,7 @@
           <a:p>
             <a:r>
               <a:rPr lang="en-US" sz="2400" dirty="0"/>
-              <a:t>Benefits:</a:t>
+              <a:t>Benefits :</a:t>
             </a:r>
           </a:p>
           <a:p>
@@ -7380,20 +7008,15 @@
           </a:p>
           <a:p>
             <a:r>
-              <a:rPr lang="en-US" sz="2400" dirty="0" smtClean="0"/>
+              <a:rPr lang="en-US" sz="2400" dirty="0"/>
               <a:t>How to categorize :</a:t>
             </a:r>
-            <a:endParaRPr lang="en-US" sz="2400" dirty="0"/>
           </a:p>
           <a:p>
             <a:pPr lvl="1"/>
             <a:r>
-              <a:rPr lang="en-US" sz="2400" dirty="0" smtClean="0"/>
-              <a:t>Can </a:t>
-            </a:r>
-            <a:r>
               <a:rPr lang="en-US" sz="2400" dirty="0"/>
-              <a:t>consider metadata for classification</a:t>
+              <a:t>Can consider metadata for classification</a:t>
             </a:r>
           </a:p>
           <a:p>
@@ -7445,7 +7068,7 @@
           <p:cNvPr id="2" name="Title 1">
             <a:extLst>
               <a:ext uri="{FF2B5EF4-FFF2-40B4-BE49-F238E27FC236}">
-                <a16:creationId xmlns:a16="http://schemas.microsoft.com/office/drawing/2014/main" xmlns="" id="{D796A892-FC62-42DA-8E12-A313AC2267DA}"/>
+                <a16:creationId xmlns:a16="http://schemas.microsoft.com/office/drawing/2014/main" id="{D796A892-FC62-42DA-8E12-A313AC2267DA}"/>
               </a:ext>
             </a:extLst>
           </p:cNvPr>
@@ -7478,7 +7101,7 @@
           <p:cNvPr id="3" name="Content Placeholder 2">
             <a:extLst>
               <a:ext uri="{FF2B5EF4-FFF2-40B4-BE49-F238E27FC236}">
-                <a16:creationId xmlns:a16="http://schemas.microsoft.com/office/drawing/2014/main" xmlns="" id="{0E796DB0-6D05-46B7-B95B-340207189CBA}"/>
+                <a16:creationId xmlns:a16="http://schemas.microsoft.com/office/drawing/2014/main" id="{0E796DB0-6D05-46B7-B95B-340207189CBA}"/>
               </a:ext>
             </a:extLst>
           </p:cNvPr>
@@ -7582,7 +7205,7 @@
           <p:cNvPr id="2" name="Title 1">
             <a:extLst>
               <a:ext uri="{FF2B5EF4-FFF2-40B4-BE49-F238E27FC236}">
-                <a16:creationId xmlns:a16="http://schemas.microsoft.com/office/drawing/2014/main" xmlns="" id="{A6CDE3A3-770E-4285-B201-38CFC045C6AC}"/>
+                <a16:creationId xmlns:a16="http://schemas.microsoft.com/office/drawing/2014/main" id="{D796A892-FC62-42DA-8E12-A313AC2267DA}"/>
               </a:ext>
             </a:extLst>
           </p:cNvPr>
@@ -7595,8 +7218,8 @@
         </p:nvSpPr>
         <p:spPr>
           <a:xfrm>
-            <a:off x="913150" y="954338"/>
-            <a:ext cx="10364451" cy="638783"/>
+            <a:off x="913774" y="1047143"/>
+            <a:ext cx="10364451" cy="648308"/>
           </a:xfrm>
         </p:spPr>
         <p:txBody>
@@ -7605,7 +7228,7 @@
           <a:p>
             <a:r>
               <a:rPr lang="en-US" dirty="0"/>
-              <a:t>PCA</a:t>
+              <a:t>TFIDF</a:t>
             </a:r>
           </a:p>
         </p:txBody>
@@ -7615,7 +7238,7 @@
           <p:cNvPr id="3" name="Content Placeholder 2">
             <a:extLst>
               <a:ext uri="{FF2B5EF4-FFF2-40B4-BE49-F238E27FC236}">
-                <a16:creationId xmlns:a16="http://schemas.microsoft.com/office/drawing/2014/main" xmlns="" id="{6F144887-46C7-4AB4-8EED-8070490FCD59}"/>
+                <a16:creationId xmlns:a16="http://schemas.microsoft.com/office/drawing/2014/main" id="{0E796DB0-6D05-46B7-B95B-340207189CBA}"/>
               </a:ext>
             </a:extLst>
           </p:cNvPr>
@@ -7628,24 +7251,76 @@
         </p:nvSpPr>
         <p:spPr>
           <a:xfrm>
-            <a:off x="913775" y="1593121"/>
-            <a:ext cx="10363826" cy="3424107"/>
+            <a:off x="913774" y="1939074"/>
+            <a:ext cx="10363826" cy="3995195"/>
           </a:xfrm>
         </p:spPr>
         <p:txBody>
-          <a:bodyPr/>
+          <a:bodyPr>
+            <a:noAutofit/>
+          </a:bodyPr>
           <a:lstStyle/>
           <a:p>
-            <a:r>
-              <a:rPr lang="en-US" dirty="0"/>
-              <a:t>Dimensionality Reduction</a:t>
-            </a:r>
-          </a:p>
-          <a:p>
-            <a:r>
-              <a:rPr lang="en-US" dirty="0"/>
-              <a:t>Reduces 50, 000 dimensions to 3000 with only 5% loss of information.</a:t>
-            </a:r>
+            <a:pPr fontAlgn="base"/>
+            <a:r>
+              <a:rPr lang="en-US" sz="2400" dirty="0"/>
+              <a:t>TF - Term frequency</a:t>
+            </a:r>
+          </a:p>
+          <a:p>
+            <a:pPr lvl="1"/>
+            <a:r>
+              <a:rPr lang="en-US" sz="2400" cap="none" dirty="0"/>
+              <a:t>Number Of Times A Word Occurs In A Document</a:t>
+            </a:r>
+          </a:p>
+          <a:p>
+            <a:pPr lvl="1"/>
+            <a:r>
+              <a:rPr lang="en-US" sz="2400" cap="none" dirty="0" err="1"/>
+              <a:t>Tf</a:t>
+            </a:r>
+            <a:r>
+              <a:rPr lang="en-US" sz="2400" cap="none" dirty="0"/>
+              <a:t>(t) = (Number Of Times Term T Appears In A Document) / (Total Number Of Terms In The Document).</a:t>
+            </a:r>
+          </a:p>
+          <a:p>
+            <a:pPr fontAlgn="base"/>
+            <a:r>
+              <a:rPr lang="en-US" sz="2400" dirty="0"/>
+              <a:t>IDF - Inverse Document Frequency</a:t>
+            </a:r>
+          </a:p>
+          <a:p>
+            <a:pPr lvl="1"/>
+            <a:r>
+              <a:rPr lang="en-US" sz="2400" cap="none" dirty="0"/>
+              <a:t>Measure Of How Important The Term Is In A Document</a:t>
+            </a:r>
+          </a:p>
+          <a:p>
+            <a:pPr lvl="1"/>
+            <a:r>
+              <a:rPr lang="en-US" sz="2400" cap="none" dirty="0" err="1"/>
+              <a:t>Idf</a:t>
+            </a:r>
+            <a:r>
+              <a:rPr lang="en-US" sz="2400" cap="none" dirty="0"/>
+              <a:t>(t) = </a:t>
+            </a:r>
+            <a:r>
+              <a:rPr lang="en-US" sz="2400" cap="none" dirty="0" err="1"/>
+              <a:t>Log_e</a:t>
+            </a:r>
+            <a:r>
+              <a:rPr lang="en-US" sz="2400" cap="none" dirty="0"/>
+              <a:t>(Total Number Of Documents / Number Of Documents With Term T)</a:t>
+            </a:r>
+          </a:p>
+          <a:p>
+            <a:pPr fontAlgn="base"/>
+            <a:endParaRPr lang="en-US" sz="2400" dirty="0"/>
           </a:p>
           <a:p>
             <a:endParaRPr lang="en-US" dirty="0"/>
@@ -7655,7 +7330,7 @@
     </p:spTree>
     <p:extLst>
       <p:ext uri="{BB962C8B-B14F-4D97-AF65-F5344CB8AC3E}">
-        <p14:creationId xmlns:p14="http://schemas.microsoft.com/office/powerpoint/2010/main" val="3256422729"/>
+        <p14:creationId xmlns:p14="http://schemas.microsoft.com/office/powerpoint/2010/main" val="3833104114"/>
       </p:ext>
     </p:extLst>
   </p:cSld>
@@ -7687,7 +7362,7 @@
           <p:cNvPr id="2" name="Title 1">
             <a:extLst>
               <a:ext uri="{FF2B5EF4-FFF2-40B4-BE49-F238E27FC236}">
-                <a16:creationId xmlns:a16="http://schemas.microsoft.com/office/drawing/2014/main" xmlns="" id="{274A305D-4D9E-4986-8F10-EDB5B3127A22}"/>
+                <a16:creationId xmlns:a16="http://schemas.microsoft.com/office/drawing/2014/main" id="{A6CDE3A3-770E-4285-B201-38CFC045C6AC}"/>
               </a:ext>
             </a:extLst>
           </p:cNvPr>
@@ -7700,8 +7375,8 @@
         </p:nvSpPr>
         <p:spPr>
           <a:xfrm>
-            <a:off x="913774" y="562534"/>
-            <a:ext cx="10364451" cy="1596177"/>
+            <a:off x="913150" y="954338"/>
+            <a:ext cx="10364451" cy="638783"/>
           </a:xfrm>
         </p:spPr>
         <p:txBody>
@@ -7709,10 +7384,9 @@
           <a:lstStyle/>
           <a:p>
             <a:r>
-              <a:rPr lang="en-US" dirty="0" smtClean="0"/>
-              <a:t>Neural networks</a:t>
-            </a:r>
-            <a:endParaRPr lang="en-US" dirty="0"/>
+              <a:rPr lang="en-US" dirty="0"/>
+              <a:t>PCA</a:t>
+            </a:r>
           </a:p>
         </p:txBody>
       </p:sp>
@@ -7721,7 +7395,7 @@
           <p:cNvPr id="3" name="Content Placeholder 2">
             <a:extLst>
               <a:ext uri="{FF2B5EF4-FFF2-40B4-BE49-F238E27FC236}">
-                <a16:creationId xmlns:a16="http://schemas.microsoft.com/office/drawing/2014/main" xmlns="" id="{07716CFF-3B18-4811-89AB-74BD3754B4E6}"/>
+                <a16:creationId xmlns:a16="http://schemas.microsoft.com/office/drawing/2014/main" id="{6F144887-46C7-4AB4-8EED-8070490FCD59}"/>
               </a:ext>
             </a:extLst>
           </p:cNvPr>
@@ -7732,41 +7406,106 @@
             <p:ph sz="quarter" idx="13"/>
           </p:nvPr>
         </p:nvSpPr>
-        <p:spPr/>
+        <p:spPr>
+          <a:xfrm>
+            <a:off x="913775" y="1593121"/>
+            <a:ext cx="10363826" cy="3424107"/>
+          </a:xfrm>
+        </p:spPr>
         <p:txBody>
           <a:bodyPr/>
           <a:lstStyle/>
           <a:p>
             <a:r>
               <a:rPr lang="en-US" dirty="0"/>
-              <a:t>Feed Forward Full Connected Neural Network</a:t>
-            </a:r>
+              <a:t>Dimensionality Reduction</a:t>
+            </a:r>
+          </a:p>
+          <a:p>
             <a:r>
               <a:rPr lang="en-US" dirty="0"/>
-              <a:t> </a:t>
-            </a:r>
-            <a:endParaRPr lang="en-US" dirty="0" smtClean="0"/>
-          </a:p>
-          <a:p>
-            <a:r>
-              <a:rPr lang="en-US" dirty="0"/>
-              <a:t>“1 of c” </a:t>
-            </a:r>
-            <a:r>
-              <a:rPr lang="en-US" dirty="0" smtClean="0"/>
-              <a:t>output encoding </a:t>
-            </a:r>
+              <a:t>Reduces 50, 000 dimensions to 3000 with only 5% loss of information.</a:t>
+            </a:r>
+          </a:p>
+          <a:p>
             <a:endParaRPr lang="en-US" dirty="0"/>
           </a:p>
-          <a:p>
-            <a:endParaRPr lang="en-US" dirty="0"/>
-          </a:p>
-        </p:txBody>
-      </p:sp>
+        </p:txBody>
+      </p:sp>
+      <p:pic>
+        <p:nvPicPr>
+          <p:cNvPr id="7" name="Picture 6" descr="A screenshot of a cell phone&#10;&#10;Description generated with very high confidence">
+            <a:extLst>
+              <a:ext uri="{FF2B5EF4-FFF2-40B4-BE49-F238E27FC236}">
+                <a16:creationId xmlns:a16="http://schemas.microsoft.com/office/drawing/2014/main" id="{6960B240-46F8-4028-8692-0FA50180EBC2}"/>
+              </a:ext>
+            </a:extLst>
+          </p:cNvPr>
+          <p:cNvPicPr>
+            <a:picLocks noChangeAspect="1"/>
+          </p:cNvPicPr>
+          <p:nvPr/>
+        </p:nvPicPr>
+        <p:blipFill rotWithShape="1">
+          <a:blip r:embed="rId2">
+            <a:extLst>
+              <a:ext uri="{28A0092B-C50C-407E-A947-70E740481C1C}">
+                <a14:useLocalDpi xmlns:a14="http://schemas.microsoft.com/office/drawing/2010/main" val="0"/>
+              </a:ext>
+            </a:extLst>
+          </a:blip>
+          <a:srcRect l="-407" t="4397" r="407" b="319"/>
+          <a:stretch/>
+        </p:blipFill>
+        <p:spPr>
+          <a:xfrm>
+            <a:off x="527538" y="2831123"/>
+            <a:ext cx="5568462" cy="3970912"/>
+          </a:xfrm>
+          <a:prstGeom prst="rect">
+            <a:avLst/>
+          </a:prstGeom>
+        </p:spPr>
+      </p:pic>
+      <p:pic>
+        <p:nvPicPr>
+          <p:cNvPr id="9" name="Picture 8" descr="A screenshot of a cell phone&#10;&#10;Description generated with high confidence">
+            <a:extLst>
+              <a:ext uri="{FF2B5EF4-FFF2-40B4-BE49-F238E27FC236}">
+                <a16:creationId xmlns:a16="http://schemas.microsoft.com/office/drawing/2014/main" id="{8871C8AC-8557-493F-A842-200F6F4CF31B}"/>
+              </a:ext>
+            </a:extLst>
+          </p:cNvPr>
+          <p:cNvPicPr>
+            <a:picLocks noChangeAspect="1"/>
+          </p:cNvPicPr>
+          <p:nvPr/>
+        </p:nvPicPr>
+        <p:blipFill rotWithShape="1">
+          <a:blip r:embed="rId3">
+            <a:extLst>
+              <a:ext uri="{28A0092B-C50C-407E-A947-70E740481C1C}">
+                <a14:useLocalDpi xmlns:a14="http://schemas.microsoft.com/office/drawing/2010/main" val="0"/>
+              </a:ext>
+            </a:extLst>
+          </a:blip>
+          <a:srcRect t="2657"/>
+          <a:stretch/>
+        </p:blipFill>
+        <p:spPr>
+          <a:xfrm>
+            <a:off x="6096000" y="2831123"/>
+            <a:ext cx="5843954" cy="3970912"/>
+          </a:xfrm>
+          <a:prstGeom prst="rect">
+            <a:avLst/>
+          </a:prstGeom>
+        </p:spPr>
+      </p:pic>
     </p:spTree>
     <p:extLst>
       <p:ext uri="{BB962C8B-B14F-4D97-AF65-F5344CB8AC3E}">
-        <p14:creationId xmlns:p14="http://schemas.microsoft.com/office/powerpoint/2010/main" val="3755679565"/>
+        <p14:creationId xmlns:p14="http://schemas.microsoft.com/office/powerpoint/2010/main" val="2101206938"/>
       </p:ext>
     </p:extLst>
   </p:cSld>
@@ -7795,7 +7534,13 @@
       </p:grpSpPr>
       <p:sp>
         <p:nvSpPr>
-          <p:cNvPr id="2" name="Title 1"/>
+          <p:cNvPr id="2" name="Title 1">
+            <a:extLst>
+              <a:ext uri="{FF2B5EF4-FFF2-40B4-BE49-F238E27FC236}">
+                <a16:creationId xmlns:a16="http://schemas.microsoft.com/office/drawing/2014/main" id="{274A305D-4D9E-4986-8F10-EDB5B3127A22}"/>
+              </a:ext>
+            </a:extLst>
+          </p:cNvPr>
           <p:cNvSpPr>
             <a:spLocks noGrp="1"/>
           </p:cNvSpPr>
@@ -7803,22 +7548,32 @@
             <p:ph type="title"/>
           </p:nvPr>
         </p:nvSpPr>
-        <p:spPr/>
+        <p:spPr>
+          <a:xfrm>
+            <a:off x="913774" y="562534"/>
+            <a:ext cx="10364451" cy="762413"/>
+          </a:xfrm>
+        </p:spPr>
         <p:txBody>
           <a:bodyPr/>
           <a:lstStyle/>
           <a:p>
             <a:r>
-              <a:rPr lang="en-US" dirty="0" smtClean="0"/>
-              <a:t>Experiments</a:t>
-            </a:r>
-            <a:endParaRPr lang="en-US" dirty="0"/>
-          </a:p>
-        </p:txBody>
-      </p:sp>
-      <p:sp>
-        <p:nvSpPr>
-          <p:cNvPr id="3" name="Content Placeholder 2"/>
+              <a:rPr lang="en-US" dirty="0"/>
+              <a:t>Neural networks</a:t>
+            </a:r>
+          </a:p>
+        </p:txBody>
+      </p:sp>
+      <p:sp>
+        <p:nvSpPr>
+          <p:cNvPr id="3" name="Content Placeholder 2">
+            <a:extLst>
+              <a:ext uri="{FF2B5EF4-FFF2-40B4-BE49-F238E27FC236}">
+                <a16:creationId xmlns:a16="http://schemas.microsoft.com/office/drawing/2014/main" id="{07716CFF-3B18-4811-89AB-74BD3754B4E6}"/>
+              </a:ext>
+            </a:extLst>
+          </p:cNvPr>
           <p:cNvSpPr>
             <a:spLocks noGrp="1"/>
           </p:cNvSpPr>
@@ -7826,46 +7581,438 @@
             <p:ph sz="quarter" idx="13"/>
           </p:nvPr>
         </p:nvSpPr>
-        <p:spPr/>
+        <p:spPr>
+          <a:xfrm>
+            <a:off x="913774" y="2375296"/>
+            <a:ext cx="3340985" cy="3918858"/>
+          </a:xfrm>
+        </p:spPr>
         <p:txBody>
           <a:bodyPr>
             <a:normAutofit/>
           </a:bodyPr>
           <a:lstStyle/>
           <a:p>
-            <a:pPr lvl="0"/>
-            <a:r>
-              <a:rPr lang="en-US" dirty="0" smtClean="0"/>
-              <a:t>Error Functions</a:t>
-            </a:r>
+            <a:pPr marL="0" indent="0">
+              <a:buNone/>
+            </a:pPr>
+            <a:r>
+              <a:rPr lang="en-US" dirty="0"/>
+              <a:t>Class  0 :  0.5435</a:t>
+            </a:r>
+          </a:p>
+          <a:p>
+            <a:pPr marL="0" indent="0">
+              <a:buNone/>
+            </a:pPr>
+            <a:r>
+              <a:rPr lang="en-US" dirty="0"/>
+              <a:t>Class  1 :  0.1333</a:t>
+            </a:r>
+          </a:p>
+          <a:p>
+            <a:pPr marL="0" indent="0">
+              <a:buNone/>
+            </a:pPr>
+            <a:r>
+              <a:rPr lang="en-US" dirty="0"/>
+              <a:t>Class  2 :  0.7963</a:t>
+            </a:r>
+          </a:p>
+          <a:p>
+            <a:pPr marL="0" indent="0">
+              <a:buNone/>
+            </a:pPr>
+            <a:r>
+              <a:rPr lang="en-US" dirty="0"/>
+              <a:t>Class  3 :  0.68</a:t>
+            </a:r>
+          </a:p>
+          <a:p>
+            <a:pPr marL="0" indent="0">
+              <a:buNone/>
+            </a:pPr>
+            <a:r>
+              <a:rPr lang="en-US" dirty="0"/>
+              <a:t>Class  4 :  0.9074</a:t>
+            </a:r>
+          </a:p>
+          <a:p>
+            <a:pPr marL="0" indent="0">
+              <a:buNone/>
+            </a:pPr>
+            <a:r>
+              <a:rPr lang="en-US" dirty="0"/>
+              <a:t>Class  5 :  0.5556</a:t>
+            </a:r>
+          </a:p>
+          <a:p>
+            <a:pPr marL="0" indent="0">
+              <a:buNone/>
+            </a:pPr>
+            <a:r>
+              <a:rPr lang="en-US" dirty="0"/>
+              <a:t>Class  6 :  0.4286</a:t>
+            </a:r>
+          </a:p>
+          <a:p>
             <a:endParaRPr lang="en-US" dirty="0"/>
           </a:p>
           <a:p>
-            <a:pPr lvl="0"/>
-            <a:r>
-              <a:rPr lang="en-US" dirty="0" smtClean="0"/>
-              <a:t>Hidden units</a:t>
-            </a:r>
-          </a:p>
-          <a:p>
-            <a:pPr lvl="0"/>
-            <a:r>
-              <a:rPr lang="en-US" dirty="0" smtClean="0"/>
-              <a:t>Learning rates</a:t>
-            </a:r>
-          </a:p>
-          <a:p>
-            <a:pPr lvl="0"/>
-            <a:r>
-              <a:rPr lang="en-US" dirty="0" smtClean="0"/>
-              <a:t>Momentum rates</a:t>
-            </a:r>
-          </a:p>
-          <a:p>
-            <a:pPr lvl="0"/>
-            <a:r>
-              <a:rPr lang="en-US" dirty="0" smtClean="0"/>
-              <a:t>Different set of features</a:t>
+            <a:endParaRPr lang="en-US" dirty="0"/>
+          </a:p>
+        </p:txBody>
+      </p:sp>
+      <p:sp>
+        <p:nvSpPr>
+          <p:cNvPr id="5" name="TextBox 4">
+            <a:extLst>
+              <a:ext uri="{FF2B5EF4-FFF2-40B4-BE49-F238E27FC236}">
+                <a16:creationId xmlns:a16="http://schemas.microsoft.com/office/drawing/2014/main" id="{B2310781-EA65-4955-97CC-1323DFC6F870}"/>
+              </a:ext>
+            </a:extLst>
+          </p:cNvPr>
+          <p:cNvSpPr txBox="1"/>
+          <p:nvPr/>
+        </p:nvSpPr>
+        <p:spPr>
+          <a:xfrm>
+            <a:off x="3200774" y="2375965"/>
+            <a:ext cx="2303836" cy="3918189"/>
+          </a:xfrm>
+          <a:prstGeom prst="rect">
+            <a:avLst/>
+          </a:prstGeom>
+          <a:noFill/>
+        </p:spPr>
+        <p:txBody>
+          <a:bodyPr wrap="none" rtlCol="0">
+            <a:spAutoFit/>
+          </a:bodyPr>
+          <a:lstStyle/>
+          <a:p>
+            <a:pPr defTabSz="914400">
+              <a:lnSpc>
+                <a:spcPct val="120000"/>
+              </a:lnSpc>
+              <a:spcBef>
+                <a:spcPts val="1000"/>
+              </a:spcBef>
+              <a:buClr>
+                <a:schemeClr val="tx1"/>
+              </a:buClr>
+            </a:pPr>
+            <a:r>
+              <a:rPr lang="en-US" sz="2000" cap="all" dirty="0"/>
+              <a:t>Class  7   :  0.4487</a:t>
+            </a:r>
+          </a:p>
+          <a:p>
+            <a:pPr defTabSz="914400">
+              <a:lnSpc>
+                <a:spcPct val="120000"/>
+              </a:lnSpc>
+              <a:spcBef>
+                <a:spcPts val="1000"/>
+              </a:spcBef>
+              <a:buClr>
+                <a:schemeClr val="tx1"/>
+              </a:buClr>
+            </a:pPr>
+            <a:r>
+              <a:rPr lang="en-US" sz="2000" cap="all" dirty="0"/>
+              <a:t>Class  8   :  0.726</a:t>
+            </a:r>
+          </a:p>
+          <a:p>
+            <a:pPr defTabSz="914400">
+              <a:lnSpc>
+                <a:spcPct val="120000"/>
+              </a:lnSpc>
+              <a:spcBef>
+                <a:spcPts val="1000"/>
+              </a:spcBef>
+              <a:buClr>
+                <a:schemeClr val="tx1"/>
+              </a:buClr>
+            </a:pPr>
+            <a:r>
+              <a:rPr lang="en-US" sz="2000" cap="all" dirty="0"/>
+              <a:t>Class  9   :  0.8</a:t>
+            </a:r>
+          </a:p>
+          <a:p>
+            <a:pPr defTabSz="914400">
+              <a:lnSpc>
+                <a:spcPct val="120000"/>
+              </a:lnSpc>
+              <a:spcBef>
+                <a:spcPts val="1000"/>
+              </a:spcBef>
+              <a:buClr>
+                <a:schemeClr val="tx1"/>
+              </a:buClr>
+            </a:pPr>
+            <a:r>
+              <a:rPr lang="en-US" sz="2000" cap="all" dirty="0"/>
+              <a:t>Class  10 :  0.8817</a:t>
+            </a:r>
+          </a:p>
+          <a:p>
+            <a:pPr defTabSz="914400">
+              <a:lnSpc>
+                <a:spcPct val="120000"/>
+              </a:lnSpc>
+              <a:spcBef>
+                <a:spcPts val="1000"/>
+              </a:spcBef>
+              <a:buClr>
+                <a:schemeClr val="tx1"/>
+              </a:buClr>
+            </a:pPr>
+            <a:r>
+              <a:rPr lang="en-US" sz="2000" cap="all" dirty="0"/>
+              <a:t>Class  11 :  0.875</a:t>
+            </a:r>
+          </a:p>
+          <a:p>
+            <a:pPr defTabSz="914400">
+              <a:lnSpc>
+                <a:spcPct val="120000"/>
+              </a:lnSpc>
+              <a:spcBef>
+                <a:spcPts val="1000"/>
+              </a:spcBef>
+              <a:buClr>
+                <a:schemeClr val="tx1"/>
+              </a:buClr>
+            </a:pPr>
+            <a:r>
+              <a:rPr lang="en-US" sz="2000" cap="all" dirty="0"/>
+              <a:t>Class  12 :  0.8333</a:t>
+            </a:r>
+          </a:p>
+          <a:p>
+            <a:pPr defTabSz="914400">
+              <a:lnSpc>
+                <a:spcPct val="120000"/>
+              </a:lnSpc>
+              <a:spcBef>
+                <a:spcPts val="1000"/>
+              </a:spcBef>
+              <a:buClr>
+                <a:schemeClr val="tx1"/>
+              </a:buClr>
+            </a:pPr>
+            <a:r>
+              <a:rPr lang="en-US" sz="2000" cap="all" dirty="0"/>
+              <a:t>Class  13 :  0.6607</a:t>
+            </a:r>
+          </a:p>
+          <a:p>
+            <a:pPr defTabSz="914400">
+              <a:lnSpc>
+                <a:spcPct val="120000"/>
+              </a:lnSpc>
+              <a:spcBef>
+                <a:spcPts val="1000"/>
+              </a:spcBef>
+              <a:buClr>
+                <a:schemeClr val="tx1"/>
+              </a:buClr>
+            </a:pPr>
+            <a:r>
+              <a:rPr lang="en-US" sz="2000" cap="all" dirty="0"/>
+              <a:t>Class  14 :  0.0</a:t>
+            </a:r>
+          </a:p>
+        </p:txBody>
+      </p:sp>
+      <p:sp>
+        <p:nvSpPr>
+          <p:cNvPr id="6" name="TextBox 5">
+            <a:extLst>
+              <a:ext uri="{FF2B5EF4-FFF2-40B4-BE49-F238E27FC236}">
+                <a16:creationId xmlns:a16="http://schemas.microsoft.com/office/drawing/2014/main" id="{A59CBC6E-E91C-4187-8CB7-8BF597D9C40A}"/>
+              </a:ext>
+            </a:extLst>
+          </p:cNvPr>
+          <p:cNvSpPr txBox="1"/>
+          <p:nvPr/>
+        </p:nvSpPr>
+        <p:spPr>
+          <a:xfrm>
+            <a:off x="1357256" y="1682464"/>
+            <a:ext cx="4552657" cy="461665"/>
+          </a:xfrm>
+          <a:prstGeom prst="rect">
+            <a:avLst/>
+          </a:prstGeom>
+          <a:noFill/>
+        </p:spPr>
+        <p:txBody>
+          <a:bodyPr wrap="none" rtlCol="0">
+            <a:spAutoFit/>
+          </a:bodyPr>
+          <a:lstStyle/>
+          <a:p>
+            <a:r>
+              <a:rPr lang="en-US" sz="2400" b="1" dirty="0"/>
+              <a:t>CLASS CONDITIONAL ACCURACY</a:t>
+            </a:r>
+          </a:p>
+        </p:txBody>
+      </p:sp>
+      <p:sp>
+        <p:nvSpPr>
+          <p:cNvPr id="7" name="TextBox 6">
+            <a:extLst>
+              <a:ext uri="{FF2B5EF4-FFF2-40B4-BE49-F238E27FC236}">
+                <a16:creationId xmlns:a16="http://schemas.microsoft.com/office/drawing/2014/main" id="{9834C2FD-A9BE-4783-A860-EB4296C1389F}"/>
+              </a:ext>
+            </a:extLst>
+          </p:cNvPr>
+          <p:cNvSpPr txBox="1"/>
+          <p:nvPr/>
+        </p:nvSpPr>
+        <p:spPr>
+          <a:xfrm>
+            <a:off x="7631538" y="1608298"/>
+            <a:ext cx="2932982" cy="461665"/>
+          </a:xfrm>
+          <a:prstGeom prst="rect">
+            <a:avLst/>
+          </a:prstGeom>
+          <a:noFill/>
+        </p:spPr>
+        <p:txBody>
+          <a:bodyPr wrap="none" rtlCol="0">
+            <a:spAutoFit/>
+          </a:bodyPr>
+          <a:lstStyle/>
+          <a:p>
+            <a:r>
+              <a:rPr lang="en-US" sz="2400" b="1" dirty="0"/>
+              <a:t>CONFUSION MATRIX</a:t>
+            </a:r>
+          </a:p>
+        </p:txBody>
+      </p:sp>
+      <p:sp>
+        <p:nvSpPr>
+          <p:cNvPr id="8" name="TextBox 7">
+            <a:extLst>
+              <a:ext uri="{FF2B5EF4-FFF2-40B4-BE49-F238E27FC236}">
+                <a16:creationId xmlns:a16="http://schemas.microsoft.com/office/drawing/2014/main" id="{EFED626D-0156-4D6F-899B-720F4B29D178}"/>
+              </a:ext>
+            </a:extLst>
+          </p:cNvPr>
+          <p:cNvSpPr txBox="1"/>
+          <p:nvPr/>
+        </p:nvSpPr>
+        <p:spPr>
+          <a:xfrm>
+            <a:off x="5681517" y="2069963"/>
+            <a:ext cx="5798382" cy="4247317"/>
+          </a:xfrm>
+          <a:prstGeom prst="rect">
+            <a:avLst/>
+          </a:prstGeom>
+          <a:noFill/>
+        </p:spPr>
+        <p:txBody>
+          <a:bodyPr wrap="none" rtlCol="0">
+            <a:spAutoFit/>
+          </a:bodyPr>
+          <a:lstStyle/>
+          <a:p>
+            <a:r>
+              <a:rPr lang="en-US" dirty="0"/>
+              <a:t> [ 25   0    2    0    0   0   0    1    0  14    1    2    0    1   0]</a:t>
+            </a:r>
+          </a:p>
+          <a:p>
+            <a:r>
+              <a:rPr lang="en-US" dirty="0"/>
+              <a:t> [   0   2    2    1    0   0   1    2    0    5    0    0    0    2   0]</a:t>
+            </a:r>
+          </a:p>
+          <a:p>
+            <a:r>
+              <a:rPr lang="en-US" dirty="0"/>
+              <a:t> [   2   0  86    0    1   0   0    1    0  16    0    0    0    2   0]</a:t>
+            </a:r>
+          </a:p>
+          <a:p>
+            <a:r>
+              <a:rPr lang="en-US" dirty="0"/>
+              <a:t> [   1   0    1  17    0   0   0    0    0    3    3    0    0    0   0]</a:t>
+            </a:r>
+          </a:p>
+          <a:p>
+            <a:r>
+              <a:rPr lang="en-US" dirty="0"/>
+              <a:t> [   0   0    0    1  49   0   0    0    0    0    4    0    0    0   0]</a:t>
+            </a:r>
+          </a:p>
+          <a:p>
+            <a:r>
+              <a:rPr lang="en-US" dirty="0"/>
+              <a:t> [   0   0    0    0    0   5   0    2    0    2    0    0    0    0   0]</a:t>
+            </a:r>
+          </a:p>
+          <a:p>
+            <a:r>
+              <a:rPr lang="en-US" dirty="0"/>
+              <a:t> [   0   0    0    0    1   0   6    3    0    3    0    0    0    1   0]</a:t>
+            </a:r>
+          </a:p>
+          <a:p>
+            <a:r>
+              <a:rPr lang="en-US" dirty="0"/>
+              <a:t> [   1   0    6    1    2   1   0  35    0  15    4  10    0    3   0]</a:t>
+            </a:r>
+          </a:p>
+          <a:p>
+            <a:r>
+              <a:rPr lang="en-US" dirty="0"/>
+              <a:t> [   3   0    1    0    0   0   0    0  53  14    1    0    1    0   0]</a:t>
+            </a:r>
+          </a:p>
+          <a:p>
+            <a:r>
+              <a:rPr lang="en-US" dirty="0"/>
+              <a:t> [ 10   1    8    0    3   0   0    9    2 172   1    4    2    3   0]</a:t>
+            </a:r>
+          </a:p>
+          <a:p>
+            <a:r>
+              <a:rPr lang="en-US" dirty="0"/>
+              <a:t> [   0   1    0    0    0   0   0    5    0    4  82    1    0    0   0]</a:t>
+            </a:r>
+          </a:p>
+          <a:p>
+            <a:r>
+              <a:rPr lang="en-US" dirty="0"/>
+              <a:t> [   0   0    0    0    0   0   0    0    0    8    0  70    1    1   0]</a:t>
+            </a:r>
+          </a:p>
+          <a:p>
+            <a:r>
+              <a:rPr lang="en-US" dirty="0"/>
+              <a:t> [   0   0    0    0    0   0   0    0    0    2    1    1  30    2   0]</a:t>
+            </a:r>
+          </a:p>
+          <a:p>
+            <a:r>
+              <a:rPr lang="en-US" dirty="0"/>
+              <a:t> [   1   2    0    0    0   0   0    2    0    4    4    0    6  37   0]</a:t>
+            </a:r>
+          </a:p>
+          <a:p>
+            <a:r>
+              <a:rPr lang="en-US" dirty="0"/>
+              <a:t> [   0   0    1    0    0   0   0    1    0    2    2    1    0    0   0]</a:t>
             </a:r>
           </a:p>
         </p:txBody>
@@ -7873,7 +8020,7 @@
     </p:spTree>
     <p:extLst>
       <p:ext uri="{BB962C8B-B14F-4D97-AF65-F5344CB8AC3E}">
-        <p14:creationId xmlns:p14="http://schemas.microsoft.com/office/powerpoint/2010/main" val="312518110"/>
+        <p14:creationId xmlns:p14="http://schemas.microsoft.com/office/powerpoint/2010/main" val="3755679565"/>
       </p:ext>
     </p:extLst>
   </p:cSld>
@@ -7905,7 +8052,7 @@
           <p:cNvPr id="2" name="Title 1">
             <a:extLst>
               <a:ext uri="{FF2B5EF4-FFF2-40B4-BE49-F238E27FC236}">
-                <a16:creationId xmlns:a16="http://schemas.microsoft.com/office/drawing/2014/main" xmlns="" id="{60B89E68-CDB7-4337-90F0-AC28E247D32A}"/>
+                <a16:creationId xmlns:a16="http://schemas.microsoft.com/office/drawing/2014/main" id="{60B89E68-CDB7-4337-90F0-AC28E247D32A}"/>
               </a:ext>
             </a:extLst>
           </p:cNvPr>
@@ -7918,8 +8065,8 @@
         </p:nvSpPr>
         <p:spPr>
           <a:xfrm>
-            <a:off x="750002" y="673108"/>
-            <a:ext cx="10364451" cy="622454"/>
+            <a:off x="4306299" y="710431"/>
+            <a:ext cx="3579402" cy="622454"/>
           </a:xfrm>
         </p:spPr>
         <p:txBody>
@@ -7929,10 +8076,9 @@
           <a:lstStyle/>
           <a:p>
             <a:r>
-              <a:rPr lang="en-US" sz="3200" dirty="0" smtClean="0"/>
-              <a:t>Performance</a:t>
-            </a:r>
-            <a:endParaRPr lang="en-US" sz="3200" dirty="0"/>
+              <a:rPr lang="en-US" sz="3200" dirty="0"/>
+              <a:t>Neural networks</a:t>
+            </a:r>
           </a:p>
         </p:txBody>
       </p:sp>
@@ -7946,26 +8092,38 @@
             <p:ph sz="quarter" idx="13"/>
             <p:extLst>
               <p:ext uri="{D42A27DB-BD31-4B8C-83A1-F6EECF244321}">
-                <p14:modId xmlns:p14="http://schemas.microsoft.com/office/powerpoint/2010/main" val="972242107"/>
+                <p14:modId xmlns:p14="http://schemas.microsoft.com/office/powerpoint/2010/main" val="1781686355"/>
               </p:ext>
             </p:extLst>
           </p:nvPr>
         </p:nvGraphicFramePr>
         <p:xfrm>
-          <a:off x="1106225" y="1592238"/>
-          <a:ext cx="10112234" cy="4726676"/>
+          <a:off x="1106225" y="1592239"/>
+          <a:ext cx="10008228" cy="4864550"/>
         </p:xfrm>
         <a:graphic>
           <a:graphicData uri="http://schemas.openxmlformats.org/drawingml/2006/table">
             <a:tbl>
               <a:tblPr firstRow="1" firstCol="1" bandRow="1">
-                <a:tableStyleId>{5C22544A-7EE6-4342-B048-85BDC9FD1C3A}</a:tableStyleId>
+                <a:tableStyleId>{9D7B26C5-4107-4FEC-AEDC-1716B250A1EF}</a:tableStyleId>
               </a:tblPr>
               <a:tblGrid>
-                <a:gridCol w="5056117"/>
-                <a:gridCol w="5056117"/>
+                <a:gridCol w="5004114">
+                  <a:extLst>
+                    <a:ext uri="{9D8B030D-6E8A-4147-A177-3AD203B41FA5}">
+                      <a16:colId xmlns:a16="http://schemas.microsoft.com/office/drawing/2014/main" val="20000"/>
+                    </a:ext>
+                  </a:extLst>
+                </a:gridCol>
+                <a:gridCol w="5004114">
+                  <a:extLst>
+                    <a:ext uri="{9D8B030D-6E8A-4147-A177-3AD203B41FA5}">
+                      <a16:colId xmlns:a16="http://schemas.microsoft.com/office/drawing/2014/main" val="20001"/>
+                    </a:ext>
+                  </a:extLst>
+                </a:gridCol>
               </a:tblGrid>
-              <a:tr h="667535">
+              <a:tr h="484392">
                 <a:tc gridSpan="2">
                   <a:txBody>
                     <a:bodyPr/>
@@ -7989,7 +8147,7 @@
                         <a:rPr lang="en-US" sz="2400" dirty="0">
                           <a:effectLst/>
                         </a:rPr>
-                        <a:t>Feed Forward Fully Connected Neural Networks</a:t>
+                        <a:t>Best Hyper Parameter Values</a:t>
                       </a:r>
                       <a:endParaRPr lang="en-US" sz="2400" b="1" dirty="0">
                         <a:effectLst/>
@@ -8011,14 +8169,19 @@
                   </a:txBody>
                   <a:tcPr/>
                 </a:tc>
+                <a:extLst>
+                  <a:ext uri="{0D108BD9-81ED-4DB2-BD59-A6C34878D82A}">
+                    <a16:rowId xmlns:a16="http://schemas.microsoft.com/office/drawing/2014/main" val="10000"/>
+                  </a:ext>
+                </a:extLst>
               </a:tr>
-              <a:tr h="494272">
+              <a:tr h="358666">
                 <a:tc>
                   <a:txBody>
                     <a:bodyPr/>
                     <a:lstStyle/>
                     <a:p>
-                      <a:pPr marL="0" marR="0" algn="just">
+                      <a:pPr marL="0" marR="0" algn="ctr">
                         <a:lnSpc>
                           <a:spcPct val="115000"/>
                         </a:lnSpc>
@@ -8053,7 +8216,7 @@
                     <a:bodyPr/>
                     <a:lstStyle/>
                     <a:p>
-                      <a:pPr marL="0" marR="0" algn="just">
+                      <a:pPr marL="0" marR="0" algn="ctr">
                         <a:lnSpc>
                           <a:spcPct val="115000"/>
                         </a:lnSpc>
@@ -8068,12 +8231,12 @@
                         </a:tabLst>
                       </a:pPr>
                       <a:r>
-                        <a:rPr lang="en-US" sz="1800">
+                        <a:rPr lang="en-US" sz="1800" dirty="0" err="1">
                           <a:effectLst/>
                         </a:rPr>
-                        <a:t>Cross Entropy</a:t>
+                        <a:t>categorical_crossentropy</a:t>
                       </a:r>
-                      <a:endParaRPr lang="en-US" sz="1800" b="1">
+                      <a:endParaRPr lang="en-US" sz="1800" b="1" dirty="0">
                         <a:effectLst/>
                         <a:latin typeface="Times" charset="0"/>
                         <a:ea typeface="Times New Roman" charset="0"/>
@@ -8083,14 +8246,19 @@
                   </a:txBody>
                   <a:tcPr marL="68580" marR="68580" marT="0" marB="0"/>
                 </a:tc>
+                <a:extLst>
+                  <a:ext uri="{0D108BD9-81ED-4DB2-BD59-A6C34878D82A}">
+                    <a16:rowId xmlns:a16="http://schemas.microsoft.com/office/drawing/2014/main" val="10001"/>
+                  </a:ext>
+                </a:extLst>
               </a:tr>
-              <a:tr h="494272">
+              <a:tr h="358666">
                 <a:tc>
                   <a:txBody>
                     <a:bodyPr/>
                     <a:lstStyle/>
                     <a:p>
-                      <a:pPr marL="0" marR="0" algn="just">
+                      <a:pPr marL="0" marR="0" algn="ctr">
                         <a:lnSpc>
                           <a:spcPct val="115000"/>
                         </a:lnSpc>
@@ -8125,44 +8293,7 @@
                     <a:bodyPr/>
                     <a:lstStyle/>
                     <a:p>
-                      <a:pPr marL="0" marR="0" algn="just">
-                        <a:lnSpc>
-                          <a:spcPct val="115000"/>
-                        </a:lnSpc>
-                        <a:spcBef>
-                          <a:spcPts val="0"/>
-                        </a:spcBef>
-                        <a:spcAft>
-                          <a:spcPts val="0"/>
-                        </a:spcAft>
-                        <a:tabLst>
-                          <a:tab pos="127000" algn="l"/>
-                        </a:tabLst>
-                      </a:pPr>
-                      <a:r>
-                        <a:rPr lang="en-US" sz="1800">
-                          <a:effectLst/>
-                        </a:rPr>
-                        <a:t>ReLU</a:t>
-                      </a:r>
-                      <a:endParaRPr lang="en-US" sz="1800" b="1">
-                        <a:effectLst/>
-                        <a:latin typeface="Times" charset="0"/>
-                        <a:ea typeface="Times New Roman" charset="0"/>
-                        <a:cs typeface="Times New Roman" charset="0"/>
-                      </a:endParaRPr>
-                    </a:p>
-                  </a:txBody>
-                  <a:tcPr marL="68580" marR="68580" marT="0" marB="0"/>
-                </a:tc>
-              </a:tr>
-              <a:tr h="497350">
-                <a:tc>
-                  <a:txBody>
-                    <a:bodyPr/>
-                    <a:lstStyle/>
-                    <a:p>
-                      <a:pPr marL="0" marR="0" algn="just">
+                      <a:pPr marL="0" marR="0" algn="ctr">
                         <a:lnSpc>
                           <a:spcPct val="115000"/>
                         </a:lnSpc>
@@ -8180,7 +8311,49 @@
                         <a:rPr lang="en-US" sz="1800" dirty="0">
                           <a:effectLst/>
                         </a:rPr>
-                        <a:t>Number of Hidden Units</a:t>
+                        <a:t>linear</a:t>
+                      </a:r>
+                      <a:endParaRPr lang="en-US" sz="1800" b="1" dirty="0">
+                        <a:effectLst/>
+                        <a:latin typeface="Times" charset="0"/>
+                        <a:ea typeface="Times New Roman" charset="0"/>
+                        <a:cs typeface="Times New Roman" charset="0"/>
+                      </a:endParaRPr>
+                    </a:p>
+                  </a:txBody>
+                  <a:tcPr marL="68580" marR="68580" marT="0" marB="0"/>
+                </a:tc>
+                <a:extLst>
+                  <a:ext uri="{0D108BD9-81ED-4DB2-BD59-A6C34878D82A}">
+                    <a16:rowId xmlns:a16="http://schemas.microsoft.com/office/drawing/2014/main" val="10002"/>
+                  </a:ext>
+                </a:extLst>
+              </a:tr>
+              <a:tr h="360899">
+                <a:tc>
+                  <a:txBody>
+                    <a:bodyPr/>
+                    <a:lstStyle/>
+                    <a:p>
+                      <a:pPr marL="0" marR="0" algn="ctr">
+                        <a:lnSpc>
+                          <a:spcPct val="115000"/>
+                        </a:lnSpc>
+                        <a:spcBef>
+                          <a:spcPts val="0"/>
+                        </a:spcBef>
+                        <a:spcAft>
+                          <a:spcPts val="0"/>
+                        </a:spcAft>
+                        <a:tabLst>
+                          <a:tab pos="127000" algn="l"/>
+                        </a:tabLst>
+                      </a:pPr>
+                      <a:r>
+                        <a:rPr lang="en-US" sz="1800" dirty="0">
+                          <a:effectLst/>
+                        </a:rPr>
+                        <a:t>Number of Hidden Layers</a:t>
                       </a:r>
                       <a:endParaRPr lang="en-US" sz="1800" b="1" dirty="0">
                         <a:effectLst/>
@@ -8197,7 +8370,7 @@
                     <a:bodyPr/>
                     <a:lstStyle/>
                     <a:p>
-                      <a:pPr marL="0" marR="0" algn="just">
+                      <a:pPr marL="0" marR="0" algn="ctr">
                         <a:lnSpc>
                           <a:spcPct val="115000"/>
                         </a:lnSpc>
@@ -8227,230 +8400,19 @@
                   </a:txBody>
                   <a:tcPr marL="68580" marR="68580" marT="0" marB="0"/>
                 </a:tc>
+                <a:extLst>
+                  <a:ext uri="{0D108BD9-81ED-4DB2-BD59-A6C34878D82A}">
+                    <a16:rowId xmlns:a16="http://schemas.microsoft.com/office/drawing/2014/main" val="10003"/>
+                  </a:ext>
+                </a:extLst>
               </a:tr>
-              <a:tr h="541069">
+              <a:tr h="392624">
                 <a:tc>
                   <a:txBody>
                     <a:bodyPr/>
                     <a:lstStyle/>
                     <a:p>
-                      <a:pPr marL="0" marR="0" algn="just">
-                        <a:lnSpc>
-                          <a:spcPct val="115000"/>
-                        </a:lnSpc>
-                        <a:spcBef>
-                          <a:spcPts val="0"/>
-                        </a:spcBef>
-                        <a:spcAft>
-                          <a:spcPts val="0"/>
-                        </a:spcAft>
-                        <a:tabLst>
-                          <a:tab pos="127000" algn="l"/>
-                        </a:tabLst>
-                      </a:pPr>
-                      <a:r>
-                        <a:rPr lang="en-US" sz="1800">
-                          <a:effectLst/>
-                        </a:rPr>
-                        <a:t>Number of Neurons in each hidden unit</a:t>
-                      </a:r>
-                      <a:endParaRPr lang="en-US" sz="1800" b="1">
-                        <a:effectLst/>
-                        <a:latin typeface="Times" charset="0"/>
-                        <a:ea typeface="Times New Roman" charset="0"/>
-                        <a:cs typeface="Times New Roman" charset="0"/>
-                      </a:endParaRPr>
-                    </a:p>
-                  </a:txBody>
-                  <a:tcPr marL="68580" marR="68580" marT="0" marB="0"/>
-                </a:tc>
-                <a:tc>
-                  <a:txBody>
-                    <a:bodyPr/>
-                    <a:lstStyle/>
-                    <a:p>
-                      <a:pPr marL="0" marR="0" algn="just">
-                        <a:lnSpc>
-                          <a:spcPct val="115000"/>
-                        </a:lnSpc>
-                        <a:spcBef>
-                          <a:spcPts val="0"/>
-                        </a:spcBef>
-                        <a:spcAft>
-                          <a:spcPts val="0"/>
-                        </a:spcAft>
-                        <a:tabLst>
-                          <a:tab pos="127000" algn="l"/>
-                        </a:tabLst>
-                      </a:pPr>
-                      <a:r>
-                        <a:rPr lang="en-US" sz="1800">
-                          <a:effectLst/>
-                        </a:rPr>
-                        <a:t>100,200,100</a:t>
-                      </a:r>
-                      <a:endParaRPr lang="en-US" sz="1800" b="1">
-                        <a:effectLst/>
-                        <a:latin typeface="Times" charset="0"/>
-                        <a:ea typeface="Times New Roman" charset="0"/>
-                        <a:cs typeface="Times New Roman" charset="0"/>
-                      </a:endParaRPr>
-                    </a:p>
-                  </a:txBody>
-                  <a:tcPr marL="68580" marR="68580" marT="0" marB="0"/>
-                </a:tc>
-              </a:tr>
-              <a:tr h="494272">
-                <a:tc>
-                  <a:txBody>
-                    <a:bodyPr/>
-                    <a:lstStyle/>
-                    <a:p>
-                      <a:pPr marL="0" marR="0" algn="just">
-                        <a:lnSpc>
-                          <a:spcPct val="115000"/>
-                        </a:lnSpc>
-                        <a:spcBef>
-                          <a:spcPts val="0"/>
-                        </a:spcBef>
-                        <a:spcAft>
-                          <a:spcPts val="0"/>
-                        </a:spcAft>
-                        <a:tabLst>
-                          <a:tab pos="127000" algn="l"/>
-                        </a:tabLst>
-                      </a:pPr>
-                      <a:r>
-                        <a:rPr lang="en-US" sz="1800">
-                          <a:effectLst/>
-                        </a:rPr>
-                        <a:t>Learning Rate</a:t>
-                      </a:r>
-                      <a:endParaRPr lang="en-US" sz="1800" b="1">
-                        <a:effectLst/>
-                        <a:latin typeface="Times" charset="0"/>
-                        <a:ea typeface="Times New Roman" charset="0"/>
-                        <a:cs typeface="Times New Roman" charset="0"/>
-                      </a:endParaRPr>
-                    </a:p>
-                  </a:txBody>
-                  <a:tcPr marL="68580" marR="68580" marT="0" marB="0"/>
-                </a:tc>
-                <a:tc>
-                  <a:txBody>
-                    <a:bodyPr/>
-                    <a:lstStyle/>
-                    <a:p>
-                      <a:pPr marL="0" marR="0" algn="just">
-                        <a:lnSpc>
-                          <a:spcPct val="115000"/>
-                        </a:lnSpc>
-                        <a:spcBef>
-                          <a:spcPts val="0"/>
-                        </a:spcBef>
-                        <a:spcAft>
-                          <a:spcPts val="0"/>
-                        </a:spcAft>
-                        <a:tabLst>
-                          <a:tab pos="127000" algn="l"/>
-                        </a:tabLst>
-                      </a:pPr>
-                      <a:r>
-                        <a:rPr lang="en-US" sz="1800">
-                          <a:effectLst/>
-                        </a:rPr>
-                        <a:t>0.9</a:t>
-                      </a:r>
-                      <a:endParaRPr lang="en-US" sz="1800" b="1">
-                        <a:effectLst/>
-                        <a:latin typeface="Times" charset="0"/>
-                        <a:ea typeface="Times New Roman" charset="0"/>
-                        <a:cs typeface="Times New Roman" charset="0"/>
-                      </a:endParaRPr>
-                    </a:p>
-                  </a:txBody>
-                  <a:tcPr marL="68580" marR="68580" marT="0" marB="0"/>
-                </a:tc>
-              </a:tr>
-              <a:tr h="494272">
-                <a:tc>
-                  <a:txBody>
-                    <a:bodyPr/>
-                    <a:lstStyle/>
-                    <a:p>
-                      <a:pPr marL="0" marR="0" algn="just">
-                        <a:lnSpc>
-                          <a:spcPct val="115000"/>
-                        </a:lnSpc>
-                        <a:spcBef>
-                          <a:spcPts val="0"/>
-                        </a:spcBef>
-                        <a:spcAft>
-                          <a:spcPts val="0"/>
-                        </a:spcAft>
-                        <a:tabLst>
-                          <a:tab pos="127000" algn="l"/>
-                        </a:tabLst>
-                      </a:pPr>
-                      <a:r>
-                        <a:rPr lang="en-US" sz="1800">
-                          <a:effectLst/>
-                        </a:rPr>
-                        <a:t>Momentum Rate</a:t>
-                      </a:r>
-                      <a:endParaRPr lang="en-US" sz="1800" b="1">
-                        <a:effectLst/>
-                        <a:latin typeface="Times" charset="0"/>
-                        <a:ea typeface="Times New Roman" charset="0"/>
-                        <a:cs typeface="Times New Roman" charset="0"/>
-                      </a:endParaRPr>
-                    </a:p>
-                  </a:txBody>
-                  <a:tcPr marL="68580" marR="68580" marT="0" marB="0"/>
-                </a:tc>
-                <a:tc>
-                  <a:txBody>
-                    <a:bodyPr/>
-                    <a:lstStyle/>
-                    <a:p>
-                      <a:pPr marL="0" marR="0" algn="just">
-                        <a:lnSpc>
-                          <a:spcPct val="115000"/>
-                        </a:lnSpc>
-                        <a:spcBef>
-                          <a:spcPts val="0"/>
-                        </a:spcBef>
-                        <a:spcAft>
-                          <a:spcPts val="0"/>
-                        </a:spcAft>
-                        <a:tabLst>
-                          <a:tab pos="127000" algn="l"/>
-                        </a:tabLst>
-                      </a:pPr>
-                      <a:r>
-                        <a:rPr lang="en-US" sz="1800">
-                          <a:effectLst/>
-                        </a:rPr>
-                        <a:t>0.01</a:t>
-                      </a:r>
-                      <a:endParaRPr lang="en-US" sz="1800" b="1">
-                        <a:effectLst/>
-                        <a:latin typeface="Times" charset="0"/>
-                        <a:ea typeface="Times New Roman" charset="0"/>
-                        <a:cs typeface="Times New Roman" charset="0"/>
-                      </a:endParaRPr>
-                    </a:p>
-                  </a:txBody>
-                  <a:tcPr marL="68580" marR="68580" marT="0" marB="0"/>
-                </a:tc>
-              </a:tr>
-              <a:tr h="549362">
-                <a:tc>
-                  <a:txBody>
-                    <a:bodyPr/>
-                    <a:lstStyle/>
-                    <a:p>
-                      <a:pPr marL="0" marR="0" algn="l">
+                      <a:pPr marL="0" marR="0" algn="ctr">
                         <a:lnSpc>
                           <a:spcPct val="115000"/>
                         </a:lnSpc>
@@ -8468,7 +8430,7 @@
                         <a:rPr lang="en-US" sz="1800" dirty="0">
                           <a:effectLst/>
                         </a:rPr>
-                        <a:t>Features Used</a:t>
+                        <a:t>Number of Neurons in each layer</a:t>
                       </a:r>
                       <a:endParaRPr lang="en-US" sz="1800" b="1" dirty="0">
                         <a:effectLst/>
@@ -8485,7 +8447,7 @@
                     <a:bodyPr/>
                     <a:lstStyle/>
                     <a:p>
-                      <a:pPr marL="0" marR="0" algn="l">
+                      <a:pPr marL="0" marR="0" algn="ctr">
                         <a:lnSpc>
                           <a:spcPct val="115000"/>
                         </a:lnSpc>
@@ -8503,7 +8465,7 @@
                         <a:rPr lang="en-US" sz="1800" dirty="0">
                           <a:effectLst/>
                         </a:rPr>
-                        <a:t>Tags, Title, Description</a:t>
+                        <a:t>500</a:t>
                       </a:r>
                       <a:endParaRPr lang="en-US" sz="1800" b="1" dirty="0">
                         <a:effectLst/>
@@ -8515,14 +8477,19 @@
                   </a:txBody>
                   <a:tcPr marL="68580" marR="68580" marT="0" marB="0"/>
                 </a:tc>
+                <a:extLst>
+                  <a:ext uri="{0D108BD9-81ED-4DB2-BD59-A6C34878D82A}">
+                    <a16:rowId xmlns:a16="http://schemas.microsoft.com/office/drawing/2014/main" val="10004"/>
+                  </a:ext>
+                </a:extLst>
               </a:tr>
-              <a:tr h="494272">
+              <a:tr h="358666">
                 <a:tc>
                   <a:txBody>
                     <a:bodyPr/>
                     <a:lstStyle/>
                     <a:p>
-                      <a:pPr marL="0" marR="0" algn="just">
+                      <a:pPr marL="0" marR="0" algn="ctr">
                         <a:lnSpc>
                           <a:spcPct val="115000"/>
                         </a:lnSpc>
@@ -8540,7 +8507,7 @@
                         <a:rPr lang="en-US" sz="1800" dirty="0">
                           <a:effectLst/>
                         </a:rPr>
-                        <a:t>Accuracy</a:t>
+                        <a:t>Learning Rate</a:t>
                       </a:r>
                       <a:endParaRPr lang="en-US" sz="1800" b="1" dirty="0">
                         <a:effectLst/>
@@ -8557,7 +8524,7 @@
                     <a:bodyPr/>
                     <a:lstStyle/>
                     <a:p>
-                      <a:pPr marL="0" marR="0" algn="just">
+                      <a:pPr marL="0" marR="0" algn="ctr">
                         <a:lnSpc>
                           <a:spcPct val="115000"/>
                         </a:lnSpc>
@@ -8575,7 +8542,7 @@
                         <a:rPr lang="en-US" sz="1800" dirty="0">
                           <a:effectLst/>
                         </a:rPr>
-                        <a:t>71.08 percent</a:t>
+                        <a:t>0.05</a:t>
                       </a:r>
                       <a:endParaRPr lang="en-US" sz="1800" b="1" dirty="0">
                         <a:effectLst/>
@@ -8587,6 +8554,550 @@
                   </a:txBody>
                   <a:tcPr marL="68580" marR="68580" marT="0" marB="0"/>
                 </a:tc>
+                <a:extLst>
+                  <a:ext uri="{0D108BD9-81ED-4DB2-BD59-A6C34878D82A}">
+                    <a16:rowId xmlns:a16="http://schemas.microsoft.com/office/drawing/2014/main" val="10005"/>
+                  </a:ext>
+                </a:extLst>
+              </a:tr>
+              <a:tr h="358666">
+                <a:tc>
+                  <a:txBody>
+                    <a:bodyPr/>
+                    <a:lstStyle/>
+                    <a:p>
+                      <a:pPr marL="0" marR="0" algn="ctr" defTabSz="914400" rtl="0" eaLnBrk="1" latinLnBrk="0" hangingPunct="1">
+                        <a:lnSpc>
+                          <a:spcPct val="115000"/>
+                        </a:lnSpc>
+                        <a:spcBef>
+                          <a:spcPts val="0"/>
+                        </a:spcBef>
+                        <a:spcAft>
+                          <a:spcPts val="0"/>
+                        </a:spcAft>
+                        <a:tabLst>
+                          <a:tab pos="127000" algn="l"/>
+                        </a:tabLst>
+                      </a:pPr>
+                      <a:r>
+                        <a:rPr lang="en-US" sz="1800" b="1" kern="1200" dirty="0">
+                          <a:solidFill>
+                            <a:schemeClr val="tx1"/>
+                          </a:solidFill>
+                          <a:effectLst/>
+                          <a:latin typeface="+mn-lt"/>
+                          <a:ea typeface="+mn-ea"/>
+                          <a:cs typeface="+mn-cs"/>
+                        </a:rPr>
+                        <a:t>Momentum Rate</a:t>
+                      </a:r>
+                    </a:p>
+                  </a:txBody>
+                  <a:tcPr marL="68580" marR="68580" marT="0" marB="0"/>
+                </a:tc>
+                <a:tc>
+                  <a:txBody>
+                    <a:bodyPr/>
+                    <a:lstStyle/>
+                    <a:p>
+                      <a:pPr marL="0" marR="0" algn="ctr" defTabSz="914400" rtl="0" eaLnBrk="1" latinLnBrk="0" hangingPunct="1">
+                        <a:lnSpc>
+                          <a:spcPct val="115000"/>
+                        </a:lnSpc>
+                        <a:spcBef>
+                          <a:spcPts val="0"/>
+                        </a:spcBef>
+                        <a:spcAft>
+                          <a:spcPts val="0"/>
+                        </a:spcAft>
+                        <a:tabLst>
+                          <a:tab pos="127000" algn="l"/>
+                        </a:tabLst>
+                      </a:pPr>
+                      <a:r>
+                        <a:rPr lang="en-US" sz="1800" b="0" kern="1200" dirty="0">
+                          <a:solidFill>
+                            <a:schemeClr val="tx1"/>
+                          </a:solidFill>
+                          <a:effectLst/>
+                          <a:latin typeface="+mn-lt"/>
+                          <a:ea typeface="+mn-ea"/>
+                          <a:cs typeface="+mn-cs"/>
+                        </a:rPr>
+                        <a:t>0.4</a:t>
+                      </a:r>
+                    </a:p>
+                  </a:txBody>
+                  <a:tcPr marL="68580" marR="68580" marT="0" marB="0"/>
+                </a:tc>
+                <a:extLst>
+                  <a:ext uri="{0D108BD9-81ED-4DB2-BD59-A6C34878D82A}">
+                    <a16:rowId xmlns:a16="http://schemas.microsoft.com/office/drawing/2014/main" val="10006"/>
+                  </a:ext>
+                </a:extLst>
+              </a:tr>
+              <a:tr h="398641">
+                <a:tc>
+                  <a:txBody>
+                    <a:bodyPr/>
+                    <a:lstStyle/>
+                    <a:p>
+                      <a:pPr marL="0" marR="0" algn="ctr" defTabSz="914400" rtl="0" eaLnBrk="1" latinLnBrk="0" hangingPunct="1">
+                        <a:lnSpc>
+                          <a:spcPct val="115000"/>
+                        </a:lnSpc>
+                        <a:spcBef>
+                          <a:spcPts val="0"/>
+                        </a:spcBef>
+                        <a:spcAft>
+                          <a:spcPts val="0"/>
+                        </a:spcAft>
+                        <a:tabLst>
+                          <a:tab pos="127000" algn="l"/>
+                        </a:tabLst>
+                      </a:pPr>
+                      <a:r>
+                        <a:rPr lang="en-US" sz="1800" b="1" kern="1200" dirty="0">
+                          <a:solidFill>
+                            <a:schemeClr val="tx1"/>
+                          </a:solidFill>
+                          <a:effectLst/>
+                          <a:latin typeface="+mn-lt"/>
+                          <a:ea typeface="+mn-ea"/>
+                          <a:cs typeface="+mn-cs"/>
+                        </a:rPr>
+                        <a:t>Features Used</a:t>
+                      </a:r>
+                    </a:p>
+                  </a:txBody>
+                  <a:tcPr marL="68580" marR="68580" marT="0" marB="0"/>
+                </a:tc>
+                <a:tc>
+                  <a:txBody>
+                    <a:bodyPr/>
+                    <a:lstStyle/>
+                    <a:p>
+                      <a:pPr marL="0" marR="0" algn="ctr" defTabSz="914400" rtl="0" eaLnBrk="1" latinLnBrk="0" hangingPunct="1">
+                        <a:lnSpc>
+                          <a:spcPct val="115000"/>
+                        </a:lnSpc>
+                        <a:spcBef>
+                          <a:spcPts val="0"/>
+                        </a:spcBef>
+                        <a:spcAft>
+                          <a:spcPts val="0"/>
+                        </a:spcAft>
+                        <a:tabLst>
+                          <a:tab pos="127000" algn="l"/>
+                        </a:tabLst>
+                      </a:pPr>
+                      <a:r>
+                        <a:rPr lang="en-US" sz="1800" b="0" kern="1200" dirty="0">
+                          <a:solidFill>
+                            <a:schemeClr val="tx1"/>
+                          </a:solidFill>
+                          <a:effectLst/>
+                          <a:latin typeface="+mn-lt"/>
+                          <a:ea typeface="+mn-ea"/>
+                          <a:cs typeface="+mn-cs"/>
+                        </a:rPr>
+                        <a:t>Tags, Title, Description, Tags Count</a:t>
+                      </a:r>
+                    </a:p>
+                  </a:txBody>
+                  <a:tcPr marL="68580" marR="68580" marT="0" marB="0"/>
+                </a:tc>
+                <a:extLst>
+                  <a:ext uri="{0D108BD9-81ED-4DB2-BD59-A6C34878D82A}">
+                    <a16:rowId xmlns:a16="http://schemas.microsoft.com/office/drawing/2014/main" val="10007"/>
+                  </a:ext>
+                </a:extLst>
+              </a:tr>
+              <a:tr h="358666">
+                <a:tc>
+                  <a:txBody>
+                    <a:bodyPr/>
+                    <a:lstStyle/>
+                    <a:p>
+                      <a:pPr marL="0" marR="0" algn="ctr" defTabSz="914400" rtl="0" eaLnBrk="1" latinLnBrk="0" hangingPunct="1">
+                        <a:lnSpc>
+                          <a:spcPct val="115000"/>
+                        </a:lnSpc>
+                        <a:spcBef>
+                          <a:spcPts val="0"/>
+                        </a:spcBef>
+                        <a:spcAft>
+                          <a:spcPts val="0"/>
+                        </a:spcAft>
+                        <a:tabLst>
+                          <a:tab pos="127000" algn="l"/>
+                        </a:tabLst>
+                      </a:pPr>
+                      <a:r>
+                        <a:rPr lang="en-US" sz="1800" b="1" kern="1200" dirty="0">
+                          <a:solidFill>
+                            <a:schemeClr val="tx1"/>
+                          </a:solidFill>
+                          <a:effectLst/>
+                          <a:latin typeface="+mn-lt"/>
+                          <a:ea typeface="+mn-ea"/>
+                          <a:cs typeface="+mn-cs"/>
+                        </a:rPr>
+                        <a:t>Accuracy</a:t>
+                      </a:r>
+                    </a:p>
+                  </a:txBody>
+                  <a:tcPr marL="68580" marR="68580" marT="0" marB="0"/>
+                </a:tc>
+                <a:tc>
+                  <a:txBody>
+                    <a:bodyPr/>
+                    <a:lstStyle/>
+                    <a:p>
+                      <a:pPr marL="0" marR="0" algn="ctr" defTabSz="914400" rtl="0" eaLnBrk="1" latinLnBrk="0" hangingPunct="1">
+                        <a:lnSpc>
+                          <a:spcPct val="115000"/>
+                        </a:lnSpc>
+                        <a:spcBef>
+                          <a:spcPts val="0"/>
+                        </a:spcBef>
+                        <a:spcAft>
+                          <a:spcPts val="0"/>
+                        </a:spcAft>
+                        <a:tabLst>
+                          <a:tab pos="127000" algn="l"/>
+                        </a:tabLst>
+                      </a:pPr>
+                      <a:r>
+                        <a:rPr lang="en-US" sz="1800" b="0" kern="1200" dirty="0">
+                          <a:solidFill>
+                            <a:schemeClr val="tx1"/>
+                          </a:solidFill>
+                          <a:effectLst/>
+                          <a:latin typeface="+mn-lt"/>
+                          <a:ea typeface="+mn-ea"/>
+                          <a:cs typeface="+mn-cs"/>
+                        </a:rPr>
+                        <a:t>73.6 %</a:t>
+                      </a:r>
+                    </a:p>
+                  </a:txBody>
+                  <a:tcPr marL="68580" marR="68580" marT="0" marB="0"/>
+                </a:tc>
+                <a:extLst>
+                  <a:ext uri="{0D108BD9-81ED-4DB2-BD59-A6C34878D82A}">
+                    <a16:rowId xmlns:a16="http://schemas.microsoft.com/office/drawing/2014/main" val="10008"/>
+                  </a:ext>
+                </a:extLst>
+              </a:tr>
+              <a:tr h="358666">
+                <a:tc>
+                  <a:txBody>
+                    <a:bodyPr/>
+                    <a:lstStyle/>
+                    <a:p>
+                      <a:pPr marL="0" marR="0" algn="ctr" defTabSz="914400" rtl="0" eaLnBrk="1" latinLnBrk="0" hangingPunct="1">
+                        <a:lnSpc>
+                          <a:spcPct val="115000"/>
+                        </a:lnSpc>
+                        <a:spcBef>
+                          <a:spcPts val="0"/>
+                        </a:spcBef>
+                        <a:spcAft>
+                          <a:spcPts val="0"/>
+                        </a:spcAft>
+                        <a:tabLst>
+                          <a:tab pos="127000" algn="l"/>
+                        </a:tabLst>
+                      </a:pPr>
+                      <a:r>
+                        <a:rPr lang="en-US" sz="1800" b="1" kern="1200" dirty="0">
+                          <a:solidFill>
+                            <a:schemeClr val="tx1"/>
+                          </a:solidFill>
+                          <a:effectLst/>
+                          <a:latin typeface="+mn-lt"/>
+                          <a:ea typeface="+mn-ea"/>
+                          <a:cs typeface="+mn-cs"/>
+                        </a:rPr>
+                        <a:t>Epochs</a:t>
+                      </a:r>
+                    </a:p>
+                  </a:txBody>
+                  <a:tcPr marL="68580" marR="68580" marT="0" marB="0"/>
+                </a:tc>
+                <a:tc>
+                  <a:txBody>
+                    <a:bodyPr/>
+                    <a:lstStyle/>
+                    <a:p>
+                      <a:pPr marL="0" marR="0" algn="ctr" defTabSz="914400" rtl="0" eaLnBrk="1" latinLnBrk="0" hangingPunct="1">
+                        <a:lnSpc>
+                          <a:spcPct val="115000"/>
+                        </a:lnSpc>
+                        <a:spcBef>
+                          <a:spcPts val="0"/>
+                        </a:spcBef>
+                        <a:spcAft>
+                          <a:spcPts val="0"/>
+                        </a:spcAft>
+                        <a:tabLst>
+                          <a:tab pos="127000" algn="l"/>
+                        </a:tabLst>
+                      </a:pPr>
+                      <a:r>
+                        <a:rPr lang="en-US" sz="1800" b="0" kern="1200" dirty="0">
+                          <a:solidFill>
+                            <a:schemeClr val="tx1"/>
+                          </a:solidFill>
+                          <a:effectLst/>
+                          <a:latin typeface="+mn-lt"/>
+                          <a:ea typeface="+mn-ea"/>
+                          <a:cs typeface="+mn-cs"/>
+                        </a:rPr>
+                        <a:t>10</a:t>
+                      </a:r>
+                    </a:p>
+                  </a:txBody>
+                  <a:tcPr marL="68580" marR="68580" marT="0" marB="0"/>
+                </a:tc>
+                <a:extLst>
+                  <a:ext uri="{0D108BD9-81ED-4DB2-BD59-A6C34878D82A}">
+                    <a16:rowId xmlns:a16="http://schemas.microsoft.com/office/drawing/2014/main" val="2572540323"/>
+                  </a:ext>
+                </a:extLst>
+              </a:tr>
+              <a:tr h="358666">
+                <a:tc>
+                  <a:txBody>
+                    <a:bodyPr/>
+                    <a:lstStyle/>
+                    <a:p>
+                      <a:pPr marL="0" marR="0" algn="ctr" defTabSz="914400" rtl="0" eaLnBrk="1" latinLnBrk="0" hangingPunct="1">
+                        <a:lnSpc>
+                          <a:spcPct val="115000"/>
+                        </a:lnSpc>
+                        <a:spcBef>
+                          <a:spcPts val="0"/>
+                        </a:spcBef>
+                        <a:spcAft>
+                          <a:spcPts val="0"/>
+                        </a:spcAft>
+                        <a:tabLst>
+                          <a:tab pos="127000" algn="l"/>
+                        </a:tabLst>
+                      </a:pPr>
+                      <a:r>
+                        <a:rPr lang="en-US" sz="1800" b="1" kern="1200" dirty="0">
+                          <a:solidFill>
+                            <a:schemeClr val="tx1"/>
+                          </a:solidFill>
+                          <a:effectLst/>
+                          <a:latin typeface="+mn-lt"/>
+                          <a:ea typeface="+mn-ea"/>
+                          <a:cs typeface="+mn-cs"/>
+                        </a:rPr>
+                        <a:t>Batch Size</a:t>
+                      </a:r>
+                    </a:p>
+                  </a:txBody>
+                  <a:tcPr marL="68580" marR="68580" marT="0" marB="0"/>
+                </a:tc>
+                <a:tc>
+                  <a:txBody>
+                    <a:bodyPr/>
+                    <a:lstStyle/>
+                    <a:p>
+                      <a:pPr marL="0" marR="0" algn="ctr" defTabSz="914400" rtl="0" eaLnBrk="1" latinLnBrk="0" hangingPunct="1">
+                        <a:lnSpc>
+                          <a:spcPct val="115000"/>
+                        </a:lnSpc>
+                        <a:spcBef>
+                          <a:spcPts val="0"/>
+                        </a:spcBef>
+                        <a:spcAft>
+                          <a:spcPts val="0"/>
+                        </a:spcAft>
+                        <a:tabLst>
+                          <a:tab pos="127000" algn="l"/>
+                        </a:tabLst>
+                      </a:pPr>
+                      <a:r>
+                        <a:rPr lang="en-US" sz="1800" b="0" kern="1200" dirty="0">
+                          <a:solidFill>
+                            <a:schemeClr val="tx1"/>
+                          </a:solidFill>
+                          <a:effectLst/>
+                          <a:latin typeface="+mn-lt"/>
+                          <a:ea typeface="+mn-ea"/>
+                          <a:cs typeface="+mn-cs"/>
+                        </a:rPr>
+                        <a:t>100</a:t>
+                      </a:r>
+                    </a:p>
+                  </a:txBody>
+                  <a:tcPr marL="68580" marR="68580" marT="0" marB="0"/>
+                </a:tc>
+                <a:extLst>
+                  <a:ext uri="{0D108BD9-81ED-4DB2-BD59-A6C34878D82A}">
+                    <a16:rowId xmlns:a16="http://schemas.microsoft.com/office/drawing/2014/main" val="4158295132"/>
+                  </a:ext>
+                </a:extLst>
+              </a:tr>
+              <a:tr h="358666">
+                <a:tc>
+                  <a:txBody>
+                    <a:bodyPr/>
+                    <a:lstStyle/>
+                    <a:p>
+                      <a:pPr marL="0" marR="0" algn="ctr" defTabSz="914400" rtl="0" eaLnBrk="1" latinLnBrk="0" hangingPunct="1">
+                        <a:lnSpc>
+                          <a:spcPct val="115000"/>
+                        </a:lnSpc>
+                        <a:spcBef>
+                          <a:spcPts val="0"/>
+                        </a:spcBef>
+                        <a:spcAft>
+                          <a:spcPts val="0"/>
+                        </a:spcAft>
+                        <a:tabLst>
+                          <a:tab pos="127000" algn="l"/>
+                        </a:tabLst>
+                      </a:pPr>
+                      <a:r>
+                        <a:rPr lang="en-US" sz="1800" b="1" kern="1200" dirty="0">
+                          <a:solidFill>
+                            <a:schemeClr val="tx1"/>
+                          </a:solidFill>
+                          <a:effectLst/>
+                          <a:latin typeface="+mn-lt"/>
+                          <a:ea typeface="+mn-ea"/>
+                          <a:cs typeface="+mn-cs"/>
+                        </a:rPr>
+                        <a:t>Optimizer</a:t>
+                      </a:r>
+                    </a:p>
+                  </a:txBody>
+                  <a:tcPr marL="68580" marR="68580" marT="0" marB="0"/>
+                </a:tc>
+                <a:tc>
+                  <a:txBody>
+                    <a:bodyPr/>
+                    <a:lstStyle/>
+                    <a:p>
+                      <a:pPr marL="0" marR="0" algn="ctr" defTabSz="914400" rtl="0" eaLnBrk="1" latinLnBrk="0" hangingPunct="1">
+                        <a:lnSpc>
+                          <a:spcPct val="115000"/>
+                        </a:lnSpc>
+                        <a:spcBef>
+                          <a:spcPts val="0"/>
+                        </a:spcBef>
+                        <a:spcAft>
+                          <a:spcPts val="0"/>
+                        </a:spcAft>
+                        <a:tabLst>
+                          <a:tab pos="127000" algn="l"/>
+                        </a:tabLst>
+                      </a:pPr>
+                      <a:r>
+                        <a:rPr lang="en-US" sz="1800" b="0" kern="1200" dirty="0">
+                          <a:solidFill>
+                            <a:schemeClr val="tx1"/>
+                          </a:solidFill>
+                          <a:effectLst/>
+                          <a:latin typeface="+mn-lt"/>
+                          <a:ea typeface="+mn-ea"/>
+                          <a:cs typeface="+mn-cs"/>
+                        </a:rPr>
+                        <a:t>Adam</a:t>
+                      </a:r>
+                    </a:p>
+                  </a:txBody>
+                  <a:tcPr marL="68580" marR="68580" marT="0" marB="0"/>
+                </a:tc>
+                <a:extLst>
+                  <a:ext uri="{0D108BD9-81ED-4DB2-BD59-A6C34878D82A}">
+                    <a16:rowId xmlns:a16="http://schemas.microsoft.com/office/drawing/2014/main" val="3327863910"/>
+                  </a:ext>
+                </a:extLst>
+              </a:tr>
+              <a:tr h="358666">
+                <a:tc>
+                  <a:txBody>
+                    <a:bodyPr/>
+                    <a:lstStyle/>
+                    <a:p>
+                      <a:pPr marL="0" marR="0" algn="ctr" defTabSz="914400" rtl="0" eaLnBrk="1" latinLnBrk="0" hangingPunct="1">
+                        <a:lnSpc>
+                          <a:spcPct val="115000"/>
+                        </a:lnSpc>
+                        <a:spcBef>
+                          <a:spcPts val="0"/>
+                        </a:spcBef>
+                        <a:spcAft>
+                          <a:spcPts val="0"/>
+                        </a:spcAft>
+                        <a:tabLst>
+                          <a:tab pos="127000" algn="l"/>
+                        </a:tabLst>
+                      </a:pPr>
+                      <a:r>
+                        <a:rPr lang="en-US" sz="1800" b="1" kern="1200" dirty="0">
+                          <a:solidFill>
+                            <a:schemeClr val="tx1"/>
+                          </a:solidFill>
+                          <a:effectLst/>
+                          <a:latin typeface="+mn-lt"/>
+                          <a:ea typeface="+mn-ea"/>
+                          <a:cs typeface="+mn-cs"/>
+                        </a:rPr>
+                        <a:t>Time to Build</a:t>
+                      </a:r>
+                    </a:p>
+                  </a:txBody>
+                  <a:tcPr marL="68580" marR="68580" marT="0" marB="0"/>
+                </a:tc>
+                <a:tc>
+                  <a:txBody>
+                    <a:bodyPr/>
+                    <a:lstStyle/>
+                    <a:p>
+                      <a:pPr marL="0" marR="0" algn="ctr" defTabSz="914400" rtl="0" eaLnBrk="1" latinLnBrk="0" hangingPunct="1">
+                        <a:lnSpc>
+                          <a:spcPct val="115000"/>
+                        </a:lnSpc>
+                        <a:spcBef>
+                          <a:spcPts val="0"/>
+                        </a:spcBef>
+                        <a:spcAft>
+                          <a:spcPts val="0"/>
+                        </a:spcAft>
+                        <a:tabLst>
+                          <a:tab pos="127000" algn="l"/>
+                        </a:tabLst>
+                      </a:pPr>
+                      <a:r>
+                        <a:rPr lang="en-US" sz="1800" b="0" kern="1200" dirty="0">
+                          <a:solidFill>
+                            <a:schemeClr val="tx1"/>
+                          </a:solidFill>
+                          <a:effectLst/>
+                          <a:latin typeface="+mn-lt"/>
+                          <a:ea typeface="+mn-ea"/>
+                          <a:cs typeface="+mn-cs"/>
+                        </a:rPr>
+                        <a:t>150 seconds</a:t>
+                      </a:r>
+                    </a:p>
+                  </a:txBody>
+                  <a:tcPr marL="68580" marR="68580" marT="0" marB="0"/>
+                </a:tc>
+                <a:extLst>
+                  <a:ext uri="{0D108BD9-81ED-4DB2-BD59-A6C34878D82A}">
+                    <a16:rowId xmlns:a16="http://schemas.microsoft.com/office/drawing/2014/main" val="3438349502"/>
+                  </a:ext>
+                </a:extLst>
               </a:tr>
             </a:tbl>
           </a:graphicData>
@@ -8627,7 +9138,7 @@
           <p:cNvPr id="2" name="Title 1">
             <a:extLst>
               <a:ext uri="{FF2B5EF4-FFF2-40B4-BE49-F238E27FC236}">
-                <a16:creationId xmlns:a16="http://schemas.microsoft.com/office/drawing/2014/main" xmlns="" id="{274A305D-4D9E-4986-8F10-EDB5B3127A22}"/>
+                <a16:creationId xmlns:a16="http://schemas.microsoft.com/office/drawing/2014/main" id="{274A305D-4D9E-4986-8F10-EDB5B3127A22}"/>
               </a:ext>
             </a:extLst>
           </p:cNvPr>
@@ -8649,57 +9160,465 @@
           <a:lstStyle/>
           <a:p>
             <a:r>
-              <a:rPr lang="en-US" dirty="0" smtClean="0"/>
+              <a:rPr lang="en-US" dirty="0"/>
               <a:t>K Nearest neighbor</a:t>
             </a:r>
-            <a:endParaRPr lang="en-US" dirty="0"/>
-          </a:p>
-        </p:txBody>
-      </p:sp>
-      <p:sp>
-        <p:nvSpPr>
-          <p:cNvPr id="3" name="Content Placeholder 2">
+          </a:p>
+        </p:txBody>
+      </p:sp>
+      <p:graphicFrame>
+        <p:nvGraphicFramePr>
+          <p:cNvPr id="4" name="Content Placeholder 3">
             <a:extLst>
               <a:ext uri="{FF2B5EF4-FFF2-40B4-BE49-F238E27FC236}">
-                <a16:creationId xmlns:a16="http://schemas.microsoft.com/office/drawing/2014/main" xmlns="" id="{07716CFF-3B18-4811-89AB-74BD3754B4E6}"/>
+                <a16:creationId xmlns:a16="http://schemas.microsoft.com/office/drawing/2014/main" id="{7F9852A4-35FB-4EA9-87C7-C83C416CB9E5}"/>
               </a:ext>
             </a:extLst>
           </p:cNvPr>
-          <p:cNvSpPr>
-            <a:spLocks noGrp="1"/>
-          </p:cNvSpPr>
+          <p:cNvGraphicFramePr>
+            <a:graphicFrameLocks noGrp="1"/>
+          </p:cNvGraphicFramePr>
           <p:nvPr>
             <p:ph sz="quarter" idx="13"/>
-          </p:nvPr>
-        </p:nvSpPr>
-        <p:spPr/>
-        <p:txBody>
-          <a:bodyPr/>
-          <a:lstStyle/>
-          <a:p>
-            <a:r>
-              <a:rPr lang="en-US" dirty="0"/>
-              <a:t>k closest training examples in the feature space</a:t>
-            </a:r>
-            <a:r>
-              <a:rPr lang="en-US" dirty="0"/>
-              <a:t> </a:t>
-            </a:r>
-            <a:endParaRPr lang="en-US" dirty="0" smtClean="0"/>
-          </a:p>
-          <a:p>
-            <a:r>
-              <a:rPr lang="en-US" dirty="0"/>
-              <a:t>An object is classified by a majority vote of its </a:t>
-            </a:r>
-            <a:r>
-              <a:rPr lang="en-US" dirty="0" smtClean="0"/>
-              <a:t>neighbors</a:t>
-            </a:r>
-            <a:endParaRPr lang="en-US" dirty="0"/>
-          </a:p>
-        </p:txBody>
-      </p:sp>
+            <p:extLst>
+              <p:ext uri="{D42A27DB-BD31-4B8C-83A1-F6EECF244321}">
+                <p14:modId xmlns:p14="http://schemas.microsoft.com/office/powerpoint/2010/main" val="2130434925"/>
+              </p:ext>
+            </p:extLst>
+          </p:nvPr>
+        </p:nvGraphicFramePr>
+        <p:xfrm>
+          <a:off x="1087640" y="2158711"/>
+          <a:ext cx="4834494" cy="3876047"/>
+        </p:xfrm>
+        <a:graphic>
+          <a:graphicData uri="http://schemas.openxmlformats.org/drawingml/2006/table">
+            <a:tbl>
+              <a:tblPr firstRow="1" firstCol="1" bandRow="1">
+                <a:tableStyleId>{9D7B26C5-4107-4FEC-AEDC-1716B250A1EF}</a:tableStyleId>
+              </a:tblPr>
+              <a:tblGrid>
+                <a:gridCol w="2417247">
+                  <a:extLst>
+                    <a:ext uri="{9D8B030D-6E8A-4147-A177-3AD203B41FA5}">
+                      <a16:colId xmlns:a16="http://schemas.microsoft.com/office/drawing/2014/main" val="20000"/>
+                    </a:ext>
+                  </a:extLst>
+                </a:gridCol>
+                <a:gridCol w="2417247">
+                  <a:extLst>
+                    <a:ext uri="{9D8B030D-6E8A-4147-A177-3AD203B41FA5}">
+                      <a16:colId xmlns:a16="http://schemas.microsoft.com/office/drawing/2014/main" val="20001"/>
+                    </a:ext>
+                  </a:extLst>
+                </a:gridCol>
+              </a:tblGrid>
+              <a:tr h="660624">
+                <a:tc gridSpan="2">
+                  <a:txBody>
+                    <a:bodyPr/>
+                    <a:lstStyle/>
+                    <a:p>
+                      <a:pPr marL="0" marR="0" algn="ctr">
+                        <a:lnSpc>
+                          <a:spcPct val="115000"/>
+                        </a:lnSpc>
+                        <a:spcBef>
+                          <a:spcPts val="0"/>
+                        </a:spcBef>
+                        <a:spcAft>
+                          <a:spcPts val="0"/>
+                        </a:spcAft>
+                        <a:tabLst>
+                          <a:tab pos="127000" algn="l"/>
+                        </a:tabLst>
+                      </a:pPr>
+                      <a:r>
+                        <a:rPr lang="en-US" sz="2400" dirty="0">
+                          <a:effectLst/>
+                        </a:rPr>
+                        <a:t>K-Nearest Neighbors</a:t>
+                      </a:r>
+                      <a:endParaRPr lang="en-US" sz="2400" b="1" dirty="0">
+                        <a:effectLst/>
+                        <a:latin typeface="Times" charset="0"/>
+                        <a:ea typeface="Times New Roman" charset="0"/>
+                        <a:cs typeface="Times New Roman" charset="0"/>
+                      </a:endParaRPr>
+                    </a:p>
+                  </a:txBody>
+                  <a:tcPr marL="68580" marR="68580" marT="0" marB="0"/>
+                </a:tc>
+                <a:tc hMerge="1">
+                  <a:txBody>
+                    <a:bodyPr/>
+                    <a:lstStyle/>
+                    <a:p>
+                      <a:endParaRPr lang="en-US"/>
+                    </a:p>
+                  </a:txBody>
+                  <a:tcPr/>
+                </a:tc>
+                <a:extLst>
+                  <a:ext uri="{0D108BD9-81ED-4DB2-BD59-A6C34878D82A}">
+                    <a16:rowId xmlns:a16="http://schemas.microsoft.com/office/drawing/2014/main" val="10000"/>
+                  </a:ext>
+                </a:extLst>
+              </a:tr>
+              <a:tr h="660624">
+                <a:tc>
+                  <a:txBody>
+                    <a:bodyPr/>
+                    <a:lstStyle/>
+                    <a:p>
+                      <a:pPr marL="0" marR="0" algn="ctr">
+                        <a:lnSpc>
+                          <a:spcPct val="115000"/>
+                        </a:lnSpc>
+                        <a:spcBef>
+                          <a:spcPts val="0"/>
+                        </a:spcBef>
+                        <a:spcAft>
+                          <a:spcPts val="0"/>
+                        </a:spcAft>
+                        <a:tabLst>
+                          <a:tab pos="127000" algn="l"/>
+                        </a:tabLst>
+                      </a:pPr>
+                      <a:r>
+                        <a:rPr lang="en-US" sz="2400" b="1" kern="1200" dirty="0">
+                          <a:solidFill>
+                            <a:schemeClr val="tx1"/>
+                          </a:solidFill>
+                          <a:effectLst/>
+                          <a:latin typeface="+mn-lt"/>
+                          <a:ea typeface="+mn-ea"/>
+                          <a:cs typeface="+mn-cs"/>
+                        </a:rPr>
+                        <a:t>K</a:t>
+                      </a:r>
+                    </a:p>
+                  </a:txBody>
+                  <a:tcPr marL="68580" marR="68580" marT="0" marB="0" anchor="ctr"/>
+                </a:tc>
+                <a:tc>
+                  <a:txBody>
+                    <a:bodyPr/>
+                    <a:lstStyle/>
+                    <a:p>
+                      <a:pPr marL="0" marR="0" algn="ctr">
+                        <a:lnSpc>
+                          <a:spcPct val="115000"/>
+                        </a:lnSpc>
+                        <a:spcBef>
+                          <a:spcPts val="0"/>
+                        </a:spcBef>
+                        <a:spcAft>
+                          <a:spcPts val="0"/>
+                        </a:spcAft>
+                        <a:tabLst>
+                          <a:tab pos="127000" algn="l"/>
+                        </a:tabLst>
+                      </a:pPr>
+                      <a:r>
+                        <a:rPr lang="en-US" sz="2400" b="0" kern="1200" dirty="0">
+                          <a:solidFill>
+                            <a:schemeClr val="tx1"/>
+                          </a:solidFill>
+                          <a:effectLst/>
+                          <a:latin typeface="+mn-lt"/>
+                          <a:ea typeface="+mn-ea"/>
+                          <a:cs typeface="+mn-cs"/>
+                        </a:rPr>
+                        <a:t>5</a:t>
+                      </a:r>
+                    </a:p>
+                  </a:txBody>
+                  <a:tcPr marL="68580" marR="68580" marT="0" marB="0" anchor="ctr"/>
+                </a:tc>
+                <a:extLst>
+                  <a:ext uri="{0D108BD9-81ED-4DB2-BD59-A6C34878D82A}">
+                    <a16:rowId xmlns:a16="http://schemas.microsoft.com/office/drawing/2014/main" val="10001"/>
+                  </a:ext>
+                </a:extLst>
+              </a:tr>
+              <a:tr h="1010469">
+                <a:tc>
+                  <a:txBody>
+                    <a:bodyPr/>
+                    <a:lstStyle/>
+                    <a:p>
+                      <a:pPr marL="0" marR="0" algn="ctr">
+                        <a:lnSpc>
+                          <a:spcPct val="115000"/>
+                        </a:lnSpc>
+                        <a:spcBef>
+                          <a:spcPts val="0"/>
+                        </a:spcBef>
+                        <a:spcAft>
+                          <a:spcPts val="0"/>
+                        </a:spcAft>
+                        <a:tabLst>
+                          <a:tab pos="127000" algn="l"/>
+                        </a:tabLst>
+                      </a:pPr>
+                      <a:r>
+                        <a:rPr lang="en-US" sz="2400" dirty="0">
+                          <a:effectLst/>
+                        </a:rPr>
+                        <a:t>Features Used </a:t>
+                      </a:r>
+                      <a:endParaRPr lang="en-US" sz="2400" b="1" dirty="0">
+                        <a:effectLst/>
+                        <a:latin typeface="Times" charset="0"/>
+                        <a:ea typeface="Times New Roman" charset="0"/>
+                        <a:cs typeface="Times New Roman" charset="0"/>
+                      </a:endParaRPr>
+                    </a:p>
+                  </a:txBody>
+                  <a:tcPr marL="68580" marR="68580" marT="0" marB="0" anchor="ctr"/>
+                </a:tc>
+                <a:tc>
+                  <a:txBody>
+                    <a:bodyPr/>
+                    <a:lstStyle/>
+                    <a:p>
+                      <a:pPr marL="0" marR="0" algn="ctr">
+                        <a:lnSpc>
+                          <a:spcPct val="115000"/>
+                        </a:lnSpc>
+                        <a:spcBef>
+                          <a:spcPts val="0"/>
+                        </a:spcBef>
+                        <a:spcAft>
+                          <a:spcPts val="0"/>
+                        </a:spcAft>
+                        <a:tabLst>
+                          <a:tab pos="127000" algn="l"/>
+                        </a:tabLst>
+                      </a:pPr>
+                      <a:r>
+                        <a:rPr lang="en-US" sz="2400" kern="1200" dirty="0">
+                          <a:solidFill>
+                            <a:schemeClr val="tx1"/>
+                          </a:solidFill>
+                          <a:effectLst/>
+                          <a:latin typeface="+mn-lt"/>
+                          <a:ea typeface="+mn-ea"/>
+                          <a:cs typeface="+mn-cs"/>
+                        </a:rPr>
+                        <a:t>Tags, Title, Description, Tag Count</a:t>
+                      </a:r>
+                      <a:endParaRPr lang="en-US" sz="2400" b="1" dirty="0">
+                        <a:effectLst/>
+                        <a:latin typeface="Times" charset="0"/>
+                        <a:ea typeface="Times New Roman" charset="0"/>
+                        <a:cs typeface="Times New Roman" charset="0"/>
+                      </a:endParaRPr>
+                    </a:p>
+                  </a:txBody>
+                  <a:tcPr marL="68580" marR="68580" marT="0" marB="0" anchor="ctr"/>
+                </a:tc>
+                <a:extLst>
+                  <a:ext uri="{0D108BD9-81ED-4DB2-BD59-A6C34878D82A}">
+                    <a16:rowId xmlns:a16="http://schemas.microsoft.com/office/drawing/2014/main" val="10002"/>
+                  </a:ext>
+                </a:extLst>
+              </a:tr>
+              <a:tr h="660624">
+                <a:tc>
+                  <a:txBody>
+                    <a:bodyPr/>
+                    <a:lstStyle/>
+                    <a:p>
+                      <a:pPr marL="0" marR="0" algn="ctr">
+                        <a:lnSpc>
+                          <a:spcPct val="115000"/>
+                        </a:lnSpc>
+                        <a:spcBef>
+                          <a:spcPts val="0"/>
+                        </a:spcBef>
+                        <a:spcAft>
+                          <a:spcPts val="0"/>
+                        </a:spcAft>
+                        <a:tabLst>
+                          <a:tab pos="127000" algn="l"/>
+                        </a:tabLst>
+                      </a:pPr>
+                      <a:r>
+                        <a:rPr lang="en-US" sz="2400" dirty="0">
+                          <a:effectLst/>
+                        </a:rPr>
+                        <a:t>Accuracy</a:t>
+                      </a:r>
+                      <a:endParaRPr lang="en-US" sz="2400" b="1" dirty="0">
+                        <a:effectLst/>
+                        <a:latin typeface="Times" charset="0"/>
+                        <a:ea typeface="Times New Roman" charset="0"/>
+                        <a:cs typeface="Times New Roman" charset="0"/>
+                      </a:endParaRPr>
+                    </a:p>
+                  </a:txBody>
+                  <a:tcPr marL="68580" marR="68580" marT="0" marB="0" anchor="ctr"/>
+                </a:tc>
+                <a:tc>
+                  <a:txBody>
+                    <a:bodyPr/>
+                    <a:lstStyle/>
+                    <a:p>
+                      <a:pPr marL="0" marR="0" algn="ctr">
+                        <a:lnSpc>
+                          <a:spcPct val="115000"/>
+                        </a:lnSpc>
+                        <a:spcBef>
+                          <a:spcPts val="0"/>
+                        </a:spcBef>
+                        <a:spcAft>
+                          <a:spcPts val="0"/>
+                        </a:spcAft>
+                        <a:tabLst>
+                          <a:tab pos="127000" algn="l"/>
+                        </a:tabLst>
+                      </a:pPr>
+                      <a:r>
+                        <a:rPr lang="en-US" sz="2400" kern="1200" dirty="0">
+                          <a:solidFill>
+                            <a:schemeClr val="tx1"/>
+                          </a:solidFill>
+                          <a:effectLst/>
+                          <a:latin typeface="+mn-lt"/>
+                          <a:ea typeface="+mn-ea"/>
+                          <a:cs typeface="+mn-cs"/>
+                        </a:rPr>
+                        <a:t>67.7 percent</a:t>
+                      </a:r>
+                    </a:p>
+                  </a:txBody>
+                  <a:tcPr marL="68580" marR="68580" marT="0" marB="0" anchor="ctr"/>
+                </a:tc>
+                <a:extLst>
+                  <a:ext uri="{0D108BD9-81ED-4DB2-BD59-A6C34878D82A}">
+                    <a16:rowId xmlns:a16="http://schemas.microsoft.com/office/drawing/2014/main" val="10003"/>
+                  </a:ext>
+                </a:extLst>
+              </a:tr>
+              <a:tr h="660624">
+                <a:tc>
+                  <a:txBody>
+                    <a:bodyPr/>
+                    <a:lstStyle/>
+                    <a:p>
+                      <a:pPr marL="0" marR="0" algn="ctr">
+                        <a:lnSpc>
+                          <a:spcPct val="115000"/>
+                        </a:lnSpc>
+                        <a:spcBef>
+                          <a:spcPts val="0"/>
+                        </a:spcBef>
+                        <a:spcAft>
+                          <a:spcPts val="0"/>
+                        </a:spcAft>
+                        <a:tabLst>
+                          <a:tab pos="127000" algn="l"/>
+                        </a:tabLst>
+                      </a:pPr>
+                      <a:r>
+                        <a:rPr lang="en-US" sz="2400" b="1" kern="1200" dirty="0">
+                          <a:solidFill>
+                            <a:schemeClr val="tx1"/>
+                          </a:solidFill>
+                          <a:effectLst/>
+                          <a:latin typeface="+mn-lt"/>
+                          <a:ea typeface="+mn-ea"/>
+                          <a:cs typeface="+mn-cs"/>
+                        </a:rPr>
+                        <a:t>Training Time</a:t>
+                      </a:r>
+                    </a:p>
+                  </a:txBody>
+                  <a:tcPr marL="68580" marR="68580" marT="0" marB="0" anchor="ctr"/>
+                </a:tc>
+                <a:tc>
+                  <a:txBody>
+                    <a:bodyPr/>
+                    <a:lstStyle/>
+                    <a:p>
+                      <a:pPr marL="0" marR="0" algn="ctr">
+                        <a:lnSpc>
+                          <a:spcPct val="115000"/>
+                        </a:lnSpc>
+                        <a:spcBef>
+                          <a:spcPts val="0"/>
+                        </a:spcBef>
+                        <a:spcAft>
+                          <a:spcPts val="0"/>
+                        </a:spcAft>
+                        <a:tabLst>
+                          <a:tab pos="127000" algn="l"/>
+                        </a:tabLst>
+                      </a:pPr>
+                      <a:r>
+                        <a:rPr lang="en-US" sz="2400" kern="1200" dirty="0">
+                          <a:solidFill>
+                            <a:schemeClr val="tx1"/>
+                          </a:solidFill>
+                          <a:effectLst/>
+                          <a:latin typeface="+mn-lt"/>
+                          <a:ea typeface="+mn-ea"/>
+                          <a:cs typeface="+mn-cs"/>
+                        </a:rPr>
+                        <a:t>143 seconds</a:t>
+                      </a:r>
+                    </a:p>
+                  </a:txBody>
+                  <a:tcPr marL="68580" marR="68580" marT="0" marB="0" anchor="ctr"/>
+                </a:tc>
+                <a:extLst>
+                  <a:ext uri="{0D108BD9-81ED-4DB2-BD59-A6C34878D82A}">
+                    <a16:rowId xmlns:a16="http://schemas.microsoft.com/office/drawing/2014/main" val="688655240"/>
+                  </a:ext>
+                </a:extLst>
+              </a:tr>
+            </a:tbl>
+          </a:graphicData>
+        </a:graphic>
+      </p:graphicFrame>
+      <p:pic>
+        <p:nvPicPr>
+          <p:cNvPr id="7" name="Picture 6" descr="A close up of a logo&#10;&#10;Description generated with high confidence">
+            <a:extLst>
+              <a:ext uri="{FF2B5EF4-FFF2-40B4-BE49-F238E27FC236}">
+                <a16:creationId xmlns:a16="http://schemas.microsoft.com/office/drawing/2014/main" id="{0F5F680D-2CEC-4AE8-BF06-22131891F9D0}"/>
+              </a:ext>
+            </a:extLst>
+          </p:cNvPr>
+          <p:cNvPicPr>
+            <a:picLocks noChangeAspect="1"/>
+          </p:cNvPicPr>
+          <p:nvPr/>
+        </p:nvPicPr>
+        <p:blipFill>
+          <a:blip r:embed="rId2">
+            <a:extLst>
+              <a:ext uri="{28A0092B-C50C-407E-A947-70E740481C1C}">
+                <a14:useLocalDpi xmlns:a14="http://schemas.microsoft.com/office/drawing/2010/main" val="0"/>
+              </a:ext>
+            </a:extLst>
+          </a:blip>
+          <a:stretch>
+            <a:fillRect/>
+          </a:stretch>
+        </p:blipFill>
+        <p:spPr>
+          <a:xfrm>
+            <a:off x="6202363" y="2158712"/>
+            <a:ext cx="5075862" cy="3652964"/>
+          </a:xfrm>
+          <a:prstGeom prst="rect">
+            <a:avLst/>
+          </a:prstGeom>
+        </p:spPr>
+      </p:pic>
     </p:spTree>
     <p:extLst>
       <p:ext uri="{BB962C8B-B14F-4D97-AF65-F5344CB8AC3E}">
@@ -8732,7 +9651,13 @@
       </p:grpSpPr>
       <p:sp>
         <p:nvSpPr>
-          <p:cNvPr id="2" name="Title 1"/>
+          <p:cNvPr id="2" name="Title 1">
+            <a:extLst>
+              <a:ext uri="{FF2B5EF4-FFF2-40B4-BE49-F238E27FC236}">
+                <a16:creationId xmlns:a16="http://schemas.microsoft.com/office/drawing/2014/main" id="{274A305D-4D9E-4986-8F10-EDB5B3127A22}"/>
+              </a:ext>
+            </a:extLst>
+          </p:cNvPr>
           <p:cNvSpPr>
             <a:spLocks noGrp="1"/>
           </p:cNvSpPr>
@@ -8740,48 +9665,672 @@
             <p:ph type="title"/>
           </p:nvPr>
         </p:nvSpPr>
-        <p:spPr/>
+        <p:spPr>
+          <a:xfrm>
+            <a:off x="913774" y="562534"/>
+            <a:ext cx="10364451" cy="613123"/>
+          </a:xfrm>
+        </p:spPr>
         <p:txBody>
           <a:bodyPr/>
           <a:lstStyle/>
           <a:p>
             <a:r>
-              <a:rPr lang="en-US" dirty="0" smtClean="0"/>
-              <a:t>Experiments</a:t>
-            </a:r>
-            <a:endParaRPr lang="en-US" dirty="0"/>
-          </a:p>
-        </p:txBody>
-      </p:sp>
-      <p:sp>
-        <p:nvSpPr>
-          <p:cNvPr id="3" name="Content Placeholder 2"/>
-          <p:cNvSpPr>
-            <a:spLocks noGrp="1"/>
-          </p:cNvSpPr>
-          <p:nvPr>
-            <p:ph sz="quarter" idx="13"/>
-          </p:nvPr>
-        </p:nvSpPr>
-        <p:spPr/>
-        <p:txBody>
-          <a:bodyPr>
-            <a:normAutofit/>
+              <a:rPr lang="en-US" dirty="0"/>
+              <a:t>K Nearest neighbor</a:t>
+            </a:r>
+          </a:p>
+        </p:txBody>
+      </p:sp>
+      <p:sp>
+        <p:nvSpPr>
+          <p:cNvPr id="6" name="TextBox 5">
+            <a:extLst>
+              <a:ext uri="{FF2B5EF4-FFF2-40B4-BE49-F238E27FC236}">
+                <a16:creationId xmlns:a16="http://schemas.microsoft.com/office/drawing/2014/main" id="{B41F92AE-37F0-4E06-82F0-237A9117F9B5}"/>
+              </a:ext>
+            </a:extLst>
+          </p:cNvPr>
+          <p:cNvSpPr txBox="1"/>
+          <p:nvPr/>
+        </p:nvSpPr>
+        <p:spPr>
+          <a:xfrm>
+            <a:off x="778935" y="2108718"/>
+            <a:ext cx="2162772" cy="3918189"/>
+          </a:xfrm>
+          <a:prstGeom prst="rect">
+            <a:avLst/>
+          </a:prstGeom>
+          <a:noFill/>
+        </p:spPr>
+        <p:txBody>
+          <a:bodyPr wrap="none" rtlCol="0">
+            <a:spAutoFit/>
           </a:bodyPr>
           <a:lstStyle/>
           <a:p>
-            <a:pPr lvl="0"/>
-            <a:r>
-              <a:rPr lang="en-US" dirty="0" smtClean="0"/>
-              <a:t>K values</a:t>
-            </a:r>
-            <a:endParaRPr lang="en-US" dirty="0"/>
-          </a:p>
-          <a:p>
-            <a:pPr lvl="0"/>
-            <a:r>
-              <a:rPr lang="en-US" dirty="0" smtClean="0"/>
-              <a:t>Different set of features</a:t>
+            <a:pPr defTabSz="914400">
+              <a:lnSpc>
+                <a:spcPct val="120000"/>
+              </a:lnSpc>
+              <a:spcBef>
+                <a:spcPts val="1000"/>
+              </a:spcBef>
+              <a:buClr>
+                <a:schemeClr val="tx1"/>
+              </a:buClr>
+            </a:pPr>
+            <a:r>
+              <a:rPr lang="en-US" sz="2000" cap="all" dirty="0"/>
+              <a:t>Class  0 :  0.3409</a:t>
+            </a:r>
+          </a:p>
+          <a:p>
+            <a:pPr defTabSz="914400">
+              <a:lnSpc>
+                <a:spcPct val="120000"/>
+              </a:lnSpc>
+              <a:spcBef>
+                <a:spcPts val="1000"/>
+              </a:spcBef>
+              <a:buClr>
+                <a:schemeClr val="tx1"/>
+              </a:buClr>
+            </a:pPr>
+            <a:r>
+              <a:rPr lang="en-US" sz="2000" cap="all" dirty="0"/>
+              <a:t>Class  1 :  0.4167</a:t>
+            </a:r>
+          </a:p>
+          <a:p>
+            <a:pPr defTabSz="914400">
+              <a:lnSpc>
+                <a:spcPct val="120000"/>
+              </a:lnSpc>
+              <a:spcBef>
+                <a:spcPts val="1000"/>
+              </a:spcBef>
+              <a:buClr>
+                <a:schemeClr val="tx1"/>
+              </a:buClr>
+            </a:pPr>
+            <a:r>
+              <a:rPr lang="en-US" sz="2000" cap="all" dirty="0"/>
+              <a:t>Class  2 :  0.8108</a:t>
+            </a:r>
+          </a:p>
+          <a:p>
+            <a:pPr defTabSz="914400">
+              <a:lnSpc>
+                <a:spcPct val="120000"/>
+              </a:lnSpc>
+              <a:spcBef>
+                <a:spcPts val="1000"/>
+              </a:spcBef>
+              <a:buClr>
+                <a:schemeClr val="tx1"/>
+              </a:buClr>
+            </a:pPr>
+            <a:r>
+              <a:rPr lang="en-US" sz="2000" cap="all" dirty="0"/>
+              <a:t>Class  3 :  0.0</a:t>
+            </a:r>
+          </a:p>
+          <a:p>
+            <a:pPr defTabSz="914400">
+              <a:lnSpc>
+                <a:spcPct val="120000"/>
+              </a:lnSpc>
+              <a:spcBef>
+                <a:spcPts val="1000"/>
+              </a:spcBef>
+              <a:buClr>
+                <a:schemeClr val="tx1"/>
+              </a:buClr>
+            </a:pPr>
+            <a:r>
+              <a:rPr lang="en-US" sz="2000" cap="all" dirty="0"/>
+              <a:t>Class  4 :  0.75</a:t>
+            </a:r>
+          </a:p>
+          <a:p>
+            <a:pPr defTabSz="914400">
+              <a:lnSpc>
+                <a:spcPct val="120000"/>
+              </a:lnSpc>
+              <a:spcBef>
+                <a:spcPts val="1000"/>
+              </a:spcBef>
+              <a:buClr>
+                <a:schemeClr val="tx1"/>
+              </a:buClr>
+            </a:pPr>
+            <a:r>
+              <a:rPr lang="en-US" sz="2000" cap="all" dirty="0"/>
+              <a:t>Class  5 :  0.7538</a:t>
+            </a:r>
+          </a:p>
+          <a:p>
+            <a:pPr defTabSz="914400">
+              <a:lnSpc>
+                <a:spcPct val="120000"/>
+              </a:lnSpc>
+              <a:spcBef>
+                <a:spcPts val="1000"/>
+              </a:spcBef>
+              <a:buClr>
+                <a:schemeClr val="tx1"/>
+              </a:buClr>
+            </a:pPr>
+            <a:r>
+              <a:rPr lang="en-US" sz="2000" cap="all" dirty="0"/>
+              <a:t>Class  6 :  0.3333</a:t>
+            </a:r>
+          </a:p>
+          <a:p>
+            <a:pPr defTabSz="914400">
+              <a:lnSpc>
+                <a:spcPct val="120000"/>
+              </a:lnSpc>
+              <a:spcBef>
+                <a:spcPts val="1000"/>
+              </a:spcBef>
+              <a:buClr>
+                <a:schemeClr val="tx1"/>
+              </a:buClr>
+            </a:pPr>
+            <a:r>
+              <a:rPr lang="en-US" sz="2000" cap="all" dirty="0"/>
+              <a:t>Class  7 :  0.3636</a:t>
+            </a:r>
+          </a:p>
+        </p:txBody>
+      </p:sp>
+      <p:sp>
+        <p:nvSpPr>
+          <p:cNvPr id="8" name="TextBox 7">
+            <a:extLst>
+              <a:ext uri="{FF2B5EF4-FFF2-40B4-BE49-F238E27FC236}">
+                <a16:creationId xmlns:a16="http://schemas.microsoft.com/office/drawing/2014/main" id="{F894DFAB-49D9-4AD7-8E47-65E3F16D960E}"/>
+              </a:ext>
+            </a:extLst>
+          </p:cNvPr>
+          <p:cNvSpPr txBox="1"/>
+          <p:nvPr/>
+        </p:nvSpPr>
+        <p:spPr>
+          <a:xfrm>
+            <a:off x="2941707" y="2108718"/>
+            <a:ext cx="2303836" cy="3918189"/>
+          </a:xfrm>
+          <a:prstGeom prst="rect">
+            <a:avLst/>
+          </a:prstGeom>
+          <a:noFill/>
+        </p:spPr>
+        <p:txBody>
+          <a:bodyPr wrap="none" rtlCol="0">
+            <a:spAutoFit/>
+          </a:bodyPr>
+          <a:lstStyle/>
+          <a:p>
+            <a:pPr defTabSz="914400">
+              <a:lnSpc>
+                <a:spcPct val="120000"/>
+              </a:lnSpc>
+              <a:spcBef>
+                <a:spcPts val="1000"/>
+              </a:spcBef>
+              <a:buClr>
+                <a:schemeClr val="tx1"/>
+              </a:buClr>
+            </a:pPr>
+            <a:r>
+              <a:rPr lang="en-US" sz="2000" cap="all" dirty="0"/>
+              <a:t>Class    8 :  0.4407</a:t>
+            </a:r>
+          </a:p>
+          <a:p>
+            <a:pPr defTabSz="914400">
+              <a:lnSpc>
+                <a:spcPct val="120000"/>
+              </a:lnSpc>
+              <a:spcBef>
+                <a:spcPts val="1000"/>
+              </a:spcBef>
+              <a:buClr>
+                <a:schemeClr val="tx1"/>
+              </a:buClr>
+            </a:pPr>
+            <a:r>
+              <a:rPr lang="en-US" sz="2000" cap="all" dirty="0"/>
+              <a:t>Class    9 :  0.7529</a:t>
+            </a:r>
+          </a:p>
+          <a:p>
+            <a:pPr defTabSz="914400">
+              <a:lnSpc>
+                <a:spcPct val="120000"/>
+              </a:lnSpc>
+              <a:spcBef>
+                <a:spcPts val="1000"/>
+              </a:spcBef>
+              <a:buClr>
+                <a:schemeClr val="tx1"/>
+              </a:buClr>
+            </a:pPr>
+            <a:r>
+              <a:rPr lang="en-US" sz="2000" cap="all" dirty="0"/>
+              <a:t>Class  10 :  0.694</a:t>
+            </a:r>
+          </a:p>
+          <a:p>
+            <a:pPr defTabSz="914400">
+              <a:lnSpc>
+                <a:spcPct val="120000"/>
+              </a:lnSpc>
+              <a:spcBef>
+                <a:spcPts val="1000"/>
+              </a:spcBef>
+              <a:buClr>
+                <a:schemeClr val="tx1"/>
+              </a:buClr>
+            </a:pPr>
+            <a:r>
+              <a:rPr lang="en-US" sz="2000" cap="all" dirty="0"/>
+              <a:t>Class  11 :  0.8085</a:t>
+            </a:r>
+          </a:p>
+          <a:p>
+            <a:pPr defTabSz="914400">
+              <a:lnSpc>
+                <a:spcPct val="120000"/>
+              </a:lnSpc>
+              <a:spcBef>
+                <a:spcPts val="1000"/>
+              </a:spcBef>
+              <a:buClr>
+                <a:schemeClr val="tx1"/>
+              </a:buClr>
+            </a:pPr>
+            <a:r>
+              <a:rPr lang="en-US" sz="2000" cap="all" dirty="0"/>
+              <a:t>Class  12 :  0.6538</a:t>
+            </a:r>
+          </a:p>
+          <a:p>
+            <a:pPr defTabSz="914400">
+              <a:lnSpc>
+                <a:spcPct val="120000"/>
+              </a:lnSpc>
+              <a:spcBef>
+                <a:spcPts val="1000"/>
+              </a:spcBef>
+              <a:buClr>
+                <a:schemeClr val="tx1"/>
+              </a:buClr>
+            </a:pPr>
+            <a:r>
+              <a:rPr lang="en-US" sz="2000" cap="all" dirty="0"/>
+              <a:t>Class  13 :  0.5714</a:t>
+            </a:r>
+          </a:p>
+          <a:p>
+            <a:pPr defTabSz="914400">
+              <a:lnSpc>
+                <a:spcPct val="120000"/>
+              </a:lnSpc>
+              <a:spcBef>
+                <a:spcPts val="1000"/>
+              </a:spcBef>
+              <a:buClr>
+                <a:schemeClr val="tx1"/>
+              </a:buClr>
+            </a:pPr>
+            <a:r>
+              <a:rPr lang="en-US" sz="2000" cap="all" dirty="0"/>
+              <a:t>Class  14 :  0.6545</a:t>
+            </a:r>
+          </a:p>
+          <a:p>
+            <a:pPr defTabSz="914400">
+              <a:lnSpc>
+                <a:spcPct val="120000"/>
+              </a:lnSpc>
+              <a:spcBef>
+                <a:spcPts val="1000"/>
+              </a:spcBef>
+              <a:buClr>
+                <a:schemeClr val="tx1"/>
+              </a:buClr>
+            </a:pPr>
+            <a:r>
+              <a:rPr lang="en-US" sz="2000" cap="all" dirty="0"/>
+              <a:t>Class  15 :  0.0</a:t>
+            </a:r>
+          </a:p>
+        </p:txBody>
+      </p:sp>
+      <p:sp>
+        <p:nvSpPr>
+          <p:cNvPr id="9" name="TextBox 8">
+            <a:extLst>
+              <a:ext uri="{FF2B5EF4-FFF2-40B4-BE49-F238E27FC236}">
+                <a16:creationId xmlns:a16="http://schemas.microsoft.com/office/drawing/2014/main" id="{C3FAF612-05D3-407A-82FA-4D2D89A4FA76}"/>
+              </a:ext>
+            </a:extLst>
+          </p:cNvPr>
+          <p:cNvSpPr txBox="1"/>
+          <p:nvPr/>
+        </p:nvSpPr>
+        <p:spPr>
+          <a:xfrm>
+            <a:off x="5494641" y="2108718"/>
+            <a:ext cx="6053260" cy="4524315"/>
+          </a:xfrm>
+          <a:prstGeom prst="rect">
+            <a:avLst/>
+          </a:prstGeom>
+          <a:noFill/>
+        </p:spPr>
+        <p:txBody>
+          <a:bodyPr wrap="square" rtlCol="0">
+            <a:spAutoFit/>
+          </a:bodyPr>
+          <a:lstStyle/>
+          <a:p>
+            <a:r>
+              <a:rPr lang="en-US" dirty="0"/>
+              <a:t>[</a:t>
+            </a:r>
+            <a:r>
+              <a:rPr lang="en-US" b="1" dirty="0"/>
+              <a:t>15</a:t>
+            </a:r>
+            <a:r>
+              <a:rPr lang="en-US" dirty="0"/>
+              <a:t>   0    4   0    0    1   1   0    2    3  16    0    1    0    1   0]</a:t>
+            </a:r>
+          </a:p>
+          <a:p>
+            <a:r>
+              <a:rPr lang="en-US" dirty="0"/>
+              <a:t>[  0   </a:t>
+            </a:r>
+            <a:r>
+              <a:rPr lang="en-US" b="1" dirty="0"/>
+              <a:t>5</a:t>
+            </a:r>
+            <a:r>
+              <a:rPr lang="en-US" dirty="0"/>
+              <a:t>    0   0    0    0   0   0    0    0    4    2    0    0    1   0]</a:t>
+            </a:r>
+          </a:p>
+          <a:p>
+            <a:r>
+              <a:rPr lang="en-US" dirty="0"/>
+              <a:t>[  1   0  </a:t>
+            </a:r>
+            <a:r>
+              <a:rPr lang="en-US" b="1" dirty="0"/>
+              <a:t>90</a:t>
+            </a:r>
+            <a:r>
+              <a:rPr lang="en-US" dirty="0"/>
+              <a:t>   0    1    0   0   0    3    2  10    2    1    0    1   0]</a:t>
+            </a:r>
+          </a:p>
+          <a:p>
+            <a:r>
+              <a:rPr lang="en-US" dirty="0"/>
+              <a:t>[  0   0    0   </a:t>
+            </a:r>
+            <a:r>
+              <a:rPr lang="en-US" b="1" dirty="0"/>
+              <a:t>0</a:t>
+            </a:r>
+            <a:r>
+              <a:rPr lang="en-US" dirty="0"/>
+              <a:t>    0    0   0   0    0    0    0    0    0    0    1   0]</a:t>
+            </a:r>
+          </a:p>
+          <a:p>
+            <a:r>
+              <a:rPr lang="en-US" dirty="0"/>
+              <a:t>[  0   1    1   0  </a:t>
+            </a:r>
+            <a:r>
+              <a:rPr lang="en-US" b="1" dirty="0"/>
+              <a:t>15</a:t>
+            </a:r>
+            <a:r>
+              <a:rPr lang="en-US" dirty="0"/>
+              <a:t>    0   0   0    2    0    1    0    0    0    0   0]</a:t>
+            </a:r>
+          </a:p>
+          <a:p>
+            <a:r>
+              <a:rPr lang="en-US" dirty="0"/>
+              <a:t>[  3   0    1   0    1  </a:t>
+            </a:r>
+            <a:r>
+              <a:rPr lang="en-US" b="1" dirty="0"/>
+              <a:t>49</a:t>
+            </a:r>
+            <a:r>
+              <a:rPr lang="en-US" dirty="0"/>
+              <a:t>   0   0    3    0    4    4    0    0    0   0]</a:t>
+            </a:r>
+          </a:p>
+          <a:p>
+            <a:r>
+              <a:rPr lang="en-US" dirty="0"/>
+              <a:t>[  0   1    0   0    1    0   </a:t>
+            </a:r>
+            <a:r>
+              <a:rPr lang="en-US" b="1" dirty="0"/>
+              <a:t>4</a:t>
+            </a:r>
+            <a:r>
+              <a:rPr lang="en-US" dirty="0"/>
+              <a:t>   0    1    0    2    2    1    0    0   0]</a:t>
+            </a:r>
+          </a:p>
+          <a:p>
+            <a:r>
+              <a:rPr lang="en-US" dirty="0"/>
+              <a:t>[  0   0    1   0    1    1   0   </a:t>
+            </a:r>
+            <a:r>
+              <a:rPr lang="en-US" b="1" dirty="0"/>
+              <a:t>4</a:t>
+            </a:r>
+            <a:r>
+              <a:rPr lang="en-US" dirty="0"/>
+              <a:t>    0    0    3    0    0    0    1   0]</a:t>
+            </a:r>
+          </a:p>
+          <a:p>
+            <a:r>
+              <a:rPr lang="en-US" dirty="0"/>
+              <a:t>[  1   1    9   0    1    1   0   1  </a:t>
+            </a:r>
+            <a:r>
+              <a:rPr lang="en-US" b="1" dirty="0"/>
+              <a:t>26</a:t>
+            </a:r>
+            <a:r>
+              <a:rPr lang="en-US" dirty="0"/>
+              <a:t>    2    9    3    2    1    2   0]</a:t>
+            </a:r>
+          </a:p>
+          <a:p>
+            <a:r>
+              <a:rPr lang="en-US" dirty="0"/>
+              <a:t>[  0   0    1   0    1    2   0   0    2  </a:t>
+            </a:r>
+            <a:r>
+              <a:rPr lang="en-US" b="1" dirty="0"/>
+              <a:t>64</a:t>
+            </a:r>
+            <a:r>
+              <a:rPr lang="en-US" dirty="0"/>
+              <a:t>  13    1    1    0    0   0]</a:t>
+            </a:r>
+          </a:p>
+          <a:p>
+            <a:r>
+              <a:rPr lang="en-US" dirty="0"/>
+              <a:t>[  5   0  14   0    2    4   3   3  12  10 </a:t>
+            </a:r>
+            <a:r>
+              <a:rPr lang="en-US" b="1" dirty="0"/>
+              <a:t>161</a:t>
+            </a:r>
+            <a:r>
+              <a:rPr lang="en-US" dirty="0"/>
+              <a:t>   7    9    0    2   0]</a:t>
+            </a:r>
+          </a:p>
+          <a:p>
+            <a:r>
+              <a:rPr lang="en-US" dirty="0"/>
+              <a:t>[  0   0    2   0    1    4   0   0    3    1    3  </a:t>
+            </a:r>
+            <a:r>
+              <a:rPr lang="en-US" b="1" dirty="0"/>
+              <a:t>76</a:t>
+            </a:r>
+            <a:r>
+              <a:rPr lang="en-US" dirty="0"/>
+              <a:t>    0    1    3   0]</a:t>
+            </a:r>
+          </a:p>
+          <a:p>
+            <a:r>
+              <a:rPr lang="en-US" dirty="0"/>
+              <a:t>[  1   0    2   0    0    2   0   0    9    0  11    1  </a:t>
+            </a:r>
+            <a:r>
+              <a:rPr lang="en-US" b="1" dirty="0"/>
+              <a:t>51</a:t>
+            </a:r>
+            <a:r>
+              <a:rPr lang="en-US" dirty="0"/>
+              <a:t>    0    1   0]</a:t>
+            </a:r>
+          </a:p>
+          <a:p>
+            <a:r>
+              <a:rPr lang="en-US" dirty="0"/>
+              <a:t>[  0   0    0   0    1    0   0   0    2    1    2    1    5  </a:t>
+            </a:r>
+            <a:r>
+              <a:rPr lang="en-US" b="1" dirty="0"/>
+              <a:t>16</a:t>
+            </a:r>
+            <a:r>
+              <a:rPr lang="en-US" dirty="0"/>
+              <a:t>    0   0]</a:t>
+            </a:r>
+          </a:p>
+          <a:p>
+            <a:r>
+              <a:rPr lang="en-US" dirty="0"/>
+              <a:t>[  1   0    2   0    1    0   0   0    6    0    2    1    4    2  </a:t>
+            </a:r>
+            <a:r>
+              <a:rPr lang="en-US" b="1" dirty="0"/>
+              <a:t>36</a:t>
+            </a:r>
+            <a:r>
+              <a:rPr lang="en-US" dirty="0"/>
+              <a:t>   0]</a:t>
+            </a:r>
+          </a:p>
+          <a:p>
+            <a:r>
+              <a:rPr lang="en-US" dirty="0"/>
+              <a:t>[  0   0    0   0    0    0   0   0    0    0    1    0    1    0    0   </a:t>
+            </a:r>
+            <a:r>
+              <a:rPr lang="en-US" b="1" dirty="0"/>
+              <a:t>0</a:t>
+            </a:r>
+            <a:r>
+              <a:rPr lang="en-US" dirty="0"/>
+              <a:t>]</a:t>
+            </a:r>
+          </a:p>
+        </p:txBody>
+      </p:sp>
+      <p:sp>
+        <p:nvSpPr>
+          <p:cNvPr id="10" name="TextBox 9">
+            <a:extLst>
+              <a:ext uri="{FF2B5EF4-FFF2-40B4-BE49-F238E27FC236}">
+                <a16:creationId xmlns:a16="http://schemas.microsoft.com/office/drawing/2014/main" id="{F1CF9517-081E-47CD-BE19-F905069D60ED}"/>
+              </a:ext>
+            </a:extLst>
+          </p:cNvPr>
+          <p:cNvSpPr txBox="1"/>
+          <p:nvPr/>
+        </p:nvSpPr>
+        <p:spPr>
+          <a:xfrm>
+            <a:off x="837147" y="1580764"/>
+            <a:ext cx="4373153" cy="461665"/>
+          </a:xfrm>
+          <a:prstGeom prst="rect">
+            <a:avLst/>
+          </a:prstGeom>
+          <a:noFill/>
+        </p:spPr>
+        <p:txBody>
+          <a:bodyPr wrap="square" rtlCol="0">
+            <a:spAutoFit/>
+          </a:bodyPr>
+          <a:lstStyle/>
+          <a:p>
+            <a:r>
+              <a:rPr lang="en-US" sz="2400" dirty="0"/>
+              <a:t>CLASS CONDITIONAL ACCURACY</a:t>
+            </a:r>
+          </a:p>
+        </p:txBody>
+      </p:sp>
+      <p:sp>
+        <p:nvSpPr>
+          <p:cNvPr id="11" name="TextBox 10">
+            <a:extLst>
+              <a:ext uri="{FF2B5EF4-FFF2-40B4-BE49-F238E27FC236}">
+                <a16:creationId xmlns:a16="http://schemas.microsoft.com/office/drawing/2014/main" id="{4C7BCDFE-A996-4FF1-AF66-F8D30A3362E2}"/>
+              </a:ext>
+            </a:extLst>
+          </p:cNvPr>
+          <p:cNvSpPr txBox="1"/>
+          <p:nvPr/>
+        </p:nvSpPr>
+        <p:spPr>
+          <a:xfrm>
+            <a:off x="7113321" y="1580763"/>
+            <a:ext cx="2815899" cy="461665"/>
+          </a:xfrm>
+          <a:prstGeom prst="rect">
+            <a:avLst/>
+          </a:prstGeom>
+          <a:noFill/>
+        </p:spPr>
+        <p:txBody>
+          <a:bodyPr wrap="none" rtlCol="0">
+            <a:spAutoFit/>
+          </a:bodyPr>
+          <a:lstStyle/>
+          <a:p>
+            <a:r>
+              <a:rPr lang="en-US" sz="2400" dirty="0"/>
+              <a:t>CONFUSION MATRIX</a:t>
             </a:r>
           </a:p>
         </p:txBody>
@@ -8789,7 +10338,7 @@
     </p:spTree>
     <p:extLst>
       <p:ext uri="{BB962C8B-B14F-4D97-AF65-F5344CB8AC3E}">
-        <p14:creationId xmlns:p14="http://schemas.microsoft.com/office/powerpoint/2010/main" val="1422983124"/>
+        <p14:creationId xmlns:p14="http://schemas.microsoft.com/office/powerpoint/2010/main" val="887475669"/>
       </p:ext>
     </p:extLst>
   </p:cSld>

</xml_diff>

<commit_message>
Finalized the report, made changes in ppt, comments on Classitube.py
</commit_message>
<xml_diff>
--- a/Categorizing YouTube Videos.pptx
+++ b/Categorizing YouTube Videos.pptx
@@ -13,10 +13,10 @@
     <p:sldId id="261" r:id="rId4"/>
     <p:sldId id="274" r:id="rId5"/>
     <p:sldId id="273" r:id="rId6"/>
-    <p:sldId id="258" r:id="rId7"/>
-    <p:sldId id="264" r:id="rId8"/>
-    <p:sldId id="268" r:id="rId9"/>
-    <p:sldId id="275" r:id="rId10"/>
+    <p:sldId id="268" r:id="rId7"/>
+    <p:sldId id="275" r:id="rId8"/>
+    <p:sldId id="264" r:id="rId9"/>
+    <p:sldId id="258" r:id="rId10"/>
     <p:sldId id="266" r:id="rId11"/>
     <p:sldId id="271" r:id="rId12"/>
     <p:sldId id="272" r:id="rId13"/>
@@ -208,7 +208,7 @@
           <a:p>
             <a:fld id="{700893F5-AD44-E543-A245-95F38FF08452}" type="datetimeFigureOut">
               <a:rPr lang="en-US" smtClean="0"/>
-              <a:t>4/26/2018</a:t>
+              <a:t>4/27/2018</a:t>
             </a:fld>
             <a:endParaRPr lang="en-US"/>
           </a:p>
@@ -646,7 +646,7 @@
           <a:p>
             <a:fld id="{F8F32E06-09F6-479A-86EB-0AE786A442BF}" type="datetimeFigureOut">
               <a:rPr lang="en-US" smtClean="0"/>
-              <a:t>4/26/2018</a:t>
+              <a:t>4/27/2018</a:t>
             </a:fld>
             <a:endParaRPr lang="en-US"/>
           </a:p>
@@ -961,7 +961,7 @@
           <a:p>
             <a:fld id="{F8F32E06-09F6-479A-86EB-0AE786A442BF}" type="datetimeFigureOut">
               <a:rPr lang="en-US" smtClean="0"/>
-              <a:t>4/26/2018</a:t>
+              <a:t>4/27/2018</a:t>
             </a:fld>
             <a:endParaRPr lang="en-US"/>
           </a:p>
@@ -1183,7 +1183,7 @@
           <a:p>
             <a:fld id="{F8F32E06-09F6-479A-86EB-0AE786A442BF}" type="datetimeFigureOut">
               <a:rPr lang="en-US" smtClean="0"/>
-              <a:t>4/26/2018</a:t>
+              <a:t>4/27/2018</a:t>
             </a:fld>
             <a:endParaRPr lang="en-US"/>
           </a:p>
@@ -1474,7 +1474,7 @@
           <a:p>
             <a:fld id="{F8F32E06-09F6-479A-86EB-0AE786A442BF}" type="datetimeFigureOut">
               <a:rPr lang="en-US" smtClean="0"/>
-              <a:t>4/26/2018</a:t>
+              <a:t>4/27/2018</a:t>
             </a:fld>
             <a:endParaRPr lang="en-US"/>
           </a:p>
@@ -1928,7 +1928,7 @@
           <a:p>
             <a:fld id="{F8F32E06-09F6-479A-86EB-0AE786A442BF}" type="datetimeFigureOut">
               <a:rPr lang="en-US" smtClean="0"/>
-              <a:t>4/26/2018</a:t>
+              <a:t>4/27/2018</a:t>
             </a:fld>
             <a:endParaRPr lang="en-US"/>
           </a:p>
@@ -2504,7 +2504,7 @@
           <a:p>
             <a:fld id="{F8F32E06-09F6-479A-86EB-0AE786A442BF}" type="datetimeFigureOut">
               <a:rPr lang="en-US" smtClean="0"/>
-              <a:t>4/26/2018</a:t>
+              <a:t>4/27/2018</a:t>
             </a:fld>
             <a:endParaRPr lang="en-US"/>
           </a:p>
@@ -3365,7 +3365,7 @@
           <a:p>
             <a:fld id="{F8F32E06-09F6-479A-86EB-0AE786A442BF}" type="datetimeFigureOut">
               <a:rPr lang="en-US" smtClean="0"/>
-              <a:t>4/26/2018</a:t>
+              <a:t>4/27/2018</a:t>
             </a:fld>
             <a:endParaRPr lang="en-US"/>
           </a:p>
@@ -3570,7 +3570,7 @@
           <a:p>
             <a:fld id="{F8F32E06-09F6-479A-86EB-0AE786A442BF}" type="datetimeFigureOut">
               <a:rPr lang="en-US" smtClean="0"/>
-              <a:t>4/26/2018</a:t>
+              <a:t>4/27/2018</a:t>
             </a:fld>
             <a:endParaRPr lang="en-US"/>
           </a:p>
@@ -3784,7 +3784,7 @@
           <a:p>
             <a:fld id="{F8F32E06-09F6-479A-86EB-0AE786A442BF}" type="datetimeFigureOut">
               <a:rPr lang="en-US" smtClean="0"/>
-              <a:t>4/26/2018</a:t>
+              <a:t>4/27/2018</a:t>
             </a:fld>
             <a:endParaRPr lang="en-US"/>
           </a:p>
@@ -3989,7 +3989,7 @@
           <a:p>
             <a:fld id="{F8F32E06-09F6-479A-86EB-0AE786A442BF}" type="datetimeFigureOut">
               <a:rPr lang="en-US" smtClean="0"/>
-              <a:t>4/26/2018</a:t>
+              <a:t>4/27/2018</a:t>
             </a:fld>
             <a:endParaRPr lang="en-US"/>
           </a:p>
@@ -4269,7 +4269,7 @@
           <a:p>
             <a:fld id="{F8F32E06-09F6-479A-86EB-0AE786A442BF}" type="datetimeFigureOut">
               <a:rPr lang="en-US" smtClean="0"/>
-              <a:t>4/26/2018</a:t>
+              <a:t>4/27/2018</a:t>
             </a:fld>
             <a:endParaRPr lang="en-US"/>
           </a:p>
@@ -4536,7 +4536,7 @@
           <a:p>
             <a:fld id="{F8F32E06-09F6-479A-86EB-0AE786A442BF}" type="datetimeFigureOut">
               <a:rPr lang="en-US" smtClean="0"/>
-              <a:t>4/26/2018</a:t>
+              <a:t>4/27/2018</a:t>
             </a:fld>
             <a:endParaRPr lang="en-US"/>
           </a:p>
@@ -4951,7 +4951,7 @@
           <a:p>
             <a:fld id="{F8F32E06-09F6-479A-86EB-0AE786A442BF}" type="datetimeFigureOut">
               <a:rPr lang="en-US" smtClean="0"/>
-              <a:t>4/26/2018</a:t>
+              <a:t>4/27/2018</a:t>
             </a:fld>
             <a:endParaRPr lang="en-US"/>
           </a:p>
@@ -5099,7 +5099,7 @@
           <a:p>
             <a:fld id="{F8F32E06-09F6-479A-86EB-0AE786A442BF}" type="datetimeFigureOut">
               <a:rPr lang="en-US" smtClean="0"/>
-              <a:t>4/26/2018</a:t>
+              <a:t>4/27/2018</a:t>
             </a:fld>
             <a:endParaRPr lang="en-US"/>
           </a:p>
@@ -5224,7 +5224,7 @@
           <a:p>
             <a:fld id="{F8F32E06-09F6-479A-86EB-0AE786A442BF}" type="datetimeFigureOut">
               <a:rPr lang="en-US" smtClean="0"/>
-              <a:t>4/26/2018</a:t>
+              <a:t>4/27/2018</a:t>
             </a:fld>
             <a:endParaRPr lang="en-US"/>
           </a:p>
@@ -5503,7 +5503,7 @@
           <a:p>
             <a:fld id="{F8F32E06-09F6-479A-86EB-0AE786A442BF}" type="datetimeFigureOut">
               <a:rPr lang="en-US" smtClean="0"/>
-              <a:t>4/26/2018</a:t>
+              <a:t>4/27/2018</a:t>
             </a:fld>
             <a:endParaRPr lang="en-US"/>
           </a:p>
@@ -5818,7 +5818,7 @@
           <a:p>
             <a:fld id="{F8F32E06-09F6-479A-86EB-0AE786A442BF}" type="datetimeFigureOut">
               <a:rPr lang="en-US" smtClean="0"/>
-              <a:t>4/26/2018</a:t>
+              <a:t>4/27/2018</a:t>
             </a:fld>
             <a:endParaRPr lang="en-US"/>
           </a:p>
@@ -6071,7 +6071,7 @@
           <a:p>
             <a:fld id="{F8F32E06-09F6-479A-86EB-0AE786A442BF}" type="datetimeFigureOut">
               <a:rPr lang="en-US" smtClean="0"/>
-              <a:t>4/26/2018</a:t>
+              <a:t>4/27/2018</a:t>
             </a:fld>
             <a:endParaRPr lang="en-US"/>
           </a:p>
@@ -6698,7 +6698,7 @@
           <a:p>
             <a:r>
               <a:rPr lang="en-US" dirty="0"/>
-              <a:t>successfully obtained a model that can classify the videos with 74% accuracy. </a:t>
+              <a:t>successfully obtained a Neural Network model that can classify the videos with 74% accuracy. </a:t>
             </a:r>
           </a:p>
           <a:p>
@@ -6782,6 +6782,46 @@
               <a:rPr lang="en-US" sz="2400" dirty="0"/>
               <a:t>LECTURES SLIDES BY DR. JIN TIAN FOR COM S 574X SPRING 2018, ISU</a:t>
             </a:r>
+          </a:p>
+          <a:p>
+            <a:pPr lvl="0"/>
+            <a:r>
+              <a:rPr lang="en-US" sz="2400" dirty="0"/>
+              <a:t>http://</a:t>
+            </a:r>
+            <a:r>
+              <a:rPr lang="en-US" sz="2400" dirty="0" err="1"/>
+              <a:t>www.tfidf.com</a:t>
+            </a:r>
+            <a:r>
+              <a:rPr lang="en-US" sz="2400" dirty="0"/>
+              <a:t>/ </a:t>
+            </a:r>
+            <a:r>
+              <a:rPr lang="en-US" sz="2400" dirty="0" err="1"/>
+              <a:t>n.d.</a:t>
+            </a:r>
+            <a:endParaRPr lang="en-US" sz="2400" dirty="0"/>
+          </a:p>
+          <a:p>
+            <a:pPr lvl="0"/>
+            <a:r>
+              <a:rPr lang="en-US" sz="2400" dirty="0"/>
+              <a:t>https://</a:t>
+            </a:r>
+            <a:r>
+              <a:rPr lang="en-US" sz="2400" dirty="0" err="1"/>
+              <a:t>en.wikipedia.org</a:t>
+            </a:r>
+            <a:r>
+              <a:rPr lang="en-US" sz="2400" dirty="0"/>
+              <a:t>/wiki/</a:t>
+            </a:r>
+            <a:r>
+              <a:rPr lang="en-US" sz="2400" dirty="0" err="1"/>
+              <a:t>Principal_component_analysis</a:t>
+            </a:r>
+            <a:endParaRPr lang="en-US" sz="2400" dirty="0"/>
           </a:p>
           <a:p>
             <a:r>
@@ -7551,7 +7591,7 @@
         <p:spPr>
           <a:xfrm>
             <a:off x="913774" y="562534"/>
-            <a:ext cx="10364451" cy="762413"/>
+            <a:ext cx="10364451" cy="1596177"/>
           </a:xfrm>
         </p:spPr>
         <p:txBody>
@@ -7560,115 +7600,533 @@
           <a:p>
             <a:r>
               <a:rPr lang="en-US" dirty="0"/>
-              <a:t>Neural networks</a:t>
-            </a:r>
-          </a:p>
-        </p:txBody>
-      </p:sp>
-      <p:sp>
-        <p:nvSpPr>
-          <p:cNvPr id="3" name="Content Placeholder 2">
+              <a:t>K Nearest neighbor</a:t>
+            </a:r>
+          </a:p>
+        </p:txBody>
+      </p:sp>
+      <p:graphicFrame>
+        <p:nvGraphicFramePr>
+          <p:cNvPr id="4" name="Content Placeholder 3">
             <a:extLst>
               <a:ext uri="{FF2B5EF4-FFF2-40B4-BE49-F238E27FC236}">
-                <a16:creationId xmlns:a16="http://schemas.microsoft.com/office/drawing/2014/main" id="{07716CFF-3B18-4811-89AB-74BD3754B4E6}"/>
+                <a16:creationId xmlns:a16="http://schemas.microsoft.com/office/drawing/2014/main" id="{7F9852A4-35FB-4EA9-87C7-C83C416CB9E5}"/>
               </a:ext>
             </a:extLst>
           </p:cNvPr>
-          <p:cNvSpPr>
-            <a:spLocks noGrp="1"/>
-          </p:cNvSpPr>
+          <p:cNvGraphicFramePr>
+            <a:graphicFrameLocks noGrp="1"/>
+          </p:cNvGraphicFramePr>
           <p:nvPr>
             <p:ph sz="quarter" idx="13"/>
-          </p:nvPr>
-        </p:nvSpPr>
+            <p:extLst>
+              <p:ext uri="{D42A27DB-BD31-4B8C-83A1-F6EECF244321}">
+                <p14:modId xmlns:p14="http://schemas.microsoft.com/office/powerpoint/2010/main" val="2130434925"/>
+              </p:ext>
+            </p:extLst>
+          </p:nvPr>
+        </p:nvGraphicFramePr>
+        <p:xfrm>
+          <a:off x="1087640" y="2158711"/>
+          <a:ext cx="4834494" cy="3876047"/>
+        </p:xfrm>
+        <a:graphic>
+          <a:graphicData uri="http://schemas.openxmlformats.org/drawingml/2006/table">
+            <a:tbl>
+              <a:tblPr firstRow="1" firstCol="1" bandRow="1">
+                <a:tableStyleId>{9D7B26C5-4107-4FEC-AEDC-1716B250A1EF}</a:tableStyleId>
+              </a:tblPr>
+              <a:tblGrid>
+                <a:gridCol w="2417247">
+                  <a:extLst>
+                    <a:ext uri="{9D8B030D-6E8A-4147-A177-3AD203B41FA5}">
+                      <a16:colId xmlns:a16="http://schemas.microsoft.com/office/drawing/2014/main" val="20000"/>
+                    </a:ext>
+                  </a:extLst>
+                </a:gridCol>
+                <a:gridCol w="2417247">
+                  <a:extLst>
+                    <a:ext uri="{9D8B030D-6E8A-4147-A177-3AD203B41FA5}">
+                      <a16:colId xmlns:a16="http://schemas.microsoft.com/office/drawing/2014/main" val="20001"/>
+                    </a:ext>
+                  </a:extLst>
+                </a:gridCol>
+              </a:tblGrid>
+              <a:tr h="660624">
+                <a:tc gridSpan="2">
+                  <a:txBody>
+                    <a:bodyPr/>
+                    <a:lstStyle/>
+                    <a:p>
+                      <a:pPr marL="0" marR="0" algn="ctr">
+                        <a:lnSpc>
+                          <a:spcPct val="115000"/>
+                        </a:lnSpc>
+                        <a:spcBef>
+                          <a:spcPts val="0"/>
+                        </a:spcBef>
+                        <a:spcAft>
+                          <a:spcPts val="0"/>
+                        </a:spcAft>
+                        <a:tabLst>
+                          <a:tab pos="127000" algn="l"/>
+                        </a:tabLst>
+                      </a:pPr>
+                      <a:r>
+                        <a:rPr lang="en-US" sz="2400" dirty="0">
+                          <a:effectLst/>
+                        </a:rPr>
+                        <a:t>K-Nearest Neighbors</a:t>
+                      </a:r>
+                      <a:endParaRPr lang="en-US" sz="2400" b="1" dirty="0">
+                        <a:effectLst/>
+                        <a:latin typeface="Times" charset="0"/>
+                        <a:ea typeface="Times New Roman" charset="0"/>
+                        <a:cs typeface="Times New Roman" charset="0"/>
+                      </a:endParaRPr>
+                    </a:p>
+                  </a:txBody>
+                  <a:tcPr marL="68580" marR="68580" marT="0" marB="0"/>
+                </a:tc>
+                <a:tc hMerge="1">
+                  <a:txBody>
+                    <a:bodyPr/>
+                    <a:lstStyle/>
+                    <a:p>
+                      <a:endParaRPr lang="en-US"/>
+                    </a:p>
+                  </a:txBody>
+                  <a:tcPr/>
+                </a:tc>
+                <a:extLst>
+                  <a:ext uri="{0D108BD9-81ED-4DB2-BD59-A6C34878D82A}">
+                    <a16:rowId xmlns:a16="http://schemas.microsoft.com/office/drawing/2014/main" val="10000"/>
+                  </a:ext>
+                </a:extLst>
+              </a:tr>
+              <a:tr h="660624">
+                <a:tc>
+                  <a:txBody>
+                    <a:bodyPr/>
+                    <a:lstStyle/>
+                    <a:p>
+                      <a:pPr marL="0" marR="0" algn="ctr">
+                        <a:lnSpc>
+                          <a:spcPct val="115000"/>
+                        </a:lnSpc>
+                        <a:spcBef>
+                          <a:spcPts val="0"/>
+                        </a:spcBef>
+                        <a:spcAft>
+                          <a:spcPts val="0"/>
+                        </a:spcAft>
+                        <a:tabLst>
+                          <a:tab pos="127000" algn="l"/>
+                        </a:tabLst>
+                      </a:pPr>
+                      <a:r>
+                        <a:rPr lang="en-US" sz="2400" b="1" kern="1200" dirty="0">
+                          <a:solidFill>
+                            <a:schemeClr val="tx1"/>
+                          </a:solidFill>
+                          <a:effectLst/>
+                          <a:latin typeface="+mn-lt"/>
+                          <a:ea typeface="+mn-ea"/>
+                          <a:cs typeface="+mn-cs"/>
+                        </a:rPr>
+                        <a:t>K</a:t>
+                      </a:r>
+                    </a:p>
+                  </a:txBody>
+                  <a:tcPr marL="68580" marR="68580" marT="0" marB="0" anchor="ctr"/>
+                </a:tc>
+                <a:tc>
+                  <a:txBody>
+                    <a:bodyPr/>
+                    <a:lstStyle/>
+                    <a:p>
+                      <a:pPr marL="0" marR="0" algn="ctr">
+                        <a:lnSpc>
+                          <a:spcPct val="115000"/>
+                        </a:lnSpc>
+                        <a:spcBef>
+                          <a:spcPts val="0"/>
+                        </a:spcBef>
+                        <a:spcAft>
+                          <a:spcPts val="0"/>
+                        </a:spcAft>
+                        <a:tabLst>
+                          <a:tab pos="127000" algn="l"/>
+                        </a:tabLst>
+                      </a:pPr>
+                      <a:r>
+                        <a:rPr lang="en-US" sz="2400" b="0" kern="1200" dirty="0">
+                          <a:solidFill>
+                            <a:schemeClr val="tx1"/>
+                          </a:solidFill>
+                          <a:effectLst/>
+                          <a:latin typeface="+mn-lt"/>
+                          <a:ea typeface="+mn-ea"/>
+                          <a:cs typeface="+mn-cs"/>
+                        </a:rPr>
+                        <a:t>5</a:t>
+                      </a:r>
+                    </a:p>
+                  </a:txBody>
+                  <a:tcPr marL="68580" marR="68580" marT="0" marB="0" anchor="ctr"/>
+                </a:tc>
+                <a:extLst>
+                  <a:ext uri="{0D108BD9-81ED-4DB2-BD59-A6C34878D82A}">
+                    <a16:rowId xmlns:a16="http://schemas.microsoft.com/office/drawing/2014/main" val="10001"/>
+                  </a:ext>
+                </a:extLst>
+              </a:tr>
+              <a:tr h="1010469">
+                <a:tc>
+                  <a:txBody>
+                    <a:bodyPr/>
+                    <a:lstStyle/>
+                    <a:p>
+                      <a:pPr marL="0" marR="0" algn="ctr">
+                        <a:lnSpc>
+                          <a:spcPct val="115000"/>
+                        </a:lnSpc>
+                        <a:spcBef>
+                          <a:spcPts val="0"/>
+                        </a:spcBef>
+                        <a:spcAft>
+                          <a:spcPts val="0"/>
+                        </a:spcAft>
+                        <a:tabLst>
+                          <a:tab pos="127000" algn="l"/>
+                        </a:tabLst>
+                      </a:pPr>
+                      <a:r>
+                        <a:rPr lang="en-US" sz="2400" dirty="0">
+                          <a:effectLst/>
+                        </a:rPr>
+                        <a:t>Features Used </a:t>
+                      </a:r>
+                      <a:endParaRPr lang="en-US" sz="2400" b="1" dirty="0">
+                        <a:effectLst/>
+                        <a:latin typeface="Times" charset="0"/>
+                        <a:ea typeface="Times New Roman" charset="0"/>
+                        <a:cs typeface="Times New Roman" charset="0"/>
+                      </a:endParaRPr>
+                    </a:p>
+                  </a:txBody>
+                  <a:tcPr marL="68580" marR="68580" marT="0" marB="0" anchor="ctr"/>
+                </a:tc>
+                <a:tc>
+                  <a:txBody>
+                    <a:bodyPr/>
+                    <a:lstStyle/>
+                    <a:p>
+                      <a:pPr marL="0" marR="0" algn="ctr">
+                        <a:lnSpc>
+                          <a:spcPct val="115000"/>
+                        </a:lnSpc>
+                        <a:spcBef>
+                          <a:spcPts val="0"/>
+                        </a:spcBef>
+                        <a:spcAft>
+                          <a:spcPts val="0"/>
+                        </a:spcAft>
+                        <a:tabLst>
+                          <a:tab pos="127000" algn="l"/>
+                        </a:tabLst>
+                      </a:pPr>
+                      <a:r>
+                        <a:rPr lang="en-US" sz="2400" kern="1200" dirty="0">
+                          <a:solidFill>
+                            <a:schemeClr val="tx1"/>
+                          </a:solidFill>
+                          <a:effectLst/>
+                          <a:latin typeface="+mn-lt"/>
+                          <a:ea typeface="+mn-ea"/>
+                          <a:cs typeface="+mn-cs"/>
+                        </a:rPr>
+                        <a:t>Tags, Title, Description, Tag Count</a:t>
+                      </a:r>
+                      <a:endParaRPr lang="en-US" sz="2400" b="1" dirty="0">
+                        <a:effectLst/>
+                        <a:latin typeface="Times" charset="0"/>
+                        <a:ea typeface="Times New Roman" charset="0"/>
+                        <a:cs typeface="Times New Roman" charset="0"/>
+                      </a:endParaRPr>
+                    </a:p>
+                  </a:txBody>
+                  <a:tcPr marL="68580" marR="68580" marT="0" marB="0" anchor="ctr"/>
+                </a:tc>
+                <a:extLst>
+                  <a:ext uri="{0D108BD9-81ED-4DB2-BD59-A6C34878D82A}">
+                    <a16:rowId xmlns:a16="http://schemas.microsoft.com/office/drawing/2014/main" val="10002"/>
+                  </a:ext>
+                </a:extLst>
+              </a:tr>
+              <a:tr h="660624">
+                <a:tc>
+                  <a:txBody>
+                    <a:bodyPr/>
+                    <a:lstStyle/>
+                    <a:p>
+                      <a:pPr marL="0" marR="0" algn="ctr">
+                        <a:lnSpc>
+                          <a:spcPct val="115000"/>
+                        </a:lnSpc>
+                        <a:spcBef>
+                          <a:spcPts val="0"/>
+                        </a:spcBef>
+                        <a:spcAft>
+                          <a:spcPts val="0"/>
+                        </a:spcAft>
+                        <a:tabLst>
+                          <a:tab pos="127000" algn="l"/>
+                        </a:tabLst>
+                      </a:pPr>
+                      <a:r>
+                        <a:rPr lang="en-US" sz="2400" dirty="0">
+                          <a:effectLst/>
+                        </a:rPr>
+                        <a:t>Accuracy</a:t>
+                      </a:r>
+                      <a:endParaRPr lang="en-US" sz="2400" b="1" dirty="0">
+                        <a:effectLst/>
+                        <a:latin typeface="Times" charset="0"/>
+                        <a:ea typeface="Times New Roman" charset="0"/>
+                        <a:cs typeface="Times New Roman" charset="0"/>
+                      </a:endParaRPr>
+                    </a:p>
+                  </a:txBody>
+                  <a:tcPr marL="68580" marR="68580" marT="0" marB="0" anchor="ctr"/>
+                </a:tc>
+                <a:tc>
+                  <a:txBody>
+                    <a:bodyPr/>
+                    <a:lstStyle/>
+                    <a:p>
+                      <a:pPr marL="0" marR="0" algn="ctr">
+                        <a:lnSpc>
+                          <a:spcPct val="115000"/>
+                        </a:lnSpc>
+                        <a:spcBef>
+                          <a:spcPts val="0"/>
+                        </a:spcBef>
+                        <a:spcAft>
+                          <a:spcPts val="0"/>
+                        </a:spcAft>
+                        <a:tabLst>
+                          <a:tab pos="127000" algn="l"/>
+                        </a:tabLst>
+                      </a:pPr>
+                      <a:r>
+                        <a:rPr lang="en-US" sz="2400" kern="1200" dirty="0">
+                          <a:solidFill>
+                            <a:schemeClr val="tx1"/>
+                          </a:solidFill>
+                          <a:effectLst/>
+                          <a:latin typeface="+mn-lt"/>
+                          <a:ea typeface="+mn-ea"/>
+                          <a:cs typeface="+mn-cs"/>
+                        </a:rPr>
+                        <a:t>67.7 percent</a:t>
+                      </a:r>
+                    </a:p>
+                  </a:txBody>
+                  <a:tcPr marL="68580" marR="68580" marT="0" marB="0" anchor="ctr"/>
+                </a:tc>
+                <a:extLst>
+                  <a:ext uri="{0D108BD9-81ED-4DB2-BD59-A6C34878D82A}">
+                    <a16:rowId xmlns:a16="http://schemas.microsoft.com/office/drawing/2014/main" val="10003"/>
+                  </a:ext>
+                </a:extLst>
+              </a:tr>
+              <a:tr h="660624">
+                <a:tc>
+                  <a:txBody>
+                    <a:bodyPr/>
+                    <a:lstStyle/>
+                    <a:p>
+                      <a:pPr marL="0" marR="0" algn="ctr">
+                        <a:lnSpc>
+                          <a:spcPct val="115000"/>
+                        </a:lnSpc>
+                        <a:spcBef>
+                          <a:spcPts val="0"/>
+                        </a:spcBef>
+                        <a:spcAft>
+                          <a:spcPts val="0"/>
+                        </a:spcAft>
+                        <a:tabLst>
+                          <a:tab pos="127000" algn="l"/>
+                        </a:tabLst>
+                      </a:pPr>
+                      <a:r>
+                        <a:rPr lang="en-US" sz="2400" b="1" kern="1200" dirty="0">
+                          <a:solidFill>
+                            <a:schemeClr val="tx1"/>
+                          </a:solidFill>
+                          <a:effectLst/>
+                          <a:latin typeface="+mn-lt"/>
+                          <a:ea typeface="+mn-ea"/>
+                          <a:cs typeface="+mn-cs"/>
+                        </a:rPr>
+                        <a:t>Training Time</a:t>
+                      </a:r>
+                    </a:p>
+                  </a:txBody>
+                  <a:tcPr marL="68580" marR="68580" marT="0" marB="0" anchor="ctr"/>
+                </a:tc>
+                <a:tc>
+                  <a:txBody>
+                    <a:bodyPr/>
+                    <a:lstStyle/>
+                    <a:p>
+                      <a:pPr marL="0" marR="0" algn="ctr">
+                        <a:lnSpc>
+                          <a:spcPct val="115000"/>
+                        </a:lnSpc>
+                        <a:spcBef>
+                          <a:spcPts val="0"/>
+                        </a:spcBef>
+                        <a:spcAft>
+                          <a:spcPts val="0"/>
+                        </a:spcAft>
+                        <a:tabLst>
+                          <a:tab pos="127000" algn="l"/>
+                        </a:tabLst>
+                      </a:pPr>
+                      <a:r>
+                        <a:rPr lang="en-US" sz="2400" kern="1200" dirty="0">
+                          <a:solidFill>
+                            <a:schemeClr val="tx1"/>
+                          </a:solidFill>
+                          <a:effectLst/>
+                          <a:latin typeface="+mn-lt"/>
+                          <a:ea typeface="+mn-ea"/>
+                          <a:cs typeface="+mn-cs"/>
+                        </a:rPr>
+                        <a:t>143 seconds</a:t>
+                      </a:r>
+                    </a:p>
+                  </a:txBody>
+                  <a:tcPr marL="68580" marR="68580" marT="0" marB="0" anchor="ctr"/>
+                </a:tc>
+                <a:extLst>
+                  <a:ext uri="{0D108BD9-81ED-4DB2-BD59-A6C34878D82A}">
+                    <a16:rowId xmlns:a16="http://schemas.microsoft.com/office/drawing/2014/main" val="688655240"/>
+                  </a:ext>
+                </a:extLst>
+              </a:tr>
+            </a:tbl>
+          </a:graphicData>
+        </a:graphic>
+      </p:graphicFrame>
+      <p:pic>
+        <p:nvPicPr>
+          <p:cNvPr id="7" name="Picture 6" descr="A close up of a logo&#10;&#10;Description generated with high confidence">
+            <a:extLst>
+              <a:ext uri="{FF2B5EF4-FFF2-40B4-BE49-F238E27FC236}">
+                <a16:creationId xmlns:a16="http://schemas.microsoft.com/office/drawing/2014/main" id="{0F5F680D-2CEC-4AE8-BF06-22131891F9D0}"/>
+              </a:ext>
+            </a:extLst>
+          </p:cNvPr>
+          <p:cNvPicPr>
+            <a:picLocks noChangeAspect="1"/>
+          </p:cNvPicPr>
+          <p:nvPr/>
+        </p:nvPicPr>
+        <p:blipFill>
+          <a:blip r:embed="rId2">
+            <a:extLst>
+              <a:ext uri="{28A0092B-C50C-407E-A947-70E740481C1C}">
+                <a14:useLocalDpi xmlns:a14="http://schemas.microsoft.com/office/drawing/2010/main" val="0"/>
+              </a:ext>
+            </a:extLst>
+          </a:blip>
+          <a:stretch>
+            <a:fillRect/>
+          </a:stretch>
+        </p:blipFill>
         <p:spPr>
           <a:xfrm>
-            <a:off x="913774" y="2375296"/>
-            <a:ext cx="3340985" cy="3918858"/>
+            <a:off x="6202363" y="2158712"/>
+            <a:ext cx="5075862" cy="3652964"/>
+          </a:xfrm>
+          <a:prstGeom prst="rect">
+            <a:avLst/>
+          </a:prstGeom>
+        </p:spPr>
+      </p:pic>
+    </p:spTree>
+    <p:extLst>
+      <p:ext uri="{BB962C8B-B14F-4D97-AF65-F5344CB8AC3E}">
+        <p14:creationId xmlns:p14="http://schemas.microsoft.com/office/powerpoint/2010/main" val="949567083"/>
+      </p:ext>
+    </p:extLst>
+  </p:cSld>
+  <p:clrMapOvr>
+    <a:masterClrMapping/>
+  </p:clrMapOvr>
+</p:sld>
+</file>
+
+<file path=ppt/slides/slide7.xml><?xml version="1.0" encoding="utf-8"?>
+<p:sld xmlns:a="http://schemas.openxmlformats.org/drawingml/2006/main" xmlns:r="http://schemas.openxmlformats.org/officeDocument/2006/relationships" xmlns:p="http://schemas.openxmlformats.org/presentationml/2006/main">
+  <p:cSld>
+    <p:spTree>
+      <p:nvGrpSpPr>
+        <p:cNvPr id="1" name=""/>
+        <p:cNvGrpSpPr/>
+        <p:nvPr/>
+      </p:nvGrpSpPr>
+      <p:grpSpPr>
+        <a:xfrm>
+          <a:off x="0" y="0"/>
+          <a:ext cx="0" cy="0"/>
+          <a:chOff x="0" y="0"/>
+          <a:chExt cx="0" cy="0"/>
+        </a:xfrm>
+      </p:grpSpPr>
+      <p:sp>
+        <p:nvSpPr>
+          <p:cNvPr id="2" name="Title 1">
+            <a:extLst>
+              <a:ext uri="{FF2B5EF4-FFF2-40B4-BE49-F238E27FC236}">
+                <a16:creationId xmlns:a16="http://schemas.microsoft.com/office/drawing/2014/main" id="{274A305D-4D9E-4986-8F10-EDB5B3127A22}"/>
+              </a:ext>
+            </a:extLst>
+          </p:cNvPr>
+          <p:cNvSpPr>
+            <a:spLocks noGrp="1"/>
+          </p:cNvSpPr>
+          <p:nvPr>
+            <p:ph type="title"/>
+          </p:nvPr>
+        </p:nvSpPr>
+        <p:spPr>
+          <a:xfrm>
+            <a:off x="913774" y="562534"/>
+            <a:ext cx="10364451" cy="613123"/>
           </a:xfrm>
         </p:spPr>
         <p:txBody>
-          <a:bodyPr>
-            <a:normAutofit/>
-          </a:bodyPr>
+          <a:bodyPr/>
           <a:lstStyle/>
           <a:p>
-            <a:pPr marL="0" indent="0">
-              <a:buNone/>
-            </a:pPr>
             <a:r>
               <a:rPr lang="en-US" dirty="0"/>
-              <a:t>Class  0 :  0.5435</a:t>
-            </a:r>
-          </a:p>
-          <a:p>
-            <a:pPr marL="0" indent="0">
-              <a:buNone/>
-            </a:pPr>
-            <a:r>
-              <a:rPr lang="en-US" dirty="0"/>
-              <a:t>Class  1 :  0.1333</a:t>
-            </a:r>
-          </a:p>
-          <a:p>
-            <a:pPr marL="0" indent="0">
-              <a:buNone/>
-            </a:pPr>
-            <a:r>
-              <a:rPr lang="en-US" dirty="0"/>
-              <a:t>Class  2 :  0.7963</a:t>
-            </a:r>
-          </a:p>
-          <a:p>
-            <a:pPr marL="0" indent="0">
-              <a:buNone/>
-            </a:pPr>
-            <a:r>
-              <a:rPr lang="en-US" dirty="0"/>
-              <a:t>Class  3 :  0.68</a:t>
-            </a:r>
-          </a:p>
-          <a:p>
-            <a:pPr marL="0" indent="0">
-              <a:buNone/>
-            </a:pPr>
-            <a:r>
-              <a:rPr lang="en-US" dirty="0"/>
-              <a:t>Class  4 :  0.9074</a:t>
-            </a:r>
-          </a:p>
-          <a:p>
-            <a:pPr marL="0" indent="0">
-              <a:buNone/>
-            </a:pPr>
-            <a:r>
-              <a:rPr lang="en-US" dirty="0"/>
-              <a:t>Class  5 :  0.5556</a:t>
-            </a:r>
-          </a:p>
-          <a:p>
-            <a:pPr marL="0" indent="0">
-              <a:buNone/>
-            </a:pPr>
-            <a:r>
-              <a:rPr lang="en-US" dirty="0"/>
-              <a:t>Class  6 :  0.4286</a:t>
-            </a:r>
-          </a:p>
-          <a:p>
-            <a:endParaRPr lang="en-US" dirty="0"/>
-          </a:p>
-          <a:p>
-            <a:endParaRPr lang="en-US" dirty="0"/>
-          </a:p>
-        </p:txBody>
-      </p:sp>
-      <p:sp>
-        <p:nvSpPr>
-          <p:cNvPr id="5" name="TextBox 4">
+              <a:t>K Nearest neighbor</a:t>
+            </a:r>
+          </a:p>
+        </p:txBody>
+      </p:sp>
+      <p:sp>
+        <p:nvSpPr>
+          <p:cNvPr id="6" name="TextBox 5">
             <a:extLst>
               <a:ext uri="{FF2B5EF4-FFF2-40B4-BE49-F238E27FC236}">
-                <a16:creationId xmlns:a16="http://schemas.microsoft.com/office/drawing/2014/main" id="{B2310781-EA65-4955-97CC-1323DFC6F870}"/>
+                <a16:creationId xmlns:a16="http://schemas.microsoft.com/office/drawing/2014/main" id="{B41F92AE-37F0-4E06-82F0-237A9117F9B5}"/>
               </a:ext>
             </a:extLst>
           </p:cNvPr>
@@ -7677,8 +8135,8 @@
         </p:nvSpPr>
         <p:spPr>
           <a:xfrm>
-            <a:off x="3200774" y="2375965"/>
-            <a:ext cx="2303836" cy="3918189"/>
+            <a:off x="778935" y="2108718"/>
+            <a:ext cx="2162772" cy="3918189"/>
           </a:xfrm>
           <a:prstGeom prst="rect">
             <a:avLst/>
@@ -7704,7 +8162,7 @@
             </a:pPr>
             <a:r>
               <a:rPr lang="en-US" sz="2000" cap="all" dirty="0"/>
-              <a:t>Class  7   :  0.4487</a:t>
+              <a:t>Class  0 :  0.3409</a:t>
             </a:r>
           </a:p>
           <a:p>
@@ -7721,7 +8179,7 @@
             </a:pPr>
             <a:r>
               <a:rPr lang="en-US" sz="2000" cap="all" dirty="0"/>
-              <a:t>Class  8   :  0.726</a:t>
+              <a:t>Class  1 :  0.4167</a:t>
             </a:r>
           </a:p>
           <a:p>
@@ -7738,7 +8196,7 @@
             </a:pPr>
             <a:r>
               <a:rPr lang="en-US" sz="2000" cap="all" dirty="0"/>
-              <a:t>Class  9   :  0.8</a:t>
+              <a:t>Class  2 :  0.8108</a:t>
             </a:r>
           </a:p>
           <a:p>
@@ -7755,7 +8213,7 @@
             </a:pPr>
             <a:r>
               <a:rPr lang="en-US" sz="2000" cap="all" dirty="0"/>
-              <a:t>Class  10 :  0.8817</a:t>
+              <a:t>Class  3 :  0.0</a:t>
             </a:r>
           </a:p>
           <a:p>
@@ -7772,7 +8230,7 @@
             </a:pPr>
             <a:r>
               <a:rPr lang="en-US" sz="2000" cap="all" dirty="0"/>
-              <a:t>Class  11 :  0.875</a:t>
+              <a:t>Class  4 :  0.75</a:t>
             </a:r>
           </a:p>
           <a:p>
@@ -7789,7 +8247,7 @@
             </a:pPr>
             <a:r>
               <a:rPr lang="en-US" sz="2000" cap="all" dirty="0"/>
-              <a:t>Class  12 :  0.8333</a:t>
+              <a:t>Class  5 :  0.7538</a:t>
             </a:r>
           </a:p>
           <a:p>
@@ -7806,7 +8264,7 @@
             </a:pPr>
             <a:r>
               <a:rPr lang="en-US" sz="2000" cap="all" dirty="0"/>
-              <a:t>Class  13 :  0.6607</a:t>
+              <a:t>Class  6 :  0.3333</a:t>
             </a:r>
           </a:p>
           <a:p>
@@ -7823,17 +8281,17 @@
             </a:pPr>
             <a:r>
               <a:rPr lang="en-US" sz="2000" cap="all" dirty="0"/>
-              <a:t>Class  14 :  0.0</a:t>
-            </a:r>
-          </a:p>
-        </p:txBody>
-      </p:sp>
-      <p:sp>
-        <p:nvSpPr>
-          <p:cNvPr id="6" name="TextBox 5">
+              <a:t>Class  7 :  0.3636</a:t>
+            </a:r>
+          </a:p>
+        </p:txBody>
+      </p:sp>
+      <p:sp>
+        <p:nvSpPr>
+          <p:cNvPr id="8" name="TextBox 7">
             <a:extLst>
               <a:ext uri="{FF2B5EF4-FFF2-40B4-BE49-F238E27FC236}">
-                <a16:creationId xmlns:a16="http://schemas.microsoft.com/office/drawing/2014/main" id="{A59CBC6E-E91C-4187-8CB7-8BF597D9C40A}"/>
+                <a16:creationId xmlns:a16="http://schemas.microsoft.com/office/drawing/2014/main" id="{F894DFAB-49D9-4AD7-8E47-65E3F16D960E}"/>
               </a:ext>
             </a:extLst>
           </p:cNvPr>
@@ -7842,8 +8300,8 @@
         </p:nvSpPr>
         <p:spPr>
           <a:xfrm>
-            <a:off x="1357256" y="1682464"/>
-            <a:ext cx="4552657" cy="461665"/>
+            <a:off x="2941707" y="2108718"/>
+            <a:ext cx="2303836" cy="3918189"/>
           </a:xfrm>
           <a:prstGeom prst="rect">
             <a:avLst/>
@@ -7856,19 +8314,149 @@
           </a:bodyPr>
           <a:lstStyle/>
           <a:p>
-            <a:r>
-              <a:rPr lang="en-US" sz="2400" b="1" dirty="0"/>
-              <a:t>CLASS CONDITIONAL ACCURACY</a:t>
-            </a:r>
-          </a:p>
-        </p:txBody>
-      </p:sp>
-      <p:sp>
-        <p:nvSpPr>
-          <p:cNvPr id="7" name="TextBox 6">
+            <a:pPr defTabSz="914400">
+              <a:lnSpc>
+                <a:spcPct val="120000"/>
+              </a:lnSpc>
+              <a:spcBef>
+                <a:spcPts val="1000"/>
+              </a:spcBef>
+              <a:buClr>
+                <a:schemeClr val="tx1"/>
+              </a:buClr>
+            </a:pPr>
+            <a:r>
+              <a:rPr lang="en-US" sz="2000" cap="all" dirty="0"/>
+              <a:t>Class    8 :  0.4407</a:t>
+            </a:r>
+          </a:p>
+          <a:p>
+            <a:pPr defTabSz="914400">
+              <a:lnSpc>
+                <a:spcPct val="120000"/>
+              </a:lnSpc>
+              <a:spcBef>
+                <a:spcPts val="1000"/>
+              </a:spcBef>
+              <a:buClr>
+                <a:schemeClr val="tx1"/>
+              </a:buClr>
+            </a:pPr>
+            <a:r>
+              <a:rPr lang="en-US" sz="2000" cap="all" dirty="0"/>
+              <a:t>Class    9 :  0.7529</a:t>
+            </a:r>
+          </a:p>
+          <a:p>
+            <a:pPr defTabSz="914400">
+              <a:lnSpc>
+                <a:spcPct val="120000"/>
+              </a:lnSpc>
+              <a:spcBef>
+                <a:spcPts val="1000"/>
+              </a:spcBef>
+              <a:buClr>
+                <a:schemeClr val="tx1"/>
+              </a:buClr>
+            </a:pPr>
+            <a:r>
+              <a:rPr lang="en-US" sz="2000" cap="all" dirty="0"/>
+              <a:t>Class  10 :  0.694</a:t>
+            </a:r>
+          </a:p>
+          <a:p>
+            <a:pPr defTabSz="914400">
+              <a:lnSpc>
+                <a:spcPct val="120000"/>
+              </a:lnSpc>
+              <a:spcBef>
+                <a:spcPts val="1000"/>
+              </a:spcBef>
+              <a:buClr>
+                <a:schemeClr val="tx1"/>
+              </a:buClr>
+            </a:pPr>
+            <a:r>
+              <a:rPr lang="en-US" sz="2000" cap="all" dirty="0"/>
+              <a:t>Class  11 :  0.8085</a:t>
+            </a:r>
+          </a:p>
+          <a:p>
+            <a:pPr defTabSz="914400">
+              <a:lnSpc>
+                <a:spcPct val="120000"/>
+              </a:lnSpc>
+              <a:spcBef>
+                <a:spcPts val="1000"/>
+              </a:spcBef>
+              <a:buClr>
+                <a:schemeClr val="tx1"/>
+              </a:buClr>
+            </a:pPr>
+            <a:r>
+              <a:rPr lang="en-US" sz="2000" cap="all" dirty="0"/>
+              <a:t>Class  12 :  0.6538</a:t>
+            </a:r>
+          </a:p>
+          <a:p>
+            <a:pPr defTabSz="914400">
+              <a:lnSpc>
+                <a:spcPct val="120000"/>
+              </a:lnSpc>
+              <a:spcBef>
+                <a:spcPts val="1000"/>
+              </a:spcBef>
+              <a:buClr>
+                <a:schemeClr val="tx1"/>
+              </a:buClr>
+            </a:pPr>
+            <a:r>
+              <a:rPr lang="en-US" sz="2000" cap="all" dirty="0"/>
+              <a:t>Class  13 :  0.5714</a:t>
+            </a:r>
+          </a:p>
+          <a:p>
+            <a:pPr defTabSz="914400">
+              <a:lnSpc>
+                <a:spcPct val="120000"/>
+              </a:lnSpc>
+              <a:spcBef>
+                <a:spcPts val="1000"/>
+              </a:spcBef>
+              <a:buClr>
+                <a:schemeClr val="tx1"/>
+              </a:buClr>
+            </a:pPr>
+            <a:r>
+              <a:rPr lang="en-US" sz="2000" cap="all" dirty="0"/>
+              <a:t>Class  14 :  0.6545</a:t>
+            </a:r>
+          </a:p>
+          <a:p>
+            <a:pPr defTabSz="914400">
+              <a:lnSpc>
+                <a:spcPct val="120000"/>
+              </a:lnSpc>
+              <a:spcBef>
+                <a:spcPts val="1000"/>
+              </a:spcBef>
+              <a:buClr>
+                <a:schemeClr val="tx1"/>
+              </a:buClr>
+            </a:pPr>
+            <a:r>
+              <a:rPr lang="en-US" sz="2000" cap="all" dirty="0"/>
+              <a:t>Class  15 :  0.0</a:t>
+            </a:r>
+          </a:p>
+        </p:txBody>
+      </p:sp>
+      <p:sp>
+        <p:nvSpPr>
+          <p:cNvPr id="9" name="TextBox 8">
             <a:extLst>
               <a:ext uri="{FF2B5EF4-FFF2-40B4-BE49-F238E27FC236}">
-                <a16:creationId xmlns:a16="http://schemas.microsoft.com/office/drawing/2014/main" id="{9834C2FD-A9BE-4783-A860-EB4296C1389F}"/>
+                <a16:creationId xmlns:a16="http://schemas.microsoft.com/office/drawing/2014/main" id="{C3FAF612-05D3-407A-82FA-4D2D89A4FA76}"/>
               </a:ext>
             </a:extLst>
           </p:cNvPr>
@@ -7877,8 +8465,8 @@
         </p:nvSpPr>
         <p:spPr>
           <a:xfrm>
-            <a:off x="7631538" y="1608298"/>
-            <a:ext cx="2932982" cy="461665"/>
+            <a:off x="5494641" y="2108718"/>
+            <a:ext cx="6053260" cy="4524315"/>
           </a:xfrm>
           <a:prstGeom prst="rect">
             <a:avLst/>
@@ -7886,24 +8474,242 @@
           <a:noFill/>
         </p:spPr>
         <p:txBody>
-          <a:bodyPr wrap="none" rtlCol="0">
+          <a:bodyPr wrap="square" rtlCol="0">
             <a:spAutoFit/>
           </a:bodyPr>
           <a:lstStyle/>
           <a:p>
             <a:r>
-              <a:rPr lang="en-US" sz="2400" b="1" dirty="0"/>
-              <a:t>CONFUSION MATRIX</a:t>
-            </a:r>
-          </a:p>
-        </p:txBody>
-      </p:sp>
-      <p:sp>
-        <p:nvSpPr>
-          <p:cNvPr id="8" name="TextBox 7">
+              <a:rPr lang="en-US" dirty="0"/>
+              <a:t>[</a:t>
+            </a:r>
+            <a:r>
+              <a:rPr lang="en-US" b="1" dirty="0"/>
+              <a:t>15</a:t>
+            </a:r>
+            <a:r>
+              <a:rPr lang="en-US" dirty="0"/>
+              <a:t>   0    4   0    0    1   1   0    2    3  16    0    1    0    1   0]</a:t>
+            </a:r>
+          </a:p>
+          <a:p>
+            <a:r>
+              <a:rPr lang="en-US" dirty="0"/>
+              <a:t>[  0   </a:t>
+            </a:r>
+            <a:r>
+              <a:rPr lang="en-US" b="1" dirty="0"/>
+              <a:t>5</a:t>
+            </a:r>
+            <a:r>
+              <a:rPr lang="en-US" dirty="0"/>
+              <a:t>    0   0    0    0   0   0    0    0    4    2    0    0    1   0]</a:t>
+            </a:r>
+          </a:p>
+          <a:p>
+            <a:r>
+              <a:rPr lang="en-US" dirty="0"/>
+              <a:t>[  1   0  </a:t>
+            </a:r>
+            <a:r>
+              <a:rPr lang="en-US" b="1" dirty="0"/>
+              <a:t>90</a:t>
+            </a:r>
+            <a:r>
+              <a:rPr lang="en-US" dirty="0"/>
+              <a:t>   0    1    0   0   0    3    2  10    2    1    0    1   0]</a:t>
+            </a:r>
+          </a:p>
+          <a:p>
+            <a:r>
+              <a:rPr lang="en-US" dirty="0"/>
+              <a:t>[  0   0    0   </a:t>
+            </a:r>
+            <a:r>
+              <a:rPr lang="en-US" b="1" dirty="0"/>
+              <a:t>0</a:t>
+            </a:r>
+            <a:r>
+              <a:rPr lang="en-US" dirty="0"/>
+              <a:t>    0    0   0   0    0    0    0    0    0    0    1   0]</a:t>
+            </a:r>
+          </a:p>
+          <a:p>
+            <a:r>
+              <a:rPr lang="en-US" dirty="0"/>
+              <a:t>[  0   1    1   0  </a:t>
+            </a:r>
+            <a:r>
+              <a:rPr lang="en-US" b="1" dirty="0"/>
+              <a:t>15</a:t>
+            </a:r>
+            <a:r>
+              <a:rPr lang="en-US" dirty="0"/>
+              <a:t>    0   0   0    2    0    1    0    0    0    0   0]</a:t>
+            </a:r>
+          </a:p>
+          <a:p>
+            <a:r>
+              <a:rPr lang="en-US" dirty="0"/>
+              <a:t>[  3   0    1   0    1  </a:t>
+            </a:r>
+            <a:r>
+              <a:rPr lang="en-US" b="1" dirty="0"/>
+              <a:t>49</a:t>
+            </a:r>
+            <a:r>
+              <a:rPr lang="en-US" dirty="0"/>
+              <a:t>   0   0    3    0    4    4    0    0    0   0]</a:t>
+            </a:r>
+          </a:p>
+          <a:p>
+            <a:r>
+              <a:rPr lang="en-US" dirty="0"/>
+              <a:t>[  0   1    0   0    1    0   </a:t>
+            </a:r>
+            <a:r>
+              <a:rPr lang="en-US" b="1" dirty="0"/>
+              <a:t>4</a:t>
+            </a:r>
+            <a:r>
+              <a:rPr lang="en-US" dirty="0"/>
+              <a:t>   0    1    0    2    2    1    0    0   0]</a:t>
+            </a:r>
+          </a:p>
+          <a:p>
+            <a:r>
+              <a:rPr lang="en-US" dirty="0"/>
+              <a:t>[  0   0    1   0    1    1   0   </a:t>
+            </a:r>
+            <a:r>
+              <a:rPr lang="en-US" b="1" dirty="0"/>
+              <a:t>4</a:t>
+            </a:r>
+            <a:r>
+              <a:rPr lang="en-US" dirty="0"/>
+              <a:t>    0    0    3    0    0    0    1   0]</a:t>
+            </a:r>
+          </a:p>
+          <a:p>
+            <a:r>
+              <a:rPr lang="en-US" dirty="0"/>
+              <a:t>[  1   1    9   0    1    1   0   1  </a:t>
+            </a:r>
+            <a:r>
+              <a:rPr lang="en-US" b="1" dirty="0"/>
+              <a:t>26</a:t>
+            </a:r>
+            <a:r>
+              <a:rPr lang="en-US" dirty="0"/>
+              <a:t>    2    9    3    2    1    2   0]</a:t>
+            </a:r>
+          </a:p>
+          <a:p>
+            <a:r>
+              <a:rPr lang="en-US" dirty="0"/>
+              <a:t>[  0   0    1   0    1    2   0   0    2  </a:t>
+            </a:r>
+            <a:r>
+              <a:rPr lang="en-US" b="1" dirty="0"/>
+              <a:t>64</a:t>
+            </a:r>
+            <a:r>
+              <a:rPr lang="en-US" dirty="0"/>
+              <a:t>  13    1    1    0    0   0]</a:t>
+            </a:r>
+          </a:p>
+          <a:p>
+            <a:r>
+              <a:rPr lang="en-US" dirty="0"/>
+              <a:t>[  5   0  14   0    2    4   3   3  12  10 </a:t>
+            </a:r>
+            <a:r>
+              <a:rPr lang="en-US" b="1" dirty="0"/>
+              <a:t>161</a:t>
+            </a:r>
+            <a:r>
+              <a:rPr lang="en-US" dirty="0"/>
+              <a:t>   7    9    0    2   0]</a:t>
+            </a:r>
+          </a:p>
+          <a:p>
+            <a:r>
+              <a:rPr lang="en-US" dirty="0"/>
+              <a:t>[  0   0    2   0    1    4   0   0    3    1    3  </a:t>
+            </a:r>
+            <a:r>
+              <a:rPr lang="en-US" b="1" dirty="0"/>
+              <a:t>76</a:t>
+            </a:r>
+            <a:r>
+              <a:rPr lang="en-US" dirty="0"/>
+              <a:t>    0    1    3   0]</a:t>
+            </a:r>
+          </a:p>
+          <a:p>
+            <a:r>
+              <a:rPr lang="en-US" dirty="0"/>
+              <a:t>[  1   0    2   0    0    2   0   0    9    0  11    1  </a:t>
+            </a:r>
+            <a:r>
+              <a:rPr lang="en-US" b="1" dirty="0"/>
+              <a:t>51</a:t>
+            </a:r>
+            <a:r>
+              <a:rPr lang="en-US" dirty="0"/>
+              <a:t>    0    1   0]</a:t>
+            </a:r>
+          </a:p>
+          <a:p>
+            <a:r>
+              <a:rPr lang="en-US" dirty="0"/>
+              <a:t>[  0   0    0   0    1    0   0   0    2    1    2    1    5  </a:t>
+            </a:r>
+            <a:r>
+              <a:rPr lang="en-US" b="1" dirty="0"/>
+              <a:t>16</a:t>
+            </a:r>
+            <a:r>
+              <a:rPr lang="en-US" dirty="0"/>
+              <a:t>    0   0]</a:t>
+            </a:r>
+          </a:p>
+          <a:p>
+            <a:r>
+              <a:rPr lang="en-US" dirty="0"/>
+              <a:t>[  1   0    2   0    1    0   0   0    6    0    2    1    4    2  </a:t>
+            </a:r>
+            <a:r>
+              <a:rPr lang="en-US" b="1" dirty="0"/>
+              <a:t>36</a:t>
+            </a:r>
+            <a:r>
+              <a:rPr lang="en-US" dirty="0"/>
+              <a:t>   0]</a:t>
+            </a:r>
+          </a:p>
+          <a:p>
+            <a:r>
+              <a:rPr lang="en-US" dirty="0"/>
+              <a:t>[  0   0    0   0    0    0   0   0    0    0    1    0    1    0    0   </a:t>
+            </a:r>
+            <a:r>
+              <a:rPr lang="en-US" b="1" dirty="0"/>
+              <a:t>0</a:t>
+            </a:r>
+            <a:r>
+              <a:rPr lang="en-US" dirty="0"/>
+              <a:t>]</a:t>
+            </a:r>
+          </a:p>
+        </p:txBody>
+      </p:sp>
+      <p:sp>
+        <p:nvSpPr>
+          <p:cNvPr id="10" name="TextBox 9">
             <a:extLst>
               <a:ext uri="{FF2B5EF4-FFF2-40B4-BE49-F238E27FC236}">
-                <a16:creationId xmlns:a16="http://schemas.microsoft.com/office/drawing/2014/main" id="{EFED626D-0156-4D6F-899B-720F4B29D178}"/>
+                <a16:creationId xmlns:a16="http://schemas.microsoft.com/office/drawing/2014/main" id="{F1CF9517-081E-47CD-BE19-F905069D60ED}"/>
               </a:ext>
             </a:extLst>
           </p:cNvPr>
@@ -7912,8 +8718,8 @@
         </p:nvSpPr>
         <p:spPr>
           <a:xfrm>
-            <a:off x="5681517" y="2069963"/>
-            <a:ext cx="5798382" cy="4247317"/>
+            <a:off x="837147" y="1580764"/>
+            <a:ext cx="4373153" cy="461665"/>
           </a:xfrm>
           <a:prstGeom prst="rect">
             <a:avLst/>
@@ -7921,98 +8727,49 @@
           <a:noFill/>
         </p:spPr>
         <p:txBody>
+          <a:bodyPr wrap="square" rtlCol="0">
+            <a:spAutoFit/>
+          </a:bodyPr>
+          <a:lstStyle/>
+          <a:p>
+            <a:r>
+              <a:rPr lang="en-US" sz="2400" dirty="0"/>
+              <a:t>CLASS CONDITIONAL ACCURACY</a:t>
+            </a:r>
+          </a:p>
+        </p:txBody>
+      </p:sp>
+      <p:sp>
+        <p:nvSpPr>
+          <p:cNvPr id="11" name="TextBox 10">
+            <a:extLst>
+              <a:ext uri="{FF2B5EF4-FFF2-40B4-BE49-F238E27FC236}">
+                <a16:creationId xmlns:a16="http://schemas.microsoft.com/office/drawing/2014/main" id="{4C7BCDFE-A996-4FF1-AF66-F8D30A3362E2}"/>
+              </a:ext>
+            </a:extLst>
+          </p:cNvPr>
+          <p:cNvSpPr txBox="1"/>
+          <p:nvPr/>
+        </p:nvSpPr>
+        <p:spPr>
+          <a:xfrm>
+            <a:off x="7113321" y="1580763"/>
+            <a:ext cx="2815899" cy="461665"/>
+          </a:xfrm>
+          <a:prstGeom prst="rect">
+            <a:avLst/>
+          </a:prstGeom>
+          <a:noFill/>
+        </p:spPr>
+        <p:txBody>
           <a:bodyPr wrap="none" rtlCol="0">
             <a:spAutoFit/>
           </a:bodyPr>
           <a:lstStyle/>
           <a:p>
             <a:r>
-              <a:rPr lang="en-US" dirty="0"/>
-              <a:t> [ 25   0    2    0    0   0   0    1    0  14    1    2    0    1   0]</a:t>
-            </a:r>
-          </a:p>
-          <a:p>
-            <a:r>
-              <a:rPr lang="en-US" dirty="0"/>
-              <a:t> [   0   2    2    1    0   0   1    2    0    5    0    0    0    2   0]</a:t>
-            </a:r>
-          </a:p>
-          <a:p>
-            <a:r>
-              <a:rPr lang="en-US" dirty="0"/>
-              <a:t> [   2   0  86    0    1   0   0    1    0  16    0    0    0    2   0]</a:t>
-            </a:r>
-          </a:p>
-          <a:p>
-            <a:r>
-              <a:rPr lang="en-US" dirty="0"/>
-              <a:t> [   1   0    1  17    0   0   0    0    0    3    3    0    0    0   0]</a:t>
-            </a:r>
-          </a:p>
-          <a:p>
-            <a:r>
-              <a:rPr lang="en-US" dirty="0"/>
-              <a:t> [   0   0    0    1  49   0   0    0    0    0    4    0    0    0   0]</a:t>
-            </a:r>
-          </a:p>
-          <a:p>
-            <a:r>
-              <a:rPr lang="en-US" dirty="0"/>
-              <a:t> [   0   0    0    0    0   5   0    2    0    2    0    0    0    0   0]</a:t>
-            </a:r>
-          </a:p>
-          <a:p>
-            <a:r>
-              <a:rPr lang="en-US" dirty="0"/>
-              <a:t> [   0   0    0    0    1   0   6    3    0    3    0    0    0    1   0]</a:t>
-            </a:r>
-          </a:p>
-          <a:p>
-            <a:r>
-              <a:rPr lang="en-US" dirty="0"/>
-              <a:t> [   1   0    6    1    2   1   0  35    0  15    4  10    0    3   0]</a:t>
-            </a:r>
-          </a:p>
-          <a:p>
-            <a:r>
-              <a:rPr lang="en-US" dirty="0"/>
-              <a:t> [   3   0    1    0    0   0   0    0  53  14    1    0    1    0   0]</a:t>
-            </a:r>
-          </a:p>
-          <a:p>
-            <a:r>
-              <a:rPr lang="en-US" dirty="0"/>
-              <a:t> [ 10   1    8    0    3   0   0    9    2 172   1    4    2    3   0]</a:t>
-            </a:r>
-          </a:p>
-          <a:p>
-            <a:r>
-              <a:rPr lang="en-US" dirty="0"/>
-              <a:t> [   0   1    0    0    0   0   0    5    0    4  82    1    0    0   0]</a:t>
-            </a:r>
-          </a:p>
-          <a:p>
-            <a:r>
-              <a:rPr lang="en-US" dirty="0"/>
-              <a:t> [   0   0    0    0    0   0   0    0    0    8    0  70    1    1   0]</a:t>
-            </a:r>
-          </a:p>
-          <a:p>
-            <a:r>
-              <a:rPr lang="en-US" dirty="0"/>
-              <a:t> [   0   0    0    0    0   0   0    0    0    2    1    1  30    2   0]</a:t>
-            </a:r>
-          </a:p>
-          <a:p>
-            <a:r>
-              <a:rPr lang="en-US" dirty="0"/>
-              <a:t> [   1   2    0    0    0   0   0    2    0    4    4    0    6  37   0]</a:t>
-            </a:r>
-          </a:p>
-          <a:p>
-            <a:r>
-              <a:rPr lang="en-US" dirty="0"/>
-              <a:t> [   0   0    1    0    0   0   0    1    0    2    2    1    0    0   0]</a:t>
+              <a:rPr lang="en-US" sz="2400" dirty="0"/>
+              <a:t>CONFUSION MATRIX</a:t>
             </a:r>
           </a:p>
         </p:txBody>
@@ -8020,7 +8777,7 @@
     </p:spTree>
     <p:extLst>
       <p:ext uri="{BB962C8B-B14F-4D97-AF65-F5344CB8AC3E}">
-        <p14:creationId xmlns:p14="http://schemas.microsoft.com/office/powerpoint/2010/main" val="3755679565"/>
+        <p14:creationId xmlns:p14="http://schemas.microsoft.com/office/powerpoint/2010/main" val="887475669"/>
       </p:ext>
     </p:extLst>
   </p:cSld>
@@ -8030,7 +8787,7 @@
 </p:sld>
 </file>
 
-<file path=ppt/slides/slide7.xml><?xml version="1.0" encoding="utf-8"?>
+<file path=ppt/slides/slide8.xml><?xml version="1.0" encoding="utf-8"?>
 <p:sld xmlns:a="http://schemas.openxmlformats.org/drawingml/2006/main" xmlns:r="http://schemas.openxmlformats.org/officeDocument/2006/relationships" xmlns:p="http://schemas.openxmlformats.org/presentationml/2006/main">
   <p:cSld>
     <p:spTree>
@@ -9116,522 +9873,6 @@
 </p:sld>
 </file>
 
-<file path=ppt/slides/slide8.xml><?xml version="1.0" encoding="utf-8"?>
-<p:sld xmlns:a="http://schemas.openxmlformats.org/drawingml/2006/main" xmlns:r="http://schemas.openxmlformats.org/officeDocument/2006/relationships" xmlns:p="http://schemas.openxmlformats.org/presentationml/2006/main">
-  <p:cSld>
-    <p:spTree>
-      <p:nvGrpSpPr>
-        <p:cNvPr id="1" name=""/>
-        <p:cNvGrpSpPr/>
-        <p:nvPr/>
-      </p:nvGrpSpPr>
-      <p:grpSpPr>
-        <a:xfrm>
-          <a:off x="0" y="0"/>
-          <a:ext cx="0" cy="0"/>
-          <a:chOff x="0" y="0"/>
-          <a:chExt cx="0" cy="0"/>
-        </a:xfrm>
-      </p:grpSpPr>
-      <p:sp>
-        <p:nvSpPr>
-          <p:cNvPr id="2" name="Title 1">
-            <a:extLst>
-              <a:ext uri="{FF2B5EF4-FFF2-40B4-BE49-F238E27FC236}">
-                <a16:creationId xmlns:a16="http://schemas.microsoft.com/office/drawing/2014/main" id="{274A305D-4D9E-4986-8F10-EDB5B3127A22}"/>
-              </a:ext>
-            </a:extLst>
-          </p:cNvPr>
-          <p:cNvSpPr>
-            <a:spLocks noGrp="1"/>
-          </p:cNvSpPr>
-          <p:nvPr>
-            <p:ph type="title"/>
-          </p:nvPr>
-        </p:nvSpPr>
-        <p:spPr>
-          <a:xfrm>
-            <a:off x="913774" y="562534"/>
-            <a:ext cx="10364451" cy="1596177"/>
-          </a:xfrm>
-        </p:spPr>
-        <p:txBody>
-          <a:bodyPr/>
-          <a:lstStyle/>
-          <a:p>
-            <a:r>
-              <a:rPr lang="en-US" dirty="0"/>
-              <a:t>K Nearest neighbor</a:t>
-            </a:r>
-          </a:p>
-        </p:txBody>
-      </p:sp>
-      <p:graphicFrame>
-        <p:nvGraphicFramePr>
-          <p:cNvPr id="4" name="Content Placeholder 3">
-            <a:extLst>
-              <a:ext uri="{FF2B5EF4-FFF2-40B4-BE49-F238E27FC236}">
-                <a16:creationId xmlns:a16="http://schemas.microsoft.com/office/drawing/2014/main" id="{7F9852A4-35FB-4EA9-87C7-C83C416CB9E5}"/>
-              </a:ext>
-            </a:extLst>
-          </p:cNvPr>
-          <p:cNvGraphicFramePr>
-            <a:graphicFrameLocks noGrp="1"/>
-          </p:cNvGraphicFramePr>
-          <p:nvPr>
-            <p:ph sz="quarter" idx="13"/>
-            <p:extLst>
-              <p:ext uri="{D42A27DB-BD31-4B8C-83A1-F6EECF244321}">
-                <p14:modId xmlns:p14="http://schemas.microsoft.com/office/powerpoint/2010/main" val="2130434925"/>
-              </p:ext>
-            </p:extLst>
-          </p:nvPr>
-        </p:nvGraphicFramePr>
-        <p:xfrm>
-          <a:off x="1087640" y="2158711"/>
-          <a:ext cx="4834494" cy="3876047"/>
-        </p:xfrm>
-        <a:graphic>
-          <a:graphicData uri="http://schemas.openxmlformats.org/drawingml/2006/table">
-            <a:tbl>
-              <a:tblPr firstRow="1" firstCol="1" bandRow="1">
-                <a:tableStyleId>{9D7B26C5-4107-4FEC-AEDC-1716B250A1EF}</a:tableStyleId>
-              </a:tblPr>
-              <a:tblGrid>
-                <a:gridCol w="2417247">
-                  <a:extLst>
-                    <a:ext uri="{9D8B030D-6E8A-4147-A177-3AD203B41FA5}">
-                      <a16:colId xmlns:a16="http://schemas.microsoft.com/office/drawing/2014/main" val="20000"/>
-                    </a:ext>
-                  </a:extLst>
-                </a:gridCol>
-                <a:gridCol w="2417247">
-                  <a:extLst>
-                    <a:ext uri="{9D8B030D-6E8A-4147-A177-3AD203B41FA5}">
-                      <a16:colId xmlns:a16="http://schemas.microsoft.com/office/drawing/2014/main" val="20001"/>
-                    </a:ext>
-                  </a:extLst>
-                </a:gridCol>
-              </a:tblGrid>
-              <a:tr h="660624">
-                <a:tc gridSpan="2">
-                  <a:txBody>
-                    <a:bodyPr/>
-                    <a:lstStyle/>
-                    <a:p>
-                      <a:pPr marL="0" marR="0" algn="ctr">
-                        <a:lnSpc>
-                          <a:spcPct val="115000"/>
-                        </a:lnSpc>
-                        <a:spcBef>
-                          <a:spcPts val="0"/>
-                        </a:spcBef>
-                        <a:spcAft>
-                          <a:spcPts val="0"/>
-                        </a:spcAft>
-                        <a:tabLst>
-                          <a:tab pos="127000" algn="l"/>
-                        </a:tabLst>
-                      </a:pPr>
-                      <a:r>
-                        <a:rPr lang="en-US" sz="2400" dirty="0">
-                          <a:effectLst/>
-                        </a:rPr>
-                        <a:t>K-Nearest Neighbors</a:t>
-                      </a:r>
-                      <a:endParaRPr lang="en-US" sz="2400" b="1" dirty="0">
-                        <a:effectLst/>
-                        <a:latin typeface="Times" charset="0"/>
-                        <a:ea typeface="Times New Roman" charset="0"/>
-                        <a:cs typeface="Times New Roman" charset="0"/>
-                      </a:endParaRPr>
-                    </a:p>
-                  </a:txBody>
-                  <a:tcPr marL="68580" marR="68580" marT="0" marB="0"/>
-                </a:tc>
-                <a:tc hMerge="1">
-                  <a:txBody>
-                    <a:bodyPr/>
-                    <a:lstStyle/>
-                    <a:p>
-                      <a:endParaRPr lang="en-US"/>
-                    </a:p>
-                  </a:txBody>
-                  <a:tcPr/>
-                </a:tc>
-                <a:extLst>
-                  <a:ext uri="{0D108BD9-81ED-4DB2-BD59-A6C34878D82A}">
-                    <a16:rowId xmlns:a16="http://schemas.microsoft.com/office/drawing/2014/main" val="10000"/>
-                  </a:ext>
-                </a:extLst>
-              </a:tr>
-              <a:tr h="660624">
-                <a:tc>
-                  <a:txBody>
-                    <a:bodyPr/>
-                    <a:lstStyle/>
-                    <a:p>
-                      <a:pPr marL="0" marR="0" algn="ctr">
-                        <a:lnSpc>
-                          <a:spcPct val="115000"/>
-                        </a:lnSpc>
-                        <a:spcBef>
-                          <a:spcPts val="0"/>
-                        </a:spcBef>
-                        <a:spcAft>
-                          <a:spcPts val="0"/>
-                        </a:spcAft>
-                        <a:tabLst>
-                          <a:tab pos="127000" algn="l"/>
-                        </a:tabLst>
-                      </a:pPr>
-                      <a:r>
-                        <a:rPr lang="en-US" sz="2400" b="1" kern="1200" dirty="0">
-                          <a:solidFill>
-                            <a:schemeClr val="tx1"/>
-                          </a:solidFill>
-                          <a:effectLst/>
-                          <a:latin typeface="+mn-lt"/>
-                          <a:ea typeface="+mn-ea"/>
-                          <a:cs typeface="+mn-cs"/>
-                        </a:rPr>
-                        <a:t>K</a:t>
-                      </a:r>
-                    </a:p>
-                  </a:txBody>
-                  <a:tcPr marL="68580" marR="68580" marT="0" marB="0" anchor="ctr"/>
-                </a:tc>
-                <a:tc>
-                  <a:txBody>
-                    <a:bodyPr/>
-                    <a:lstStyle/>
-                    <a:p>
-                      <a:pPr marL="0" marR="0" algn="ctr">
-                        <a:lnSpc>
-                          <a:spcPct val="115000"/>
-                        </a:lnSpc>
-                        <a:spcBef>
-                          <a:spcPts val="0"/>
-                        </a:spcBef>
-                        <a:spcAft>
-                          <a:spcPts val="0"/>
-                        </a:spcAft>
-                        <a:tabLst>
-                          <a:tab pos="127000" algn="l"/>
-                        </a:tabLst>
-                      </a:pPr>
-                      <a:r>
-                        <a:rPr lang="en-US" sz="2400" b="0" kern="1200" dirty="0">
-                          <a:solidFill>
-                            <a:schemeClr val="tx1"/>
-                          </a:solidFill>
-                          <a:effectLst/>
-                          <a:latin typeface="+mn-lt"/>
-                          <a:ea typeface="+mn-ea"/>
-                          <a:cs typeface="+mn-cs"/>
-                        </a:rPr>
-                        <a:t>5</a:t>
-                      </a:r>
-                    </a:p>
-                  </a:txBody>
-                  <a:tcPr marL="68580" marR="68580" marT="0" marB="0" anchor="ctr"/>
-                </a:tc>
-                <a:extLst>
-                  <a:ext uri="{0D108BD9-81ED-4DB2-BD59-A6C34878D82A}">
-                    <a16:rowId xmlns:a16="http://schemas.microsoft.com/office/drawing/2014/main" val="10001"/>
-                  </a:ext>
-                </a:extLst>
-              </a:tr>
-              <a:tr h="1010469">
-                <a:tc>
-                  <a:txBody>
-                    <a:bodyPr/>
-                    <a:lstStyle/>
-                    <a:p>
-                      <a:pPr marL="0" marR="0" algn="ctr">
-                        <a:lnSpc>
-                          <a:spcPct val="115000"/>
-                        </a:lnSpc>
-                        <a:spcBef>
-                          <a:spcPts val="0"/>
-                        </a:spcBef>
-                        <a:spcAft>
-                          <a:spcPts val="0"/>
-                        </a:spcAft>
-                        <a:tabLst>
-                          <a:tab pos="127000" algn="l"/>
-                        </a:tabLst>
-                      </a:pPr>
-                      <a:r>
-                        <a:rPr lang="en-US" sz="2400" dirty="0">
-                          <a:effectLst/>
-                        </a:rPr>
-                        <a:t>Features Used </a:t>
-                      </a:r>
-                      <a:endParaRPr lang="en-US" sz="2400" b="1" dirty="0">
-                        <a:effectLst/>
-                        <a:latin typeface="Times" charset="0"/>
-                        <a:ea typeface="Times New Roman" charset="0"/>
-                        <a:cs typeface="Times New Roman" charset="0"/>
-                      </a:endParaRPr>
-                    </a:p>
-                  </a:txBody>
-                  <a:tcPr marL="68580" marR="68580" marT="0" marB="0" anchor="ctr"/>
-                </a:tc>
-                <a:tc>
-                  <a:txBody>
-                    <a:bodyPr/>
-                    <a:lstStyle/>
-                    <a:p>
-                      <a:pPr marL="0" marR="0" algn="ctr">
-                        <a:lnSpc>
-                          <a:spcPct val="115000"/>
-                        </a:lnSpc>
-                        <a:spcBef>
-                          <a:spcPts val="0"/>
-                        </a:spcBef>
-                        <a:spcAft>
-                          <a:spcPts val="0"/>
-                        </a:spcAft>
-                        <a:tabLst>
-                          <a:tab pos="127000" algn="l"/>
-                        </a:tabLst>
-                      </a:pPr>
-                      <a:r>
-                        <a:rPr lang="en-US" sz="2400" kern="1200" dirty="0">
-                          <a:solidFill>
-                            <a:schemeClr val="tx1"/>
-                          </a:solidFill>
-                          <a:effectLst/>
-                          <a:latin typeface="+mn-lt"/>
-                          <a:ea typeface="+mn-ea"/>
-                          <a:cs typeface="+mn-cs"/>
-                        </a:rPr>
-                        <a:t>Tags, Title, Description, Tag Count</a:t>
-                      </a:r>
-                      <a:endParaRPr lang="en-US" sz="2400" b="1" dirty="0">
-                        <a:effectLst/>
-                        <a:latin typeface="Times" charset="0"/>
-                        <a:ea typeface="Times New Roman" charset="0"/>
-                        <a:cs typeface="Times New Roman" charset="0"/>
-                      </a:endParaRPr>
-                    </a:p>
-                  </a:txBody>
-                  <a:tcPr marL="68580" marR="68580" marT="0" marB="0" anchor="ctr"/>
-                </a:tc>
-                <a:extLst>
-                  <a:ext uri="{0D108BD9-81ED-4DB2-BD59-A6C34878D82A}">
-                    <a16:rowId xmlns:a16="http://schemas.microsoft.com/office/drawing/2014/main" val="10002"/>
-                  </a:ext>
-                </a:extLst>
-              </a:tr>
-              <a:tr h="660624">
-                <a:tc>
-                  <a:txBody>
-                    <a:bodyPr/>
-                    <a:lstStyle/>
-                    <a:p>
-                      <a:pPr marL="0" marR="0" algn="ctr">
-                        <a:lnSpc>
-                          <a:spcPct val="115000"/>
-                        </a:lnSpc>
-                        <a:spcBef>
-                          <a:spcPts val="0"/>
-                        </a:spcBef>
-                        <a:spcAft>
-                          <a:spcPts val="0"/>
-                        </a:spcAft>
-                        <a:tabLst>
-                          <a:tab pos="127000" algn="l"/>
-                        </a:tabLst>
-                      </a:pPr>
-                      <a:r>
-                        <a:rPr lang="en-US" sz="2400" dirty="0">
-                          <a:effectLst/>
-                        </a:rPr>
-                        <a:t>Accuracy</a:t>
-                      </a:r>
-                      <a:endParaRPr lang="en-US" sz="2400" b="1" dirty="0">
-                        <a:effectLst/>
-                        <a:latin typeface="Times" charset="0"/>
-                        <a:ea typeface="Times New Roman" charset="0"/>
-                        <a:cs typeface="Times New Roman" charset="0"/>
-                      </a:endParaRPr>
-                    </a:p>
-                  </a:txBody>
-                  <a:tcPr marL="68580" marR="68580" marT="0" marB="0" anchor="ctr"/>
-                </a:tc>
-                <a:tc>
-                  <a:txBody>
-                    <a:bodyPr/>
-                    <a:lstStyle/>
-                    <a:p>
-                      <a:pPr marL="0" marR="0" algn="ctr">
-                        <a:lnSpc>
-                          <a:spcPct val="115000"/>
-                        </a:lnSpc>
-                        <a:spcBef>
-                          <a:spcPts val="0"/>
-                        </a:spcBef>
-                        <a:spcAft>
-                          <a:spcPts val="0"/>
-                        </a:spcAft>
-                        <a:tabLst>
-                          <a:tab pos="127000" algn="l"/>
-                        </a:tabLst>
-                      </a:pPr>
-                      <a:r>
-                        <a:rPr lang="en-US" sz="2400" kern="1200" dirty="0">
-                          <a:solidFill>
-                            <a:schemeClr val="tx1"/>
-                          </a:solidFill>
-                          <a:effectLst/>
-                          <a:latin typeface="+mn-lt"/>
-                          <a:ea typeface="+mn-ea"/>
-                          <a:cs typeface="+mn-cs"/>
-                        </a:rPr>
-                        <a:t>67.7 percent</a:t>
-                      </a:r>
-                    </a:p>
-                  </a:txBody>
-                  <a:tcPr marL="68580" marR="68580" marT="0" marB="0" anchor="ctr"/>
-                </a:tc>
-                <a:extLst>
-                  <a:ext uri="{0D108BD9-81ED-4DB2-BD59-A6C34878D82A}">
-                    <a16:rowId xmlns:a16="http://schemas.microsoft.com/office/drawing/2014/main" val="10003"/>
-                  </a:ext>
-                </a:extLst>
-              </a:tr>
-              <a:tr h="660624">
-                <a:tc>
-                  <a:txBody>
-                    <a:bodyPr/>
-                    <a:lstStyle/>
-                    <a:p>
-                      <a:pPr marL="0" marR="0" algn="ctr">
-                        <a:lnSpc>
-                          <a:spcPct val="115000"/>
-                        </a:lnSpc>
-                        <a:spcBef>
-                          <a:spcPts val="0"/>
-                        </a:spcBef>
-                        <a:spcAft>
-                          <a:spcPts val="0"/>
-                        </a:spcAft>
-                        <a:tabLst>
-                          <a:tab pos="127000" algn="l"/>
-                        </a:tabLst>
-                      </a:pPr>
-                      <a:r>
-                        <a:rPr lang="en-US" sz="2400" b="1" kern="1200" dirty="0">
-                          <a:solidFill>
-                            <a:schemeClr val="tx1"/>
-                          </a:solidFill>
-                          <a:effectLst/>
-                          <a:latin typeface="+mn-lt"/>
-                          <a:ea typeface="+mn-ea"/>
-                          <a:cs typeface="+mn-cs"/>
-                        </a:rPr>
-                        <a:t>Training Time</a:t>
-                      </a:r>
-                    </a:p>
-                  </a:txBody>
-                  <a:tcPr marL="68580" marR="68580" marT="0" marB="0" anchor="ctr"/>
-                </a:tc>
-                <a:tc>
-                  <a:txBody>
-                    <a:bodyPr/>
-                    <a:lstStyle/>
-                    <a:p>
-                      <a:pPr marL="0" marR="0" algn="ctr">
-                        <a:lnSpc>
-                          <a:spcPct val="115000"/>
-                        </a:lnSpc>
-                        <a:spcBef>
-                          <a:spcPts val="0"/>
-                        </a:spcBef>
-                        <a:spcAft>
-                          <a:spcPts val="0"/>
-                        </a:spcAft>
-                        <a:tabLst>
-                          <a:tab pos="127000" algn="l"/>
-                        </a:tabLst>
-                      </a:pPr>
-                      <a:r>
-                        <a:rPr lang="en-US" sz="2400" kern="1200" dirty="0">
-                          <a:solidFill>
-                            <a:schemeClr val="tx1"/>
-                          </a:solidFill>
-                          <a:effectLst/>
-                          <a:latin typeface="+mn-lt"/>
-                          <a:ea typeface="+mn-ea"/>
-                          <a:cs typeface="+mn-cs"/>
-                        </a:rPr>
-                        <a:t>143 seconds</a:t>
-                      </a:r>
-                    </a:p>
-                  </a:txBody>
-                  <a:tcPr marL="68580" marR="68580" marT="0" marB="0" anchor="ctr"/>
-                </a:tc>
-                <a:extLst>
-                  <a:ext uri="{0D108BD9-81ED-4DB2-BD59-A6C34878D82A}">
-                    <a16:rowId xmlns:a16="http://schemas.microsoft.com/office/drawing/2014/main" val="688655240"/>
-                  </a:ext>
-                </a:extLst>
-              </a:tr>
-            </a:tbl>
-          </a:graphicData>
-        </a:graphic>
-      </p:graphicFrame>
-      <p:pic>
-        <p:nvPicPr>
-          <p:cNvPr id="7" name="Picture 6" descr="A close up of a logo&#10;&#10;Description generated with high confidence">
-            <a:extLst>
-              <a:ext uri="{FF2B5EF4-FFF2-40B4-BE49-F238E27FC236}">
-                <a16:creationId xmlns:a16="http://schemas.microsoft.com/office/drawing/2014/main" id="{0F5F680D-2CEC-4AE8-BF06-22131891F9D0}"/>
-              </a:ext>
-            </a:extLst>
-          </p:cNvPr>
-          <p:cNvPicPr>
-            <a:picLocks noChangeAspect="1"/>
-          </p:cNvPicPr>
-          <p:nvPr/>
-        </p:nvPicPr>
-        <p:blipFill>
-          <a:blip r:embed="rId2">
-            <a:extLst>
-              <a:ext uri="{28A0092B-C50C-407E-A947-70E740481C1C}">
-                <a14:useLocalDpi xmlns:a14="http://schemas.microsoft.com/office/drawing/2010/main" val="0"/>
-              </a:ext>
-            </a:extLst>
-          </a:blip>
-          <a:stretch>
-            <a:fillRect/>
-          </a:stretch>
-        </p:blipFill>
-        <p:spPr>
-          <a:xfrm>
-            <a:off x="6202363" y="2158712"/>
-            <a:ext cx="5075862" cy="3652964"/>
-          </a:xfrm>
-          <a:prstGeom prst="rect">
-            <a:avLst/>
-          </a:prstGeom>
-        </p:spPr>
-      </p:pic>
-    </p:spTree>
-    <p:extLst>
-      <p:ext uri="{BB962C8B-B14F-4D97-AF65-F5344CB8AC3E}">
-        <p14:creationId xmlns:p14="http://schemas.microsoft.com/office/powerpoint/2010/main" val="949567083"/>
-      </p:ext>
-    </p:extLst>
-  </p:cSld>
-  <p:clrMapOvr>
-    <a:masterClrMapping/>
-  </p:clrMapOvr>
-</p:sld>
-</file>
-
 <file path=ppt/slides/slide9.xml><?xml version="1.0" encoding="utf-8"?>
 <p:sld xmlns:a="http://schemas.openxmlformats.org/drawingml/2006/main" xmlns:r="http://schemas.openxmlformats.org/officeDocument/2006/relationships" xmlns:p="http://schemas.openxmlformats.org/presentationml/2006/main">
   <p:cSld>
@@ -9668,7 +9909,7 @@
         <p:spPr>
           <a:xfrm>
             <a:off x="913774" y="562534"/>
-            <a:ext cx="10364451" cy="613123"/>
+            <a:ext cx="10364451" cy="762413"/>
           </a:xfrm>
         </p:spPr>
         <p:txBody>
@@ -9677,17 +9918,115 @@
           <a:p>
             <a:r>
               <a:rPr lang="en-US" dirty="0"/>
-              <a:t>K Nearest neighbor</a:t>
-            </a:r>
-          </a:p>
-        </p:txBody>
-      </p:sp>
-      <p:sp>
-        <p:nvSpPr>
-          <p:cNvPr id="6" name="TextBox 5">
+              <a:t>Neural networks</a:t>
+            </a:r>
+          </a:p>
+        </p:txBody>
+      </p:sp>
+      <p:sp>
+        <p:nvSpPr>
+          <p:cNvPr id="3" name="Content Placeholder 2">
             <a:extLst>
               <a:ext uri="{FF2B5EF4-FFF2-40B4-BE49-F238E27FC236}">
-                <a16:creationId xmlns:a16="http://schemas.microsoft.com/office/drawing/2014/main" id="{B41F92AE-37F0-4E06-82F0-237A9117F9B5}"/>
+                <a16:creationId xmlns:a16="http://schemas.microsoft.com/office/drawing/2014/main" id="{07716CFF-3B18-4811-89AB-74BD3754B4E6}"/>
+              </a:ext>
+            </a:extLst>
+          </p:cNvPr>
+          <p:cNvSpPr>
+            <a:spLocks noGrp="1"/>
+          </p:cNvSpPr>
+          <p:nvPr>
+            <p:ph sz="quarter" idx="13"/>
+          </p:nvPr>
+        </p:nvSpPr>
+        <p:spPr>
+          <a:xfrm>
+            <a:off x="913774" y="2375296"/>
+            <a:ext cx="3340985" cy="3918858"/>
+          </a:xfrm>
+        </p:spPr>
+        <p:txBody>
+          <a:bodyPr>
+            <a:normAutofit/>
+          </a:bodyPr>
+          <a:lstStyle/>
+          <a:p>
+            <a:pPr marL="0" indent="0">
+              <a:buNone/>
+            </a:pPr>
+            <a:r>
+              <a:rPr lang="en-US" dirty="0"/>
+              <a:t>Class  0 :  0.5435</a:t>
+            </a:r>
+          </a:p>
+          <a:p>
+            <a:pPr marL="0" indent="0">
+              <a:buNone/>
+            </a:pPr>
+            <a:r>
+              <a:rPr lang="en-US" dirty="0"/>
+              <a:t>Class  1 :  0.1333</a:t>
+            </a:r>
+          </a:p>
+          <a:p>
+            <a:pPr marL="0" indent="0">
+              <a:buNone/>
+            </a:pPr>
+            <a:r>
+              <a:rPr lang="en-US" dirty="0"/>
+              <a:t>Class  2 :  0.7963</a:t>
+            </a:r>
+          </a:p>
+          <a:p>
+            <a:pPr marL="0" indent="0">
+              <a:buNone/>
+            </a:pPr>
+            <a:r>
+              <a:rPr lang="en-US" dirty="0"/>
+              <a:t>Class  3 :  0.68</a:t>
+            </a:r>
+          </a:p>
+          <a:p>
+            <a:pPr marL="0" indent="0">
+              <a:buNone/>
+            </a:pPr>
+            <a:r>
+              <a:rPr lang="en-US" dirty="0"/>
+              <a:t>Class  4 :  0.9074</a:t>
+            </a:r>
+          </a:p>
+          <a:p>
+            <a:pPr marL="0" indent="0">
+              <a:buNone/>
+            </a:pPr>
+            <a:r>
+              <a:rPr lang="en-US" dirty="0"/>
+              <a:t>Class  5 :  0.5556</a:t>
+            </a:r>
+          </a:p>
+          <a:p>
+            <a:pPr marL="0" indent="0">
+              <a:buNone/>
+            </a:pPr>
+            <a:r>
+              <a:rPr lang="en-US" dirty="0"/>
+              <a:t>Class  6 :  0.4286</a:t>
+            </a:r>
+          </a:p>
+          <a:p>
+            <a:endParaRPr lang="en-US" dirty="0"/>
+          </a:p>
+          <a:p>
+            <a:endParaRPr lang="en-US" dirty="0"/>
+          </a:p>
+        </p:txBody>
+      </p:sp>
+      <p:sp>
+        <p:nvSpPr>
+          <p:cNvPr id="5" name="TextBox 4">
+            <a:extLst>
+              <a:ext uri="{FF2B5EF4-FFF2-40B4-BE49-F238E27FC236}">
+                <a16:creationId xmlns:a16="http://schemas.microsoft.com/office/drawing/2014/main" id="{B2310781-EA65-4955-97CC-1323DFC6F870}"/>
               </a:ext>
             </a:extLst>
           </p:cNvPr>
@@ -9696,8 +10035,8 @@
         </p:nvSpPr>
         <p:spPr>
           <a:xfrm>
-            <a:off x="778935" y="2108718"/>
-            <a:ext cx="2162772" cy="3918189"/>
+            <a:off x="3200774" y="2375965"/>
+            <a:ext cx="2303836" cy="3918189"/>
           </a:xfrm>
           <a:prstGeom prst="rect">
             <a:avLst/>
@@ -9723,7 +10062,7 @@
             </a:pPr>
             <a:r>
               <a:rPr lang="en-US" sz="2000" cap="all" dirty="0"/>
-              <a:t>Class  0 :  0.3409</a:t>
+              <a:t>Class  7   :  0.4487</a:t>
             </a:r>
           </a:p>
           <a:p>
@@ -9740,7 +10079,7 @@
             </a:pPr>
             <a:r>
               <a:rPr lang="en-US" sz="2000" cap="all" dirty="0"/>
-              <a:t>Class  1 :  0.4167</a:t>
+              <a:t>Class  8   :  0.726</a:t>
             </a:r>
           </a:p>
           <a:p>
@@ -9757,7 +10096,7 @@
             </a:pPr>
             <a:r>
               <a:rPr lang="en-US" sz="2000" cap="all" dirty="0"/>
-              <a:t>Class  2 :  0.8108</a:t>
+              <a:t>Class  9   :  0.8</a:t>
             </a:r>
           </a:p>
           <a:p>
@@ -9774,7 +10113,7 @@
             </a:pPr>
             <a:r>
               <a:rPr lang="en-US" sz="2000" cap="all" dirty="0"/>
-              <a:t>Class  3 :  0.0</a:t>
+              <a:t>Class  10 :  0.8817</a:t>
             </a:r>
           </a:p>
           <a:p>
@@ -9791,7 +10130,7 @@
             </a:pPr>
             <a:r>
               <a:rPr lang="en-US" sz="2000" cap="all" dirty="0"/>
-              <a:t>Class  4 :  0.75</a:t>
+              <a:t>Class  11 :  0.875</a:t>
             </a:r>
           </a:p>
           <a:p>
@@ -9808,7 +10147,7 @@
             </a:pPr>
             <a:r>
               <a:rPr lang="en-US" sz="2000" cap="all" dirty="0"/>
-              <a:t>Class  5 :  0.7538</a:t>
+              <a:t>Class  12 :  0.8333</a:t>
             </a:r>
           </a:p>
           <a:p>
@@ -9825,7 +10164,7 @@
             </a:pPr>
             <a:r>
               <a:rPr lang="en-US" sz="2000" cap="all" dirty="0"/>
-              <a:t>Class  6 :  0.3333</a:t>
+              <a:t>Class  13 :  0.6607</a:t>
             </a:r>
           </a:p>
           <a:p>
@@ -9842,17 +10181,17 @@
             </a:pPr>
             <a:r>
               <a:rPr lang="en-US" sz="2000" cap="all" dirty="0"/>
-              <a:t>Class  7 :  0.3636</a:t>
-            </a:r>
-          </a:p>
-        </p:txBody>
-      </p:sp>
-      <p:sp>
-        <p:nvSpPr>
-          <p:cNvPr id="8" name="TextBox 7">
+              <a:t>Class  14 :  0.0</a:t>
+            </a:r>
+          </a:p>
+        </p:txBody>
+      </p:sp>
+      <p:sp>
+        <p:nvSpPr>
+          <p:cNvPr id="6" name="TextBox 5">
             <a:extLst>
               <a:ext uri="{FF2B5EF4-FFF2-40B4-BE49-F238E27FC236}">
-                <a16:creationId xmlns:a16="http://schemas.microsoft.com/office/drawing/2014/main" id="{F894DFAB-49D9-4AD7-8E47-65E3F16D960E}"/>
+                <a16:creationId xmlns:a16="http://schemas.microsoft.com/office/drawing/2014/main" id="{A59CBC6E-E91C-4187-8CB7-8BF597D9C40A}"/>
               </a:ext>
             </a:extLst>
           </p:cNvPr>
@@ -9861,8 +10200,8 @@
         </p:nvSpPr>
         <p:spPr>
           <a:xfrm>
-            <a:off x="2941707" y="2108718"/>
-            <a:ext cx="2303836" cy="3918189"/>
+            <a:off x="1357256" y="1682464"/>
+            <a:ext cx="4552657" cy="461665"/>
           </a:xfrm>
           <a:prstGeom prst="rect">
             <a:avLst/>
@@ -9875,149 +10214,19 @@
           </a:bodyPr>
           <a:lstStyle/>
           <a:p>
-            <a:pPr defTabSz="914400">
-              <a:lnSpc>
-                <a:spcPct val="120000"/>
-              </a:lnSpc>
-              <a:spcBef>
-                <a:spcPts val="1000"/>
-              </a:spcBef>
-              <a:buClr>
-                <a:schemeClr val="tx1"/>
-              </a:buClr>
-            </a:pPr>
-            <a:r>
-              <a:rPr lang="en-US" sz="2000" cap="all" dirty="0"/>
-              <a:t>Class    8 :  0.4407</a:t>
-            </a:r>
-          </a:p>
-          <a:p>
-            <a:pPr defTabSz="914400">
-              <a:lnSpc>
-                <a:spcPct val="120000"/>
-              </a:lnSpc>
-              <a:spcBef>
-                <a:spcPts val="1000"/>
-              </a:spcBef>
-              <a:buClr>
-                <a:schemeClr val="tx1"/>
-              </a:buClr>
-            </a:pPr>
-            <a:r>
-              <a:rPr lang="en-US" sz="2000" cap="all" dirty="0"/>
-              <a:t>Class    9 :  0.7529</a:t>
-            </a:r>
-          </a:p>
-          <a:p>
-            <a:pPr defTabSz="914400">
-              <a:lnSpc>
-                <a:spcPct val="120000"/>
-              </a:lnSpc>
-              <a:spcBef>
-                <a:spcPts val="1000"/>
-              </a:spcBef>
-              <a:buClr>
-                <a:schemeClr val="tx1"/>
-              </a:buClr>
-            </a:pPr>
-            <a:r>
-              <a:rPr lang="en-US" sz="2000" cap="all" dirty="0"/>
-              <a:t>Class  10 :  0.694</a:t>
-            </a:r>
-          </a:p>
-          <a:p>
-            <a:pPr defTabSz="914400">
-              <a:lnSpc>
-                <a:spcPct val="120000"/>
-              </a:lnSpc>
-              <a:spcBef>
-                <a:spcPts val="1000"/>
-              </a:spcBef>
-              <a:buClr>
-                <a:schemeClr val="tx1"/>
-              </a:buClr>
-            </a:pPr>
-            <a:r>
-              <a:rPr lang="en-US" sz="2000" cap="all" dirty="0"/>
-              <a:t>Class  11 :  0.8085</a:t>
-            </a:r>
-          </a:p>
-          <a:p>
-            <a:pPr defTabSz="914400">
-              <a:lnSpc>
-                <a:spcPct val="120000"/>
-              </a:lnSpc>
-              <a:spcBef>
-                <a:spcPts val="1000"/>
-              </a:spcBef>
-              <a:buClr>
-                <a:schemeClr val="tx1"/>
-              </a:buClr>
-            </a:pPr>
-            <a:r>
-              <a:rPr lang="en-US" sz="2000" cap="all" dirty="0"/>
-              <a:t>Class  12 :  0.6538</a:t>
-            </a:r>
-          </a:p>
-          <a:p>
-            <a:pPr defTabSz="914400">
-              <a:lnSpc>
-                <a:spcPct val="120000"/>
-              </a:lnSpc>
-              <a:spcBef>
-                <a:spcPts val="1000"/>
-              </a:spcBef>
-              <a:buClr>
-                <a:schemeClr val="tx1"/>
-              </a:buClr>
-            </a:pPr>
-            <a:r>
-              <a:rPr lang="en-US" sz="2000" cap="all" dirty="0"/>
-              <a:t>Class  13 :  0.5714</a:t>
-            </a:r>
-          </a:p>
-          <a:p>
-            <a:pPr defTabSz="914400">
-              <a:lnSpc>
-                <a:spcPct val="120000"/>
-              </a:lnSpc>
-              <a:spcBef>
-                <a:spcPts val="1000"/>
-              </a:spcBef>
-              <a:buClr>
-                <a:schemeClr val="tx1"/>
-              </a:buClr>
-            </a:pPr>
-            <a:r>
-              <a:rPr lang="en-US" sz="2000" cap="all" dirty="0"/>
-              <a:t>Class  14 :  0.6545</a:t>
-            </a:r>
-          </a:p>
-          <a:p>
-            <a:pPr defTabSz="914400">
-              <a:lnSpc>
-                <a:spcPct val="120000"/>
-              </a:lnSpc>
-              <a:spcBef>
-                <a:spcPts val="1000"/>
-              </a:spcBef>
-              <a:buClr>
-                <a:schemeClr val="tx1"/>
-              </a:buClr>
-            </a:pPr>
-            <a:r>
-              <a:rPr lang="en-US" sz="2000" cap="all" dirty="0"/>
-              <a:t>Class  15 :  0.0</a:t>
-            </a:r>
-          </a:p>
-        </p:txBody>
-      </p:sp>
-      <p:sp>
-        <p:nvSpPr>
-          <p:cNvPr id="9" name="TextBox 8">
+            <a:r>
+              <a:rPr lang="en-US" sz="2400" b="1" dirty="0"/>
+              <a:t>CLASS CONDITIONAL ACCURACY</a:t>
+            </a:r>
+          </a:p>
+        </p:txBody>
+      </p:sp>
+      <p:sp>
+        <p:nvSpPr>
+          <p:cNvPr id="7" name="TextBox 6">
             <a:extLst>
               <a:ext uri="{FF2B5EF4-FFF2-40B4-BE49-F238E27FC236}">
-                <a16:creationId xmlns:a16="http://schemas.microsoft.com/office/drawing/2014/main" id="{C3FAF612-05D3-407A-82FA-4D2D89A4FA76}"/>
+                <a16:creationId xmlns:a16="http://schemas.microsoft.com/office/drawing/2014/main" id="{9834C2FD-A9BE-4783-A860-EB4296C1389F}"/>
               </a:ext>
             </a:extLst>
           </p:cNvPr>
@@ -10026,8 +10235,8 @@
         </p:nvSpPr>
         <p:spPr>
           <a:xfrm>
-            <a:off x="5494641" y="2108718"/>
-            <a:ext cx="6053260" cy="4524315"/>
+            <a:off x="7631538" y="1608298"/>
+            <a:ext cx="2932982" cy="461665"/>
           </a:xfrm>
           <a:prstGeom prst="rect">
             <a:avLst/>
@@ -10035,242 +10244,24 @@
           <a:noFill/>
         </p:spPr>
         <p:txBody>
-          <a:bodyPr wrap="square" rtlCol="0">
+          <a:bodyPr wrap="none" rtlCol="0">
             <a:spAutoFit/>
           </a:bodyPr>
           <a:lstStyle/>
           <a:p>
             <a:r>
-              <a:rPr lang="en-US" dirty="0"/>
-              <a:t>[</a:t>
-            </a:r>
-            <a:r>
-              <a:rPr lang="en-US" b="1" dirty="0"/>
-              <a:t>15</a:t>
-            </a:r>
-            <a:r>
-              <a:rPr lang="en-US" dirty="0"/>
-              <a:t>   0    4   0    0    1   1   0    2    3  16    0    1    0    1   0]</a:t>
-            </a:r>
-          </a:p>
-          <a:p>
-            <a:r>
-              <a:rPr lang="en-US" dirty="0"/>
-              <a:t>[  0   </a:t>
-            </a:r>
-            <a:r>
-              <a:rPr lang="en-US" b="1" dirty="0"/>
-              <a:t>5</a:t>
-            </a:r>
-            <a:r>
-              <a:rPr lang="en-US" dirty="0"/>
-              <a:t>    0   0    0    0   0   0    0    0    4    2    0    0    1   0]</a:t>
-            </a:r>
-          </a:p>
-          <a:p>
-            <a:r>
-              <a:rPr lang="en-US" dirty="0"/>
-              <a:t>[  1   0  </a:t>
-            </a:r>
-            <a:r>
-              <a:rPr lang="en-US" b="1" dirty="0"/>
-              <a:t>90</a:t>
-            </a:r>
-            <a:r>
-              <a:rPr lang="en-US" dirty="0"/>
-              <a:t>   0    1    0   0   0    3    2  10    2    1    0    1   0]</a:t>
-            </a:r>
-          </a:p>
-          <a:p>
-            <a:r>
-              <a:rPr lang="en-US" dirty="0"/>
-              <a:t>[  0   0    0   </a:t>
-            </a:r>
-            <a:r>
-              <a:rPr lang="en-US" b="1" dirty="0"/>
-              <a:t>0</a:t>
-            </a:r>
-            <a:r>
-              <a:rPr lang="en-US" dirty="0"/>
-              <a:t>    0    0   0   0    0    0    0    0    0    0    1   0]</a:t>
-            </a:r>
-          </a:p>
-          <a:p>
-            <a:r>
-              <a:rPr lang="en-US" dirty="0"/>
-              <a:t>[  0   1    1   0  </a:t>
-            </a:r>
-            <a:r>
-              <a:rPr lang="en-US" b="1" dirty="0"/>
-              <a:t>15</a:t>
-            </a:r>
-            <a:r>
-              <a:rPr lang="en-US" dirty="0"/>
-              <a:t>    0   0   0    2    0    1    0    0    0    0   0]</a:t>
-            </a:r>
-          </a:p>
-          <a:p>
-            <a:r>
-              <a:rPr lang="en-US" dirty="0"/>
-              <a:t>[  3   0    1   0    1  </a:t>
-            </a:r>
-            <a:r>
-              <a:rPr lang="en-US" b="1" dirty="0"/>
-              <a:t>49</a:t>
-            </a:r>
-            <a:r>
-              <a:rPr lang="en-US" dirty="0"/>
-              <a:t>   0   0    3    0    4    4    0    0    0   0]</a:t>
-            </a:r>
-          </a:p>
-          <a:p>
-            <a:r>
-              <a:rPr lang="en-US" dirty="0"/>
-              <a:t>[  0   1    0   0    1    0   </a:t>
-            </a:r>
-            <a:r>
-              <a:rPr lang="en-US" b="1" dirty="0"/>
-              <a:t>4</a:t>
-            </a:r>
-            <a:r>
-              <a:rPr lang="en-US" dirty="0"/>
-              <a:t>   0    1    0    2    2    1    0    0   0]</a:t>
-            </a:r>
-          </a:p>
-          <a:p>
-            <a:r>
-              <a:rPr lang="en-US" dirty="0"/>
-              <a:t>[  0   0    1   0    1    1   0   </a:t>
-            </a:r>
-            <a:r>
-              <a:rPr lang="en-US" b="1" dirty="0"/>
-              <a:t>4</a:t>
-            </a:r>
-            <a:r>
-              <a:rPr lang="en-US" dirty="0"/>
-              <a:t>    0    0    3    0    0    0    1   0]</a:t>
-            </a:r>
-          </a:p>
-          <a:p>
-            <a:r>
-              <a:rPr lang="en-US" dirty="0"/>
-              <a:t>[  1   1    9   0    1    1   0   1  </a:t>
-            </a:r>
-            <a:r>
-              <a:rPr lang="en-US" b="1" dirty="0"/>
-              <a:t>26</a:t>
-            </a:r>
-            <a:r>
-              <a:rPr lang="en-US" dirty="0"/>
-              <a:t>    2    9    3    2    1    2   0]</a:t>
-            </a:r>
-          </a:p>
-          <a:p>
-            <a:r>
-              <a:rPr lang="en-US" dirty="0"/>
-              <a:t>[  0   0    1   0    1    2   0   0    2  </a:t>
-            </a:r>
-            <a:r>
-              <a:rPr lang="en-US" b="1" dirty="0"/>
-              <a:t>64</a:t>
-            </a:r>
-            <a:r>
-              <a:rPr lang="en-US" dirty="0"/>
-              <a:t>  13    1    1    0    0   0]</a:t>
-            </a:r>
-          </a:p>
-          <a:p>
-            <a:r>
-              <a:rPr lang="en-US" dirty="0"/>
-              <a:t>[  5   0  14   0    2    4   3   3  12  10 </a:t>
-            </a:r>
-            <a:r>
-              <a:rPr lang="en-US" b="1" dirty="0"/>
-              <a:t>161</a:t>
-            </a:r>
-            <a:r>
-              <a:rPr lang="en-US" dirty="0"/>
-              <a:t>   7    9    0    2   0]</a:t>
-            </a:r>
-          </a:p>
-          <a:p>
-            <a:r>
-              <a:rPr lang="en-US" dirty="0"/>
-              <a:t>[  0   0    2   0    1    4   0   0    3    1    3  </a:t>
-            </a:r>
-            <a:r>
-              <a:rPr lang="en-US" b="1" dirty="0"/>
-              <a:t>76</a:t>
-            </a:r>
-            <a:r>
-              <a:rPr lang="en-US" dirty="0"/>
-              <a:t>    0    1    3   0]</a:t>
-            </a:r>
-          </a:p>
-          <a:p>
-            <a:r>
-              <a:rPr lang="en-US" dirty="0"/>
-              <a:t>[  1   0    2   0    0    2   0   0    9    0  11    1  </a:t>
-            </a:r>
-            <a:r>
-              <a:rPr lang="en-US" b="1" dirty="0"/>
-              <a:t>51</a:t>
-            </a:r>
-            <a:r>
-              <a:rPr lang="en-US" dirty="0"/>
-              <a:t>    0    1   0]</a:t>
-            </a:r>
-          </a:p>
-          <a:p>
-            <a:r>
-              <a:rPr lang="en-US" dirty="0"/>
-              <a:t>[  0   0    0   0    1    0   0   0    2    1    2    1    5  </a:t>
-            </a:r>
-            <a:r>
-              <a:rPr lang="en-US" b="1" dirty="0"/>
-              <a:t>16</a:t>
-            </a:r>
-            <a:r>
-              <a:rPr lang="en-US" dirty="0"/>
-              <a:t>    0   0]</a:t>
-            </a:r>
-          </a:p>
-          <a:p>
-            <a:r>
-              <a:rPr lang="en-US" dirty="0"/>
-              <a:t>[  1   0    2   0    1    0   0   0    6    0    2    1    4    2  </a:t>
-            </a:r>
-            <a:r>
-              <a:rPr lang="en-US" b="1" dirty="0"/>
-              <a:t>36</a:t>
-            </a:r>
-            <a:r>
-              <a:rPr lang="en-US" dirty="0"/>
-              <a:t>   0]</a:t>
-            </a:r>
-          </a:p>
-          <a:p>
-            <a:r>
-              <a:rPr lang="en-US" dirty="0"/>
-              <a:t>[  0   0    0   0    0    0   0   0    0    0    1    0    1    0    0   </a:t>
-            </a:r>
-            <a:r>
-              <a:rPr lang="en-US" b="1" dirty="0"/>
-              <a:t>0</a:t>
-            </a:r>
-            <a:r>
-              <a:rPr lang="en-US" dirty="0"/>
-              <a:t>]</a:t>
-            </a:r>
-          </a:p>
-        </p:txBody>
-      </p:sp>
-      <p:sp>
-        <p:nvSpPr>
-          <p:cNvPr id="10" name="TextBox 9">
+              <a:rPr lang="en-US" sz="2400" b="1" dirty="0"/>
+              <a:t>CONFUSION MATRIX</a:t>
+            </a:r>
+          </a:p>
+        </p:txBody>
+      </p:sp>
+      <p:sp>
+        <p:nvSpPr>
+          <p:cNvPr id="8" name="TextBox 7">
             <a:extLst>
               <a:ext uri="{FF2B5EF4-FFF2-40B4-BE49-F238E27FC236}">
-                <a16:creationId xmlns:a16="http://schemas.microsoft.com/office/drawing/2014/main" id="{F1CF9517-081E-47CD-BE19-F905069D60ED}"/>
+                <a16:creationId xmlns:a16="http://schemas.microsoft.com/office/drawing/2014/main" id="{EFED626D-0156-4D6F-899B-720F4B29D178}"/>
               </a:ext>
             </a:extLst>
           </p:cNvPr>
@@ -10279,8 +10270,8 @@
         </p:nvSpPr>
         <p:spPr>
           <a:xfrm>
-            <a:off x="837147" y="1580764"/>
-            <a:ext cx="4373153" cy="461665"/>
+            <a:off x="5681517" y="2069963"/>
+            <a:ext cx="5798382" cy="4247317"/>
           </a:xfrm>
           <a:prstGeom prst="rect">
             <a:avLst/>
@@ -10288,49 +10279,98 @@
           <a:noFill/>
         </p:spPr>
         <p:txBody>
-          <a:bodyPr wrap="square" rtlCol="0">
-            <a:spAutoFit/>
-          </a:bodyPr>
-          <a:lstStyle/>
-          <a:p>
-            <a:r>
-              <a:rPr lang="en-US" sz="2400" dirty="0"/>
-              <a:t>CLASS CONDITIONAL ACCURACY</a:t>
-            </a:r>
-          </a:p>
-        </p:txBody>
-      </p:sp>
-      <p:sp>
-        <p:nvSpPr>
-          <p:cNvPr id="11" name="TextBox 10">
-            <a:extLst>
-              <a:ext uri="{FF2B5EF4-FFF2-40B4-BE49-F238E27FC236}">
-                <a16:creationId xmlns:a16="http://schemas.microsoft.com/office/drawing/2014/main" id="{4C7BCDFE-A996-4FF1-AF66-F8D30A3362E2}"/>
-              </a:ext>
-            </a:extLst>
-          </p:cNvPr>
-          <p:cNvSpPr txBox="1"/>
-          <p:nvPr/>
-        </p:nvSpPr>
-        <p:spPr>
-          <a:xfrm>
-            <a:off x="7113321" y="1580763"/>
-            <a:ext cx="2815899" cy="461665"/>
-          </a:xfrm>
-          <a:prstGeom prst="rect">
-            <a:avLst/>
-          </a:prstGeom>
-          <a:noFill/>
-        </p:spPr>
-        <p:txBody>
           <a:bodyPr wrap="none" rtlCol="0">
             <a:spAutoFit/>
           </a:bodyPr>
           <a:lstStyle/>
           <a:p>
             <a:r>
-              <a:rPr lang="en-US" sz="2400" dirty="0"/>
-              <a:t>CONFUSION MATRIX</a:t>
+              <a:rPr lang="en-US" dirty="0"/>
+              <a:t> [ 25   0    2    0    0   0   0    1    0  14    1    2    0    1   0]</a:t>
+            </a:r>
+          </a:p>
+          <a:p>
+            <a:r>
+              <a:rPr lang="en-US" dirty="0"/>
+              <a:t> [   0   2    2    1    0   0   1    2    0    5    0    0    0    2   0]</a:t>
+            </a:r>
+          </a:p>
+          <a:p>
+            <a:r>
+              <a:rPr lang="en-US" dirty="0"/>
+              <a:t> [   2   0  86    0    1   0   0    1    0  16    0    0    0    2   0]</a:t>
+            </a:r>
+          </a:p>
+          <a:p>
+            <a:r>
+              <a:rPr lang="en-US" dirty="0"/>
+              <a:t> [   1   0    1  17    0   0   0    0    0    3    3    0    0    0   0]</a:t>
+            </a:r>
+          </a:p>
+          <a:p>
+            <a:r>
+              <a:rPr lang="en-US" dirty="0"/>
+              <a:t> [   0   0    0    1  49   0   0    0    0    0    4    0    0    0   0]</a:t>
+            </a:r>
+          </a:p>
+          <a:p>
+            <a:r>
+              <a:rPr lang="en-US" dirty="0"/>
+              <a:t> [   0   0    0    0    0   5   0    2    0    2    0    0    0    0   0]</a:t>
+            </a:r>
+          </a:p>
+          <a:p>
+            <a:r>
+              <a:rPr lang="en-US" dirty="0"/>
+              <a:t> [   0   0    0    0    1   0   6    3    0    3    0    0    0    1   0]</a:t>
+            </a:r>
+          </a:p>
+          <a:p>
+            <a:r>
+              <a:rPr lang="en-US" dirty="0"/>
+              <a:t> [   1   0    6    1    2   1   0  35    0  15    4  10    0    3   0]</a:t>
+            </a:r>
+          </a:p>
+          <a:p>
+            <a:r>
+              <a:rPr lang="en-US" dirty="0"/>
+              <a:t> [   3   0    1    0    0   0   0    0  53  14    1    0    1    0   0]</a:t>
+            </a:r>
+          </a:p>
+          <a:p>
+            <a:r>
+              <a:rPr lang="en-US" dirty="0"/>
+              <a:t> [ 10   1    8    0    3   0   0    9    2 172   1    4    2    3   0]</a:t>
+            </a:r>
+          </a:p>
+          <a:p>
+            <a:r>
+              <a:rPr lang="en-US" dirty="0"/>
+              <a:t> [   0   1    0    0    0   0   0    5    0    4  82    1    0    0   0]</a:t>
+            </a:r>
+          </a:p>
+          <a:p>
+            <a:r>
+              <a:rPr lang="en-US" dirty="0"/>
+              <a:t> [   0   0    0    0    0   0   0    0    0    8    0  70    1    1   0]</a:t>
+            </a:r>
+          </a:p>
+          <a:p>
+            <a:r>
+              <a:rPr lang="en-US" dirty="0"/>
+              <a:t> [   0   0    0    0    0   0   0    0    0    2    1    1  30    2   0]</a:t>
+            </a:r>
+          </a:p>
+          <a:p>
+            <a:r>
+              <a:rPr lang="en-US" dirty="0"/>
+              <a:t> [   1   2    0    0    0   0   0    2    0    4    4    0    6  37   0]</a:t>
+            </a:r>
+          </a:p>
+          <a:p>
+            <a:r>
+              <a:rPr lang="en-US" dirty="0"/>
+              <a:t> [   0   0    1    0    0   0   0    1    0    2    2    1    0    0   0]</a:t>
             </a:r>
           </a:p>
         </p:txBody>
@@ -10338,7 +10378,7 @@
     </p:spTree>
     <p:extLst>
       <p:ext uri="{BB962C8B-B14F-4D97-AF65-F5344CB8AC3E}">
-        <p14:creationId xmlns:p14="http://schemas.microsoft.com/office/powerpoint/2010/main" val="887475669"/>
+        <p14:creationId xmlns:p14="http://schemas.microsoft.com/office/powerpoint/2010/main" val="3755679565"/>
       </p:ext>
     </p:extLst>
   </p:cSld>

</xml_diff>